<commit_message>
Updated Prototype code for long range Began powerpoint
</commit_message>
<xml_diff>
--- a/Presentation/T04_Presentation.pptx
+++ b/Presentation/T04_Presentation.pptx
@@ -5,13 +5,22 @@
     <p:sldMasterId id="2147483648" r:id="rId1"/>
   </p:sldMasterIdLst>
   <p:notesMasterIdLst>
-    <p:notesMasterId r:id="rId6"/>
+    <p:notesMasterId r:id="rId15"/>
   </p:notesMasterIdLst>
   <p:sldIdLst>
     <p:sldId id="256" r:id="rId2"/>
     <p:sldId id="257" r:id="rId3"/>
     <p:sldId id="258" r:id="rId4"/>
     <p:sldId id="259" r:id="rId5"/>
+    <p:sldId id="260" r:id="rId6"/>
+    <p:sldId id="261" r:id="rId7"/>
+    <p:sldId id="262" r:id="rId8"/>
+    <p:sldId id="263" r:id="rId9"/>
+    <p:sldId id="264" r:id="rId10"/>
+    <p:sldId id="265" r:id="rId11"/>
+    <p:sldId id="266" r:id="rId12"/>
+    <p:sldId id="267" r:id="rId13"/>
+    <p:sldId id="268" r:id="rId14"/>
   </p:sldIdLst>
   <p:sldSz cx="9144000" cy="6858000" type="screen4x3"/>
   <p:notesSz cx="6858000" cy="9144000"/>
@@ -110,6 +119,22 @@
       </a:defRPr>
     </a:lvl9pPr>
   </p:defaultTextStyle>
+  <p:extLst>
+    <p:ext uri="{EFAFB233-063F-42B5-8137-9DF3F51BA10A}">
+      <p15:sldGuideLst xmlns:p15="http://schemas.microsoft.com/office/powerpoint/2012/main">
+        <p15:guide id="1" orient="horz" pos="2160">
+          <p15:clr>
+            <a:srgbClr val="A4A3A4"/>
+          </p15:clr>
+        </p15:guide>
+        <p15:guide id="2" pos="2880">
+          <p15:clr>
+            <a:srgbClr val="A4A3A4"/>
+          </p15:clr>
+        </p15:guide>
+      </p15:sldGuideLst>
+    </p:ext>
+  </p:extLst>
 </p:presentation>
 </file>
 
@@ -195,7 +220,7 @@
           <a:p>
             <a:fld id="{7D2BA66B-4B43-4B31-8C46-01F4587945DE}" type="datetimeFigureOut">
               <a:rPr lang="en-US" smtClean="0"/>
-              <a:t>12/8/2014</a:t>
+              <a:t>12/9/2014</a:t>
             </a:fld>
             <a:endParaRPr lang="en-US"/>
           </a:p>
@@ -644,7 +669,7 @@
           <a:p>
             <a:fld id="{025B5F04-3DD3-4015-B751-EB091AF79283}" type="datetime1">
               <a:rPr lang="en-US" smtClean="0"/>
-              <a:t>12/8/2014</a:t>
+              <a:t>12/9/2014</a:t>
             </a:fld>
             <a:endParaRPr lang="en-US"/>
           </a:p>
@@ -810,7 +835,7 @@
           <a:p>
             <a:fld id="{90BEF6DF-84C5-4CB9-A878-58935F46D0CB}" type="datetime1">
               <a:rPr lang="en-US" smtClean="0"/>
-              <a:t>12/8/2014</a:t>
+              <a:t>12/9/2014</a:t>
             </a:fld>
             <a:endParaRPr lang="en-US"/>
           </a:p>
@@ -986,7 +1011,7 @@
           <a:p>
             <a:fld id="{926F7C8E-82A0-4137-A012-6AB94CC2C3D0}" type="datetime1">
               <a:rPr lang="en-US" smtClean="0"/>
-              <a:t>12/8/2014</a:t>
+              <a:t>12/9/2014</a:t>
             </a:fld>
             <a:endParaRPr lang="en-US"/>
           </a:p>
@@ -1152,7 +1177,7 @@
           <a:p>
             <a:fld id="{6A159409-9D08-4690-825E-5ED9F03EE865}" type="datetime1">
               <a:rPr lang="en-US" smtClean="0"/>
-              <a:t>12/8/2014</a:t>
+              <a:t>12/9/2014</a:t>
             </a:fld>
             <a:endParaRPr lang="en-US"/>
           </a:p>
@@ -1394,7 +1419,7 @@
           <a:p>
             <a:fld id="{F1E2C436-A717-4F84-8496-7EEC60793F47}" type="datetime1">
               <a:rPr lang="en-US" smtClean="0"/>
-              <a:t>12/8/2014</a:t>
+              <a:t>12/9/2014</a:t>
             </a:fld>
             <a:endParaRPr lang="en-US"/>
           </a:p>
@@ -1678,7 +1703,7 @@
           <a:p>
             <a:fld id="{19304878-91CF-49FF-BB18-4640DC08F114}" type="datetime1">
               <a:rPr lang="en-US" smtClean="0"/>
-              <a:t>12/8/2014</a:t>
+              <a:t>12/9/2014</a:t>
             </a:fld>
             <a:endParaRPr lang="en-US"/>
           </a:p>
@@ -2096,7 +2121,7 @@
           <a:p>
             <a:fld id="{DE440A11-7842-4023-B4B1-5DAD949EF209}" type="datetime1">
               <a:rPr lang="en-US" smtClean="0"/>
-              <a:t>12/8/2014</a:t>
+              <a:t>12/9/2014</a:t>
             </a:fld>
             <a:endParaRPr lang="en-US"/>
           </a:p>
@@ -2210,7 +2235,7 @@
           <a:p>
             <a:fld id="{2E101D02-24BF-4BFB-80A5-AE8E6DB0539A}" type="datetime1">
               <a:rPr lang="en-US" smtClean="0"/>
-              <a:t>12/8/2014</a:t>
+              <a:t>12/9/2014</a:t>
             </a:fld>
             <a:endParaRPr lang="en-US"/>
           </a:p>
@@ -2301,7 +2326,7 @@
           <a:p>
             <a:fld id="{5E2FF4E6-EE57-4D29-829B-C404F7C131C6}" type="datetime1">
               <a:rPr lang="en-US" smtClean="0"/>
-              <a:t>12/8/2014</a:t>
+              <a:t>12/9/2014</a:t>
             </a:fld>
             <a:endParaRPr lang="en-US"/>
           </a:p>
@@ -2574,7 +2599,7 @@
           <a:p>
             <a:fld id="{BAAF4B9B-620F-499E-AF3A-2F71910048FD}" type="datetime1">
               <a:rPr lang="en-US" smtClean="0"/>
-              <a:t>12/8/2014</a:t>
+              <a:t>12/9/2014</a:t>
             </a:fld>
             <a:endParaRPr lang="en-US"/>
           </a:p>
@@ -2823,7 +2848,7 @@
           <a:p>
             <a:fld id="{136A608F-68E0-4239-BD3E-E06A458AFA0A}" type="datetime1">
               <a:rPr lang="en-US" smtClean="0"/>
-              <a:t>12/8/2014</a:t>
+              <a:t>12/9/2014</a:t>
             </a:fld>
             <a:endParaRPr lang="en-US"/>
           </a:p>
@@ -3032,7 +3057,7 @@
           <a:p>
             <a:fld id="{5211721D-4FFA-4AB5-9DBE-AEF9FD825DF9}" type="datetime1">
               <a:rPr lang="en-US" smtClean="0"/>
-              <a:t>12/8/2014</a:t>
+              <a:t>12/9/2014</a:t>
             </a:fld>
             <a:endParaRPr lang="en-US"/>
           </a:p>
@@ -3566,7 +3591,7 @@
 </p:sld>
 </file>
 
-<file path=ppt/slides/slide2.xml><?xml version="1.0" encoding="utf-8"?>
+<file path=ppt/slides/slide10.xml><?xml version="1.0" encoding="utf-8"?>
 <p:sld xmlns:a="http://schemas.openxmlformats.org/drawingml/2006/main" xmlns:r="http://schemas.openxmlformats.org/officeDocument/2006/relationships" xmlns:p="http://schemas.openxmlformats.org/presentationml/2006/main">
   <p:cSld>
     <p:spTree>
@@ -3601,7 +3626,7 @@
             <a:fld id="{B6F15528-21DE-4FAA-801E-634DDDAF4B2B}" type="slidenum">
               <a:rPr lang="en-US" smtClean="0"/>
               <a:pPr/>
-              <a:t>2</a:t>
+              <a:t>10</a:t>
             </a:fld>
             <a:endParaRPr lang="en-US"/>
           </a:p>
@@ -3683,50 +3708,10 @@
           </a:fontRef>
         </p:style>
       </p:cxnSp>
-      <p:sp>
-        <p:nvSpPr>
-          <p:cNvPr id="10" name="TextBox 9"/>
-          <p:cNvSpPr txBox="1"/>
-          <p:nvPr/>
-        </p:nvSpPr>
-        <p:spPr>
-          <a:xfrm>
-            <a:off x="457200" y="257080"/>
-            <a:ext cx="4495800" cy="523220"/>
-          </a:xfrm>
-          <a:prstGeom prst="rect">
-            <a:avLst/>
-          </a:prstGeom>
-          <a:noFill/>
-        </p:spPr>
-        <p:txBody>
-          <a:bodyPr wrap="square" rtlCol="0">
-            <a:spAutoFit/>
-          </a:bodyPr>
-          <a:lstStyle/>
-          <a:p>
-            <a:r>
-              <a:rPr lang="en-US" sz="2800" dirty="0" smtClean="0">
-                <a:solidFill>
-                  <a:srgbClr val="0090FF"/>
-                </a:solidFill>
-                <a:latin typeface="Fast Money" pitchFamily="2" charset="0"/>
-              </a:rPr>
-              <a:t>Title Here</a:t>
-            </a:r>
-            <a:endParaRPr lang="en-US" sz="2800" dirty="0">
-              <a:solidFill>
-                <a:srgbClr val="0090FF"/>
-              </a:solidFill>
-              <a:latin typeface="Fast Money" pitchFamily="2" charset="0"/>
-            </a:endParaRPr>
-          </a:p>
-        </p:txBody>
-      </p:sp>
     </p:spTree>
     <p:extLst>
       <p:ext uri="{BB962C8B-B14F-4D97-AF65-F5344CB8AC3E}">
-        <p14:creationId xmlns:p14="http://schemas.microsoft.com/office/powerpoint/2010/main" val="2706470271"/>
+        <p14:creationId xmlns:p14="http://schemas.microsoft.com/office/powerpoint/2010/main" val="3942031900"/>
       </p:ext>
     </p:extLst>
   </p:cSld>
@@ -3743,7 +3728,7 @@
 </p:sld>
 </file>
 
-<file path=ppt/slides/slide3.xml><?xml version="1.0" encoding="utf-8"?>
+<file path=ppt/slides/slide11.xml><?xml version="1.0" encoding="utf-8"?>
 <p:sld xmlns:a="http://schemas.openxmlformats.org/drawingml/2006/main" xmlns:r="http://schemas.openxmlformats.org/officeDocument/2006/relationships" xmlns:p="http://schemas.openxmlformats.org/presentationml/2006/main">
   <p:cSld>
     <p:spTree>
@@ -3778,7 +3763,7 @@
             <a:fld id="{B6F15528-21DE-4FAA-801E-634DDDAF4B2B}" type="slidenum">
               <a:rPr lang="en-US" smtClean="0"/>
               <a:pPr/>
-              <a:t>3</a:t>
+              <a:t>11</a:t>
             </a:fld>
             <a:endParaRPr lang="en-US"/>
           </a:p>
@@ -3860,50 +3845,10 @@
           </a:fontRef>
         </p:style>
       </p:cxnSp>
-      <p:sp>
-        <p:nvSpPr>
-          <p:cNvPr id="10" name="TextBox 9"/>
-          <p:cNvSpPr txBox="1"/>
-          <p:nvPr/>
-        </p:nvSpPr>
-        <p:spPr>
-          <a:xfrm>
-            <a:off x="457200" y="257080"/>
-            <a:ext cx="4495800" cy="523220"/>
-          </a:xfrm>
-          <a:prstGeom prst="rect">
-            <a:avLst/>
-          </a:prstGeom>
-          <a:noFill/>
-        </p:spPr>
-        <p:txBody>
-          <a:bodyPr wrap="square" rtlCol="0">
-            <a:spAutoFit/>
-          </a:bodyPr>
-          <a:lstStyle/>
-          <a:p>
-            <a:r>
-              <a:rPr lang="en-US" sz="2800" dirty="0" smtClean="0">
-                <a:solidFill>
-                  <a:srgbClr val="0090FF"/>
-                </a:solidFill>
-                <a:latin typeface="Fast Money" pitchFamily="2" charset="0"/>
-              </a:rPr>
-              <a:t>Title Here</a:t>
-            </a:r>
-            <a:endParaRPr lang="en-US" sz="2800" dirty="0">
-              <a:solidFill>
-                <a:srgbClr val="0090FF"/>
-              </a:solidFill>
-              <a:latin typeface="Fast Money" pitchFamily="2" charset="0"/>
-            </a:endParaRPr>
-          </a:p>
-        </p:txBody>
-      </p:sp>
     </p:spTree>
     <p:extLst>
       <p:ext uri="{BB962C8B-B14F-4D97-AF65-F5344CB8AC3E}">
-        <p14:creationId xmlns:p14="http://schemas.microsoft.com/office/powerpoint/2010/main" val="1664973044"/>
+        <p14:creationId xmlns:p14="http://schemas.microsoft.com/office/powerpoint/2010/main" val="2140353892"/>
       </p:ext>
     </p:extLst>
   </p:cSld>
@@ -3920,7 +3865,7 @@
 </p:sld>
 </file>
 
-<file path=ppt/slides/slide4.xml><?xml version="1.0" encoding="utf-8"?>
+<file path=ppt/slides/slide12.xml><?xml version="1.0" encoding="utf-8"?>
 <p:sld xmlns:a="http://schemas.openxmlformats.org/drawingml/2006/main" xmlns:r="http://schemas.openxmlformats.org/officeDocument/2006/relationships" xmlns:p="http://schemas.openxmlformats.org/presentationml/2006/main">
   <p:cSld>
     <p:spTree>
@@ -3955,7 +3900,7 @@
             <a:fld id="{B6F15528-21DE-4FAA-801E-634DDDAF4B2B}" type="slidenum">
               <a:rPr lang="en-US" smtClean="0"/>
               <a:pPr/>
-              <a:t>4</a:t>
+              <a:t>12</a:t>
             </a:fld>
             <a:endParaRPr lang="en-US"/>
           </a:p>
@@ -4037,16 +3982,1732 @@
           </a:fontRef>
         </p:style>
       </p:cxnSp>
-      <p:sp>
-        <p:nvSpPr>
-          <p:cNvPr id="10" name="TextBox 9"/>
+    </p:spTree>
+    <p:extLst>
+      <p:ext uri="{BB962C8B-B14F-4D97-AF65-F5344CB8AC3E}">
+        <p14:creationId xmlns:p14="http://schemas.microsoft.com/office/powerpoint/2010/main" val="1413304120"/>
+      </p:ext>
+    </p:extLst>
+  </p:cSld>
+  <p:clrMapOvr>
+    <a:masterClrMapping/>
+  </p:clrMapOvr>
+  <p:timing>
+    <p:tnLst>
+      <p:par>
+        <p:cTn id="1" dur="indefinite" restart="never" nodeType="tmRoot"/>
+      </p:par>
+    </p:tnLst>
+  </p:timing>
+</p:sld>
+</file>
+
+<file path=ppt/slides/slide13.xml><?xml version="1.0" encoding="utf-8"?>
+<p:sld xmlns:a="http://schemas.openxmlformats.org/drawingml/2006/main" xmlns:r="http://schemas.openxmlformats.org/officeDocument/2006/relationships" xmlns:p="http://schemas.openxmlformats.org/presentationml/2006/main">
+  <p:cSld>
+    <p:spTree>
+      <p:nvGrpSpPr>
+        <p:cNvPr id="1" name=""/>
+        <p:cNvGrpSpPr/>
+        <p:nvPr/>
+      </p:nvGrpSpPr>
+      <p:grpSpPr>
+        <a:xfrm>
+          <a:off x="0" y="0"/>
+          <a:ext cx="0" cy="0"/>
+          <a:chOff x="0" y="0"/>
+          <a:chExt cx="0" cy="0"/>
+        </a:xfrm>
+      </p:grpSpPr>
+      <p:sp>
+        <p:nvSpPr>
+          <p:cNvPr id="7" name="Slide Number Placeholder 6"/>
+          <p:cNvSpPr>
+            <a:spLocks noGrp="1"/>
+          </p:cNvSpPr>
+          <p:nvPr>
+            <p:ph type="sldNum" sz="quarter" idx="12"/>
+          </p:nvPr>
+        </p:nvSpPr>
+        <p:spPr/>
+        <p:txBody>
+          <a:bodyPr/>
+          <a:lstStyle/>
+          <a:p>
+            <a:fld id="{B6F15528-21DE-4FAA-801E-634DDDAF4B2B}" type="slidenum">
+              <a:rPr lang="en-US" smtClean="0"/>
+              <a:pPr/>
+              <a:t>13</a:t>
+            </a:fld>
+            <a:endParaRPr lang="en-US"/>
+          </a:p>
+        </p:txBody>
+      </p:sp>
+      <p:pic>
+        <p:nvPicPr>
+          <p:cNvPr id="8" name="Picture 2" descr="C:\Users\noaht_000\Documents\ECE411\Practicum2014\Wiki Images\logo.bmp"/>
+          <p:cNvPicPr>
+            <a:picLocks noChangeAspect="1" noChangeArrowheads="1"/>
+          </p:cNvPicPr>
+          <p:nvPr/>
+        </p:nvPicPr>
+        <p:blipFill>
+          <a:blip r:embed="rId2" cstate="print">
+            <a:extLst>
+              <a:ext uri="{28A0092B-C50C-407E-A947-70E740481C1C}">
+                <a14:useLocalDpi xmlns:a14="http://schemas.microsoft.com/office/drawing/2010/main" val="0"/>
+              </a:ext>
+            </a:extLst>
+          </a:blip>
+          <a:srcRect/>
+          <a:stretch>
+            <a:fillRect/>
+          </a:stretch>
+        </p:blipFill>
+        <p:spPr bwMode="auto">
+          <a:xfrm>
+            <a:off x="7391399" y="199181"/>
+            <a:ext cx="1477731" cy="639019"/>
+          </a:xfrm>
+          <a:prstGeom prst="rect">
+            <a:avLst/>
+          </a:prstGeom>
+          <a:noFill/>
+          <a:extLst>
+            <a:ext uri="{909E8E84-426E-40DD-AFC4-6F175D3DCCD1}">
+              <a14:hiddenFill xmlns:a14="http://schemas.microsoft.com/office/drawing/2010/main">
+                <a:solidFill>
+                  <a:srgbClr val="FFFFFF"/>
+                </a:solidFill>
+              </a14:hiddenFill>
+            </a:ext>
+          </a:extLst>
+        </p:spPr>
+      </p:pic>
+      <p:cxnSp>
+        <p:nvCxnSpPr>
+          <p:cNvPr id="9" name="Straight Connector 8"/>
+          <p:cNvCxnSpPr/>
+          <p:nvPr/>
+        </p:nvCxnSpPr>
+        <p:spPr>
+          <a:xfrm flipH="1">
+            <a:off x="533398" y="762000"/>
+            <a:ext cx="6857999" cy="0"/>
+          </a:xfrm>
+          <a:prstGeom prst="line">
+            <a:avLst/>
+          </a:prstGeom>
+          <a:ln w="38100">
+            <a:solidFill>
+              <a:schemeClr val="tx1"/>
+            </a:solidFill>
+          </a:ln>
+        </p:spPr>
+        <p:style>
+          <a:lnRef idx="1">
+            <a:schemeClr val="accent1"/>
+          </a:lnRef>
+          <a:fillRef idx="0">
+            <a:schemeClr val="accent1"/>
+          </a:fillRef>
+          <a:effectRef idx="0">
+            <a:schemeClr val="accent1"/>
+          </a:effectRef>
+          <a:fontRef idx="minor">
+            <a:schemeClr val="tx1"/>
+          </a:fontRef>
+        </p:style>
+      </p:cxnSp>
+    </p:spTree>
+    <p:extLst>
+      <p:ext uri="{BB962C8B-B14F-4D97-AF65-F5344CB8AC3E}">
+        <p14:creationId xmlns:p14="http://schemas.microsoft.com/office/powerpoint/2010/main" val="1605659540"/>
+      </p:ext>
+    </p:extLst>
+  </p:cSld>
+  <p:clrMapOvr>
+    <a:masterClrMapping/>
+  </p:clrMapOvr>
+  <p:timing>
+    <p:tnLst>
+      <p:par>
+        <p:cTn id="1" dur="indefinite" restart="never" nodeType="tmRoot"/>
+      </p:par>
+    </p:tnLst>
+  </p:timing>
+</p:sld>
+</file>
+
+<file path=ppt/slides/slide2.xml><?xml version="1.0" encoding="utf-8"?>
+<p:sld xmlns:a="http://schemas.openxmlformats.org/drawingml/2006/main" xmlns:r="http://schemas.openxmlformats.org/officeDocument/2006/relationships" xmlns:p="http://schemas.openxmlformats.org/presentationml/2006/main">
+  <p:cSld>
+    <p:spTree>
+      <p:nvGrpSpPr>
+        <p:cNvPr id="1" name=""/>
+        <p:cNvGrpSpPr/>
+        <p:nvPr/>
+      </p:nvGrpSpPr>
+      <p:grpSpPr>
+        <a:xfrm>
+          <a:off x="0" y="0"/>
+          <a:ext cx="0" cy="0"/>
+          <a:chOff x="0" y="0"/>
+          <a:chExt cx="0" cy="0"/>
+        </a:xfrm>
+      </p:grpSpPr>
+      <p:sp>
+        <p:nvSpPr>
+          <p:cNvPr id="7" name="Slide Number Placeholder 6"/>
+          <p:cNvSpPr>
+            <a:spLocks noGrp="1"/>
+          </p:cNvSpPr>
+          <p:nvPr>
+            <p:ph type="sldNum" sz="quarter" idx="12"/>
+          </p:nvPr>
+        </p:nvSpPr>
+        <p:spPr/>
+        <p:txBody>
+          <a:bodyPr/>
+          <a:lstStyle/>
+          <a:p>
+            <a:fld id="{B6F15528-21DE-4FAA-801E-634DDDAF4B2B}" type="slidenum">
+              <a:rPr lang="en-US" smtClean="0"/>
+              <a:pPr/>
+              <a:t>2</a:t>
+            </a:fld>
+            <a:endParaRPr lang="en-US"/>
+          </a:p>
+        </p:txBody>
+      </p:sp>
+      <p:pic>
+        <p:nvPicPr>
+          <p:cNvPr id="8" name="Picture 2" descr="C:\Users\noaht_000\Documents\ECE411\Practicum2014\Wiki Images\logo.bmp"/>
+          <p:cNvPicPr>
+            <a:picLocks noChangeAspect="1" noChangeArrowheads="1"/>
+          </p:cNvPicPr>
+          <p:nvPr/>
+        </p:nvPicPr>
+        <p:blipFill>
+          <a:blip r:embed="rId2" cstate="print">
+            <a:extLst>
+              <a:ext uri="{28A0092B-C50C-407E-A947-70E740481C1C}">
+                <a14:useLocalDpi xmlns:a14="http://schemas.microsoft.com/office/drawing/2010/main" val="0"/>
+              </a:ext>
+            </a:extLst>
+          </a:blip>
+          <a:srcRect/>
+          <a:stretch>
+            <a:fillRect/>
+          </a:stretch>
+        </p:blipFill>
+        <p:spPr bwMode="auto">
+          <a:xfrm>
+            <a:off x="7391399" y="199181"/>
+            <a:ext cx="1477731" cy="639019"/>
+          </a:xfrm>
+          <a:prstGeom prst="rect">
+            <a:avLst/>
+          </a:prstGeom>
+          <a:noFill/>
+          <a:extLst>
+            <a:ext uri="{909E8E84-426E-40DD-AFC4-6F175D3DCCD1}">
+              <a14:hiddenFill xmlns:a14="http://schemas.microsoft.com/office/drawing/2010/main">
+                <a:solidFill>
+                  <a:srgbClr val="FFFFFF"/>
+                </a:solidFill>
+              </a14:hiddenFill>
+            </a:ext>
+          </a:extLst>
+        </p:spPr>
+      </p:pic>
+      <p:cxnSp>
+        <p:nvCxnSpPr>
+          <p:cNvPr id="9" name="Straight Connector 8"/>
+          <p:cNvCxnSpPr/>
+          <p:nvPr/>
+        </p:nvCxnSpPr>
+        <p:spPr>
+          <a:xfrm flipH="1">
+            <a:off x="533398" y="762000"/>
+            <a:ext cx="6857999" cy="0"/>
+          </a:xfrm>
+          <a:prstGeom prst="line">
+            <a:avLst/>
+          </a:prstGeom>
+          <a:ln w="38100">
+            <a:solidFill>
+              <a:schemeClr val="tx1"/>
+            </a:solidFill>
+          </a:ln>
+        </p:spPr>
+        <p:style>
+          <a:lnRef idx="1">
+            <a:schemeClr val="accent1"/>
+          </a:lnRef>
+          <a:fillRef idx="0">
+            <a:schemeClr val="accent1"/>
+          </a:fillRef>
+          <a:effectRef idx="0">
+            <a:schemeClr val="accent1"/>
+          </a:effectRef>
+          <a:fontRef idx="minor">
+            <a:schemeClr val="tx1"/>
+          </a:fontRef>
+        </p:style>
+      </p:cxnSp>
+      <p:sp>
+        <p:nvSpPr>
+          <p:cNvPr id="2" name="Rectangle 1"/>
+          <p:cNvSpPr/>
+          <p:nvPr/>
+        </p:nvSpPr>
+        <p:spPr>
+          <a:xfrm>
+            <a:off x="533397" y="1066800"/>
+            <a:ext cx="8153403" cy="4146648"/>
+          </a:xfrm>
+          <a:prstGeom prst="rect">
+            <a:avLst/>
+          </a:prstGeom>
+        </p:spPr>
+        <p:txBody>
+          <a:bodyPr wrap="square">
+            <a:spAutoFit/>
+          </a:bodyPr>
+          <a:lstStyle/>
+          <a:p>
+            <a:pPr>
+              <a:lnSpc>
+                <a:spcPct val="107000"/>
+              </a:lnSpc>
+              <a:spcAft>
+                <a:spcPts val="800"/>
+              </a:spcAft>
+            </a:pPr>
+            <a:r>
+              <a:rPr lang="en-US" sz="2400" b="1" dirty="0" smtClean="0">
+                <a:latin typeface="Calibri" panose="020F0502020204030204" pitchFamily="34" charset="0"/>
+                <a:ea typeface="Calibri" panose="020F0502020204030204" pitchFamily="34" charset="0"/>
+                <a:cs typeface="Times New Roman" panose="02020603050405020304" pitchFamily="18" charset="0"/>
+              </a:rPr>
+              <a:t>Problem</a:t>
+            </a:r>
+            <a:endParaRPr lang="en-US" sz="2400" dirty="0" smtClean="0">
+              <a:latin typeface="Calibri" panose="020F0502020204030204" pitchFamily="34" charset="0"/>
+              <a:ea typeface="Calibri" panose="020F0502020204030204" pitchFamily="34" charset="0"/>
+              <a:cs typeface="Times New Roman" panose="02020603050405020304" pitchFamily="18" charset="0"/>
+            </a:endParaRPr>
+          </a:p>
+          <a:p>
+            <a:pPr marL="342900" marR="0" lvl="0" indent="-342900">
+              <a:lnSpc>
+                <a:spcPct val="107000"/>
+              </a:lnSpc>
+              <a:spcBef>
+                <a:spcPts val="0"/>
+              </a:spcBef>
+              <a:spcAft>
+                <a:spcPts val="0"/>
+              </a:spcAft>
+              <a:buFont typeface="Symbol" panose="05050102010706020507" pitchFamily="18" charset="2"/>
+              <a:buChar char=""/>
+            </a:pPr>
+            <a:r>
+              <a:rPr lang="en-US" sz="2400" dirty="0" smtClean="0">
+                <a:latin typeface="Calibri" panose="020F0502020204030204" pitchFamily="34" charset="0"/>
+                <a:ea typeface="Calibri" panose="020F0502020204030204" pitchFamily="34" charset="0"/>
+                <a:cs typeface="Times New Roman" panose="02020603050405020304" pitchFamily="18" charset="0"/>
+              </a:rPr>
+              <a:t>Limited </a:t>
+            </a:r>
+            <a:r>
+              <a:rPr lang="en-US" sz="2400" dirty="0">
+                <a:latin typeface="Calibri" panose="020F0502020204030204" pitchFamily="34" charset="0"/>
+                <a:ea typeface="Calibri" panose="020F0502020204030204" pitchFamily="34" charset="0"/>
+                <a:cs typeface="Times New Roman" panose="02020603050405020304" pitchFamily="18" charset="0"/>
+              </a:rPr>
+              <a:t>rear and blind spot visibility for motorcycle riders wearing full-faced helmets.</a:t>
+            </a:r>
+          </a:p>
+          <a:p>
+            <a:pPr marL="742950" marR="0" lvl="1" indent="-285750">
+              <a:lnSpc>
+                <a:spcPct val="107000"/>
+              </a:lnSpc>
+              <a:spcBef>
+                <a:spcPts val="0"/>
+              </a:spcBef>
+              <a:spcAft>
+                <a:spcPts val="0"/>
+              </a:spcAft>
+              <a:buFont typeface="Courier New" panose="02070309020205020404" pitchFamily="49" charset="0"/>
+              <a:buChar char="o"/>
+            </a:pPr>
+            <a:r>
+              <a:rPr lang="en-US" sz="2400" dirty="0">
+                <a:latin typeface="Calibri" panose="020F0502020204030204" pitchFamily="34" charset="0"/>
+                <a:ea typeface="Calibri" panose="020F0502020204030204" pitchFamily="34" charset="0"/>
+                <a:cs typeface="Times New Roman" panose="02020603050405020304" pitchFamily="18" charset="0"/>
+              </a:rPr>
+              <a:t>Turning head takes attention off the road in front</a:t>
+            </a:r>
+          </a:p>
+          <a:p>
+            <a:pPr marL="342900" marR="0" lvl="0" indent="-342900">
+              <a:lnSpc>
+                <a:spcPct val="107000"/>
+              </a:lnSpc>
+              <a:spcBef>
+                <a:spcPts val="0"/>
+              </a:spcBef>
+              <a:spcAft>
+                <a:spcPts val="0"/>
+              </a:spcAft>
+              <a:buFont typeface="Symbol" panose="05050102010706020507" pitchFamily="18" charset="2"/>
+              <a:buChar char=""/>
+            </a:pPr>
+            <a:r>
+              <a:rPr lang="en-US" sz="2400" dirty="0">
+                <a:latin typeface="Calibri" panose="020F0502020204030204" pitchFamily="34" charset="0"/>
+                <a:ea typeface="Calibri" panose="020F0502020204030204" pitchFamily="34" charset="0"/>
+                <a:cs typeface="Times New Roman" panose="02020603050405020304" pitchFamily="18" charset="0"/>
+              </a:rPr>
+              <a:t>Rearview mirrors are not always reliable or easy to see</a:t>
+            </a:r>
+          </a:p>
+          <a:p>
+            <a:pPr marL="742950" marR="0" lvl="1" indent="-285750">
+              <a:lnSpc>
+                <a:spcPct val="107000"/>
+              </a:lnSpc>
+              <a:spcBef>
+                <a:spcPts val="0"/>
+              </a:spcBef>
+              <a:spcAft>
+                <a:spcPts val="0"/>
+              </a:spcAft>
+              <a:buFont typeface="Courier New" panose="02070309020205020404" pitchFamily="49" charset="0"/>
+              <a:buChar char="o"/>
+            </a:pPr>
+            <a:r>
+              <a:rPr lang="en-US" sz="2400" dirty="0">
+                <a:latin typeface="Calibri" panose="020F0502020204030204" pitchFamily="34" charset="0"/>
+                <a:ea typeface="Calibri" panose="020F0502020204030204" pitchFamily="34" charset="0"/>
+                <a:cs typeface="Times New Roman" panose="02020603050405020304" pitchFamily="18" charset="0"/>
+              </a:rPr>
+              <a:t>Bar end mirrors</a:t>
+            </a:r>
+          </a:p>
+          <a:p>
+            <a:pPr marL="742950" marR="0" lvl="1" indent="-285750">
+              <a:lnSpc>
+                <a:spcPct val="107000"/>
+              </a:lnSpc>
+              <a:spcBef>
+                <a:spcPts val="0"/>
+              </a:spcBef>
+              <a:spcAft>
+                <a:spcPts val="0"/>
+              </a:spcAft>
+              <a:buFont typeface="Courier New" panose="02070309020205020404" pitchFamily="49" charset="0"/>
+              <a:buChar char="o"/>
+            </a:pPr>
+            <a:r>
+              <a:rPr lang="en-US" sz="2400" dirty="0">
+                <a:latin typeface="Calibri" panose="020F0502020204030204" pitchFamily="34" charset="0"/>
+                <a:ea typeface="Calibri" panose="020F0502020204030204" pitchFamily="34" charset="0"/>
+                <a:cs typeface="Times New Roman" panose="02020603050405020304" pitchFamily="18" charset="0"/>
+              </a:rPr>
+              <a:t>Vibration</a:t>
+            </a:r>
+          </a:p>
+          <a:p>
+            <a:pPr marL="342900" marR="0" lvl="0" indent="-342900">
+              <a:lnSpc>
+                <a:spcPct val="107000"/>
+              </a:lnSpc>
+              <a:spcBef>
+                <a:spcPts val="0"/>
+              </a:spcBef>
+              <a:spcAft>
+                <a:spcPts val="0"/>
+              </a:spcAft>
+              <a:buFont typeface="Symbol" panose="05050102010706020507" pitchFamily="18" charset="2"/>
+              <a:buChar char=""/>
+            </a:pPr>
+            <a:r>
+              <a:rPr lang="en-US" sz="2400" dirty="0">
+                <a:latin typeface="Calibri" panose="020F0502020204030204" pitchFamily="34" charset="0"/>
+                <a:ea typeface="Calibri" panose="020F0502020204030204" pitchFamily="34" charset="0"/>
+                <a:cs typeface="Times New Roman" panose="02020603050405020304" pitchFamily="18" charset="0"/>
+              </a:rPr>
+              <a:t>Safety and riding awareness</a:t>
+            </a:r>
+          </a:p>
+          <a:p>
+            <a:pPr marL="742950" marR="0" lvl="1" indent="-285750">
+              <a:lnSpc>
+                <a:spcPct val="107000"/>
+              </a:lnSpc>
+              <a:spcBef>
+                <a:spcPts val="0"/>
+              </a:spcBef>
+              <a:spcAft>
+                <a:spcPts val="0"/>
+              </a:spcAft>
+              <a:buFont typeface="Courier New" panose="02070309020205020404" pitchFamily="49" charset="0"/>
+              <a:buChar char="o"/>
+            </a:pPr>
+            <a:r>
+              <a:rPr lang="en-US" sz="2400" dirty="0">
+                <a:latin typeface="Calibri" panose="020F0502020204030204" pitchFamily="34" charset="0"/>
+                <a:ea typeface="Calibri" panose="020F0502020204030204" pitchFamily="34" charset="0"/>
+                <a:cs typeface="Times New Roman" panose="02020603050405020304" pitchFamily="18" charset="0"/>
+              </a:rPr>
+              <a:t>Lane positioning</a:t>
+            </a:r>
+          </a:p>
+          <a:p>
+            <a:pPr marL="742950" marR="0" lvl="1" indent="-285750">
+              <a:lnSpc>
+                <a:spcPct val="107000"/>
+              </a:lnSpc>
+              <a:spcBef>
+                <a:spcPts val="0"/>
+              </a:spcBef>
+              <a:spcAft>
+                <a:spcPts val="800"/>
+              </a:spcAft>
+              <a:buFont typeface="Courier New" panose="02070309020205020404" pitchFamily="49" charset="0"/>
+              <a:buChar char="o"/>
+            </a:pPr>
+            <a:r>
+              <a:rPr lang="en-US" sz="2400" dirty="0">
+                <a:latin typeface="Calibri" panose="020F0502020204030204" pitchFamily="34" charset="0"/>
+                <a:ea typeface="Calibri" panose="020F0502020204030204" pitchFamily="34" charset="0"/>
+                <a:cs typeface="Times New Roman" panose="02020603050405020304" pitchFamily="18" charset="0"/>
+              </a:rPr>
+              <a:t>Traffic density</a:t>
+            </a:r>
+            <a:endParaRPr lang="en-US" sz="2400" dirty="0">
+              <a:effectLst/>
+              <a:latin typeface="Calibri" panose="020F0502020204030204" pitchFamily="34" charset="0"/>
+              <a:ea typeface="Calibri" panose="020F0502020204030204" pitchFamily="34" charset="0"/>
+              <a:cs typeface="Times New Roman" panose="02020603050405020304" pitchFamily="18" charset="0"/>
+            </a:endParaRPr>
+          </a:p>
+        </p:txBody>
+      </p:sp>
+    </p:spTree>
+    <p:extLst>
+      <p:ext uri="{BB962C8B-B14F-4D97-AF65-F5344CB8AC3E}">
+        <p14:creationId xmlns:p14="http://schemas.microsoft.com/office/powerpoint/2010/main" val="2706470271"/>
+      </p:ext>
+    </p:extLst>
+  </p:cSld>
+  <p:clrMapOvr>
+    <a:masterClrMapping/>
+  </p:clrMapOvr>
+  <p:timing>
+    <p:tnLst>
+      <p:par>
+        <p:cTn id="1" dur="indefinite" restart="never" nodeType="tmRoot"/>
+      </p:par>
+    </p:tnLst>
+  </p:timing>
+</p:sld>
+</file>
+
+<file path=ppt/slides/slide3.xml><?xml version="1.0" encoding="utf-8"?>
+<p:sld xmlns:a="http://schemas.openxmlformats.org/drawingml/2006/main" xmlns:r="http://schemas.openxmlformats.org/officeDocument/2006/relationships" xmlns:p="http://schemas.openxmlformats.org/presentationml/2006/main">
+  <p:cSld>
+    <p:spTree>
+      <p:nvGrpSpPr>
+        <p:cNvPr id="1" name=""/>
+        <p:cNvGrpSpPr/>
+        <p:nvPr/>
+      </p:nvGrpSpPr>
+      <p:grpSpPr>
+        <a:xfrm>
+          <a:off x="0" y="0"/>
+          <a:ext cx="0" cy="0"/>
+          <a:chOff x="0" y="0"/>
+          <a:chExt cx="0" cy="0"/>
+        </a:xfrm>
+      </p:grpSpPr>
+      <p:sp>
+        <p:nvSpPr>
+          <p:cNvPr id="7" name="Slide Number Placeholder 6"/>
+          <p:cNvSpPr>
+            <a:spLocks noGrp="1"/>
+          </p:cNvSpPr>
+          <p:nvPr>
+            <p:ph type="sldNum" sz="quarter" idx="12"/>
+          </p:nvPr>
+        </p:nvSpPr>
+        <p:spPr/>
+        <p:txBody>
+          <a:bodyPr/>
+          <a:lstStyle/>
+          <a:p>
+            <a:fld id="{B6F15528-21DE-4FAA-801E-634DDDAF4B2B}" type="slidenum">
+              <a:rPr lang="en-US" smtClean="0"/>
+              <a:pPr/>
+              <a:t>3</a:t>
+            </a:fld>
+            <a:endParaRPr lang="en-US"/>
+          </a:p>
+        </p:txBody>
+      </p:sp>
+      <p:pic>
+        <p:nvPicPr>
+          <p:cNvPr id="8" name="Picture 2" descr="C:\Users\noaht_000\Documents\ECE411\Practicum2014\Wiki Images\logo.bmp"/>
+          <p:cNvPicPr>
+            <a:picLocks noChangeAspect="1" noChangeArrowheads="1"/>
+          </p:cNvPicPr>
+          <p:nvPr/>
+        </p:nvPicPr>
+        <p:blipFill>
+          <a:blip r:embed="rId2" cstate="print">
+            <a:extLst>
+              <a:ext uri="{28A0092B-C50C-407E-A947-70E740481C1C}">
+                <a14:useLocalDpi xmlns:a14="http://schemas.microsoft.com/office/drawing/2010/main" val="0"/>
+              </a:ext>
+            </a:extLst>
+          </a:blip>
+          <a:srcRect/>
+          <a:stretch>
+            <a:fillRect/>
+          </a:stretch>
+        </p:blipFill>
+        <p:spPr bwMode="auto">
+          <a:xfrm>
+            <a:off x="7391399" y="199181"/>
+            <a:ext cx="1477731" cy="639019"/>
+          </a:xfrm>
+          <a:prstGeom prst="rect">
+            <a:avLst/>
+          </a:prstGeom>
+          <a:noFill/>
+          <a:extLst>
+            <a:ext uri="{909E8E84-426E-40DD-AFC4-6F175D3DCCD1}">
+              <a14:hiddenFill xmlns:a14="http://schemas.microsoft.com/office/drawing/2010/main">
+                <a:solidFill>
+                  <a:srgbClr val="FFFFFF"/>
+                </a:solidFill>
+              </a14:hiddenFill>
+            </a:ext>
+          </a:extLst>
+        </p:spPr>
+      </p:pic>
+      <p:cxnSp>
+        <p:nvCxnSpPr>
+          <p:cNvPr id="9" name="Straight Connector 8"/>
+          <p:cNvCxnSpPr/>
+          <p:nvPr/>
+        </p:nvCxnSpPr>
+        <p:spPr>
+          <a:xfrm flipH="1">
+            <a:off x="533398" y="762000"/>
+            <a:ext cx="6857999" cy="0"/>
+          </a:xfrm>
+          <a:prstGeom prst="line">
+            <a:avLst/>
+          </a:prstGeom>
+          <a:ln w="38100">
+            <a:solidFill>
+              <a:schemeClr val="tx1"/>
+            </a:solidFill>
+          </a:ln>
+        </p:spPr>
+        <p:style>
+          <a:lnRef idx="1">
+            <a:schemeClr val="accent1"/>
+          </a:lnRef>
+          <a:fillRef idx="0">
+            <a:schemeClr val="accent1"/>
+          </a:fillRef>
+          <a:effectRef idx="0">
+            <a:schemeClr val="accent1"/>
+          </a:effectRef>
+          <a:fontRef idx="minor">
+            <a:schemeClr val="tx1"/>
+          </a:fontRef>
+        </p:style>
+      </p:cxnSp>
+      <p:sp>
+        <p:nvSpPr>
+          <p:cNvPr id="2" name="Rectangle 1"/>
+          <p:cNvSpPr/>
+          <p:nvPr/>
+        </p:nvSpPr>
+        <p:spPr>
+          <a:xfrm>
+            <a:off x="555006" y="1062363"/>
+            <a:ext cx="8131793" cy="5652830"/>
+          </a:xfrm>
+          <a:prstGeom prst="rect">
+            <a:avLst/>
+          </a:prstGeom>
+        </p:spPr>
+        <p:txBody>
+          <a:bodyPr wrap="square">
+            <a:spAutoFit/>
+          </a:bodyPr>
+          <a:lstStyle/>
+          <a:p>
+            <a:pPr>
+              <a:lnSpc>
+                <a:spcPct val="107000"/>
+              </a:lnSpc>
+              <a:spcAft>
+                <a:spcPts val="800"/>
+              </a:spcAft>
+            </a:pPr>
+            <a:r>
+              <a:rPr lang="en-US" sz="2400" b="1" dirty="0">
+                <a:latin typeface="Calibri" panose="020F0502020204030204" pitchFamily="34" charset="0"/>
+                <a:ea typeface="Calibri" panose="020F0502020204030204" pitchFamily="34" charset="0"/>
+                <a:cs typeface="Times New Roman" panose="02020603050405020304" pitchFamily="18" charset="0"/>
+              </a:rPr>
+              <a:t>Objective</a:t>
+            </a:r>
+            <a:endParaRPr lang="en-US" sz="2400" dirty="0">
+              <a:latin typeface="Calibri" panose="020F0502020204030204" pitchFamily="34" charset="0"/>
+              <a:ea typeface="Calibri" panose="020F0502020204030204" pitchFamily="34" charset="0"/>
+              <a:cs typeface="Times New Roman" panose="02020603050405020304" pitchFamily="18" charset="0"/>
+            </a:endParaRPr>
+          </a:p>
+          <a:p>
+            <a:pPr>
+              <a:lnSpc>
+                <a:spcPct val="107000"/>
+              </a:lnSpc>
+              <a:spcAft>
+                <a:spcPts val="800"/>
+              </a:spcAft>
+            </a:pPr>
+            <a:r>
+              <a:rPr lang="en-US" sz="2400" dirty="0" smtClean="0">
+                <a:latin typeface="Calibri" panose="020F0502020204030204" pitchFamily="34" charset="0"/>
+                <a:ea typeface="Calibri" panose="020F0502020204030204" pitchFamily="34" charset="0"/>
+                <a:cs typeface="Times New Roman" panose="02020603050405020304" pitchFamily="18" charset="0"/>
+              </a:rPr>
+              <a:t>A working prototype that will give visual indication of position of close proximity traffic to the rear and sides of the motorcycle behind the rider’s field of view.  A simple non-video display will lend an old-school vibe to appeal to vintage enthusiasts.</a:t>
+            </a:r>
+          </a:p>
+          <a:p>
+            <a:pPr>
+              <a:lnSpc>
+                <a:spcPct val="107000"/>
+              </a:lnSpc>
+              <a:spcAft>
+                <a:spcPts val="800"/>
+              </a:spcAft>
+            </a:pPr>
+            <a:endParaRPr lang="en-US" sz="2400" dirty="0" smtClean="0">
+              <a:latin typeface="Calibri" panose="020F0502020204030204" pitchFamily="34" charset="0"/>
+              <a:ea typeface="Calibri" panose="020F0502020204030204" pitchFamily="34" charset="0"/>
+              <a:cs typeface="Times New Roman" panose="02020603050405020304" pitchFamily="18" charset="0"/>
+            </a:endParaRPr>
+          </a:p>
+          <a:p>
+            <a:r>
+              <a:rPr lang="en-US" sz="2400" b="1" dirty="0" smtClean="0"/>
+              <a:t>Alternatives</a:t>
+            </a:r>
+            <a:endParaRPr lang="en-US" sz="2400" dirty="0" smtClean="0"/>
+          </a:p>
+          <a:p>
+            <a:pPr marL="342900" lvl="0" indent="-342900">
+              <a:buFont typeface="Arial" panose="020B0604020202020204" pitchFamily="34" charset="0"/>
+              <a:buChar char="•"/>
+            </a:pPr>
+            <a:r>
+              <a:rPr lang="en-US" sz="2400" dirty="0" err="1" smtClean="0"/>
+              <a:t>Reevu</a:t>
+            </a:r>
+            <a:r>
+              <a:rPr lang="en-US" sz="2400" dirty="0" smtClean="0"/>
+              <a:t> MSX-1 Rear-View Helmet - $399.99</a:t>
+            </a:r>
+          </a:p>
+          <a:p>
+            <a:pPr marL="800100" lvl="1" indent="-342900">
+              <a:buFont typeface="Arial" panose="020B0604020202020204" pitchFamily="34" charset="0"/>
+              <a:buChar char="•"/>
+            </a:pPr>
+            <a:r>
+              <a:rPr lang="en-US" sz="2400" dirty="0" smtClean="0"/>
+              <a:t>Internal rear-view mirror, works off rear-reflection</a:t>
+            </a:r>
+          </a:p>
+          <a:p>
+            <a:pPr marL="342900" lvl="0" indent="-342900">
+              <a:buFont typeface="Arial" panose="020B0604020202020204" pitchFamily="34" charset="0"/>
+              <a:buChar char="•"/>
+            </a:pPr>
+            <a:r>
+              <a:rPr lang="en-US" sz="2400" dirty="0" err="1" smtClean="0"/>
+              <a:t>Skully</a:t>
+            </a:r>
+            <a:r>
+              <a:rPr lang="en-US" sz="2400" dirty="0" smtClean="0"/>
+              <a:t> AR-1 Helmet - $1499</a:t>
+            </a:r>
+          </a:p>
+          <a:p>
+            <a:pPr marL="800100" lvl="1" indent="-342900">
+              <a:buFont typeface="Arial" panose="020B0604020202020204" pitchFamily="34" charset="0"/>
+              <a:buChar char="•"/>
+            </a:pPr>
+            <a:r>
+              <a:rPr lang="en-US" sz="2400" dirty="0" smtClean="0"/>
+              <a:t>Rear-view camera, internal HUD</a:t>
+            </a:r>
+          </a:p>
+          <a:p>
+            <a:pPr marL="342900" lvl="0" indent="-342900">
+              <a:buFont typeface="Arial" panose="020B0604020202020204" pitchFamily="34" charset="0"/>
+              <a:buChar char="•"/>
+            </a:pPr>
+            <a:r>
+              <a:rPr lang="en-US" sz="2400" dirty="0" smtClean="0"/>
+              <a:t>Lucky Bike </a:t>
+            </a:r>
+            <a:r>
+              <a:rPr lang="en-US" sz="2400" dirty="0" err="1" smtClean="0"/>
+              <a:t>Motorcyle</a:t>
+            </a:r>
+            <a:r>
+              <a:rPr lang="en-US" sz="2400" dirty="0" smtClean="0"/>
+              <a:t> Rear-View Camera System - $89</a:t>
+            </a:r>
+          </a:p>
+          <a:p>
+            <a:pPr marL="800100" lvl="1" indent="-342900">
+              <a:buFont typeface="Arial" panose="020B0604020202020204" pitchFamily="34" charset="0"/>
+              <a:buChar char="•"/>
+            </a:pPr>
+            <a:r>
+              <a:rPr lang="en-US" sz="2400" dirty="0" smtClean="0"/>
+              <a:t>4.3” Video display with night vision</a:t>
+            </a:r>
+          </a:p>
+          <a:p>
+            <a:pPr>
+              <a:lnSpc>
+                <a:spcPct val="107000"/>
+              </a:lnSpc>
+              <a:spcAft>
+                <a:spcPts val="800"/>
+              </a:spcAft>
+            </a:pPr>
+            <a:endParaRPr lang="en-US" dirty="0">
+              <a:effectLst/>
+              <a:latin typeface="Calibri" panose="020F0502020204030204" pitchFamily="34" charset="0"/>
+              <a:ea typeface="Calibri" panose="020F0502020204030204" pitchFamily="34" charset="0"/>
+              <a:cs typeface="Times New Roman" panose="02020603050405020304" pitchFamily="18" charset="0"/>
+            </a:endParaRPr>
+          </a:p>
+        </p:txBody>
+      </p:sp>
+    </p:spTree>
+    <p:extLst>
+      <p:ext uri="{BB962C8B-B14F-4D97-AF65-F5344CB8AC3E}">
+        <p14:creationId xmlns:p14="http://schemas.microsoft.com/office/powerpoint/2010/main" val="1664973044"/>
+      </p:ext>
+    </p:extLst>
+  </p:cSld>
+  <p:clrMapOvr>
+    <a:masterClrMapping/>
+  </p:clrMapOvr>
+  <p:timing>
+    <p:tnLst>
+      <p:par>
+        <p:cTn id="1" dur="indefinite" restart="never" nodeType="tmRoot"/>
+      </p:par>
+    </p:tnLst>
+  </p:timing>
+</p:sld>
+</file>
+
+<file path=ppt/slides/slide4.xml><?xml version="1.0" encoding="utf-8"?>
+<p:sld xmlns:a="http://schemas.openxmlformats.org/drawingml/2006/main" xmlns:r="http://schemas.openxmlformats.org/officeDocument/2006/relationships" xmlns:p="http://schemas.openxmlformats.org/presentationml/2006/main">
+  <p:cSld>
+    <p:spTree>
+      <p:nvGrpSpPr>
+        <p:cNvPr id="1" name=""/>
+        <p:cNvGrpSpPr/>
+        <p:nvPr/>
+      </p:nvGrpSpPr>
+      <p:grpSpPr>
+        <a:xfrm>
+          <a:off x="0" y="0"/>
+          <a:ext cx="0" cy="0"/>
+          <a:chOff x="0" y="0"/>
+          <a:chExt cx="0" cy="0"/>
+        </a:xfrm>
+      </p:grpSpPr>
+      <p:sp>
+        <p:nvSpPr>
+          <p:cNvPr id="7" name="Slide Number Placeholder 6"/>
+          <p:cNvSpPr>
+            <a:spLocks noGrp="1"/>
+          </p:cNvSpPr>
+          <p:nvPr>
+            <p:ph type="sldNum" sz="quarter" idx="12"/>
+          </p:nvPr>
+        </p:nvSpPr>
+        <p:spPr/>
+        <p:txBody>
+          <a:bodyPr/>
+          <a:lstStyle/>
+          <a:p>
+            <a:fld id="{B6F15528-21DE-4FAA-801E-634DDDAF4B2B}" type="slidenum">
+              <a:rPr lang="en-US" smtClean="0"/>
+              <a:pPr/>
+              <a:t>4</a:t>
+            </a:fld>
+            <a:endParaRPr lang="en-US"/>
+          </a:p>
+        </p:txBody>
+      </p:sp>
+      <p:pic>
+        <p:nvPicPr>
+          <p:cNvPr id="8" name="Picture 2" descr="C:\Users\noaht_000\Documents\ECE411\Practicum2014\Wiki Images\logo.bmp"/>
+          <p:cNvPicPr>
+            <a:picLocks noChangeAspect="1" noChangeArrowheads="1"/>
+          </p:cNvPicPr>
+          <p:nvPr/>
+        </p:nvPicPr>
+        <p:blipFill>
+          <a:blip r:embed="rId2" cstate="print">
+            <a:extLst>
+              <a:ext uri="{28A0092B-C50C-407E-A947-70E740481C1C}">
+                <a14:useLocalDpi xmlns:a14="http://schemas.microsoft.com/office/drawing/2010/main" val="0"/>
+              </a:ext>
+            </a:extLst>
+          </a:blip>
+          <a:srcRect/>
+          <a:stretch>
+            <a:fillRect/>
+          </a:stretch>
+        </p:blipFill>
+        <p:spPr bwMode="auto">
+          <a:xfrm>
+            <a:off x="7391399" y="199181"/>
+            <a:ext cx="1477731" cy="639019"/>
+          </a:xfrm>
+          <a:prstGeom prst="rect">
+            <a:avLst/>
+          </a:prstGeom>
+          <a:noFill/>
+          <a:extLst>
+            <a:ext uri="{909E8E84-426E-40DD-AFC4-6F175D3DCCD1}">
+              <a14:hiddenFill xmlns:a14="http://schemas.microsoft.com/office/drawing/2010/main">
+                <a:solidFill>
+                  <a:srgbClr val="FFFFFF"/>
+                </a:solidFill>
+              </a14:hiddenFill>
+            </a:ext>
+          </a:extLst>
+        </p:spPr>
+      </p:pic>
+      <p:cxnSp>
+        <p:nvCxnSpPr>
+          <p:cNvPr id="9" name="Straight Connector 8"/>
+          <p:cNvCxnSpPr/>
+          <p:nvPr/>
+        </p:nvCxnSpPr>
+        <p:spPr>
+          <a:xfrm flipH="1">
+            <a:off x="533398" y="762000"/>
+            <a:ext cx="6857999" cy="0"/>
+          </a:xfrm>
+          <a:prstGeom prst="line">
+            <a:avLst/>
+          </a:prstGeom>
+          <a:ln w="38100">
+            <a:solidFill>
+              <a:schemeClr val="tx1"/>
+            </a:solidFill>
+          </a:ln>
+        </p:spPr>
+        <p:style>
+          <a:lnRef idx="1">
+            <a:schemeClr val="accent1"/>
+          </a:lnRef>
+          <a:fillRef idx="0">
+            <a:schemeClr val="accent1"/>
+          </a:fillRef>
+          <a:effectRef idx="0">
+            <a:schemeClr val="accent1"/>
+          </a:effectRef>
+          <a:fontRef idx="minor">
+            <a:schemeClr val="tx1"/>
+          </a:fontRef>
+        </p:style>
+      </p:cxnSp>
+      <p:sp>
+        <p:nvSpPr>
+          <p:cNvPr id="3" name="Rectangle 2"/>
+          <p:cNvSpPr/>
+          <p:nvPr/>
+        </p:nvSpPr>
+        <p:spPr>
+          <a:xfrm>
+            <a:off x="524298" y="1003608"/>
+            <a:ext cx="8162501" cy="4367029"/>
+          </a:xfrm>
+          <a:prstGeom prst="rect">
+            <a:avLst/>
+          </a:prstGeom>
+        </p:spPr>
+        <p:txBody>
+          <a:bodyPr wrap="square">
+            <a:spAutoFit/>
+          </a:bodyPr>
+          <a:lstStyle/>
+          <a:p>
+            <a:pPr>
+              <a:lnSpc>
+                <a:spcPct val="107000"/>
+              </a:lnSpc>
+              <a:spcAft>
+                <a:spcPts val="800"/>
+              </a:spcAft>
+            </a:pPr>
+            <a:r>
+              <a:rPr lang="en-US" sz="2400" b="1" dirty="0">
+                <a:latin typeface="Calibri" panose="020F0502020204030204" pitchFamily="34" charset="0"/>
+                <a:ea typeface="Calibri" panose="020F0502020204030204" pitchFamily="34" charset="0"/>
+                <a:cs typeface="Times New Roman" panose="02020603050405020304" pitchFamily="18" charset="0"/>
+              </a:rPr>
+              <a:t>Requirements</a:t>
+            </a:r>
+            <a:endParaRPr lang="en-US" sz="2400" dirty="0">
+              <a:latin typeface="Calibri" panose="020F0502020204030204" pitchFamily="34" charset="0"/>
+              <a:ea typeface="Calibri" panose="020F0502020204030204" pitchFamily="34" charset="0"/>
+              <a:cs typeface="Times New Roman" panose="02020603050405020304" pitchFamily="18" charset="0"/>
+            </a:endParaRPr>
+          </a:p>
+          <a:p>
+            <a:pPr marL="342900" marR="0" lvl="0" indent="-342900">
+              <a:lnSpc>
+                <a:spcPct val="107000"/>
+              </a:lnSpc>
+              <a:spcBef>
+                <a:spcPts val="0"/>
+              </a:spcBef>
+              <a:spcAft>
+                <a:spcPts val="0"/>
+              </a:spcAft>
+              <a:buFont typeface="Symbol" panose="05050102010706020507" pitchFamily="18" charset="2"/>
+              <a:buChar char=""/>
+            </a:pPr>
+            <a:r>
+              <a:rPr lang="en-US" sz="2400" dirty="0">
+                <a:latin typeface="Calibri" panose="020F0502020204030204" pitchFamily="34" charset="0"/>
+                <a:ea typeface="Calibri" panose="020F0502020204030204" pitchFamily="34" charset="0"/>
+                <a:cs typeface="Times New Roman" panose="02020603050405020304" pitchFamily="18" charset="0"/>
+              </a:rPr>
+              <a:t>Easy to use</a:t>
+            </a:r>
+          </a:p>
+          <a:p>
+            <a:pPr marL="342900" marR="0" lvl="0" indent="-342900">
+              <a:lnSpc>
+                <a:spcPct val="107000"/>
+              </a:lnSpc>
+              <a:spcBef>
+                <a:spcPts val="0"/>
+              </a:spcBef>
+              <a:spcAft>
+                <a:spcPts val="800"/>
+              </a:spcAft>
+              <a:buFont typeface="Symbol" panose="05050102010706020507" pitchFamily="18" charset="2"/>
+              <a:buChar char=""/>
+            </a:pPr>
+            <a:r>
+              <a:rPr lang="en-US" sz="2400" dirty="0" smtClean="0">
+                <a:effectLst/>
+                <a:latin typeface="Calibri" panose="020F0502020204030204" pitchFamily="34" charset="0"/>
+                <a:ea typeface="Calibri" panose="020F0502020204030204" pitchFamily="34" charset="0"/>
+                <a:cs typeface="Times New Roman" panose="02020603050405020304" pitchFamily="18" charset="0"/>
+              </a:rPr>
+              <a:t>Real-time visual indication of distance to rear and sides</a:t>
+            </a:r>
+          </a:p>
+          <a:p>
+            <a:pPr marL="342900" marR="0" lvl="0" indent="-342900">
+              <a:lnSpc>
+                <a:spcPct val="107000"/>
+              </a:lnSpc>
+              <a:spcBef>
+                <a:spcPts val="0"/>
+              </a:spcBef>
+              <a:spcAft>
+                <a:spcPts val="800"/>
+              </a:spcAft>
+              <a:buFont typeface="Symbol" panose="05050102010706020507" pitchFamily="18" charset="2"/>
+              <a:buChar char=""/>
+            </a:pPr>
+            <a:r>
+              <a:rPr lang="en-US" sz="2400" dirty="0" smtClean="0">
+                <a:latin typeface="Calibri" panose="020F0502020204030204" pitchFamily="34" charset="0"/>
+                <a:ea typeface="Calibri" panose="020F0502020204030204" pitchFamily="34" charset="0"/>
+                <a:cs typeface="Times New Roman" panose="02020603050405020304" pitchFamily="18" charset="0"/>
+              </a:rPr>
+              <a:t>Three zones</a:t>
+            </a:r>
+          </a:p>
+          <a:p>
+            <a:pPr marL="342900" marR="0" lvl="0" indent="-342900">
+              <a:lnSpc>
+                <a:spcPct val="107000"/>
+              </a:lnSpc>
+              <a:spcBef>
+                <a:spcPts val="0"/>
+              </a:spcBef>
+              <a:spcAft>
+                <a:spcPts val="800"/>
+              </a:spcAft>
+              <a:buFont typeface="Symbol" panose="05050102010706020507" pitchFamily="18" charset="2"/>
+              <a:buChar char=""/>
+            </a:pPr>
+            <a:r>
+              <a:rPr lang="en-US" sz="2400" dirty="0" smtClean="0">
+                <a:latin typeface="Calibri" panose="020F0502020204030204" pitchFamily="34" charset="0"/>
+                <a:ea typeface="Calibri" panose="020F0502020204030204" pitchFamily="34" charset="0"/>
+                <a:cs typeface="Times New Roman" panose="02020603050405020304" pitchFamily="18" charset="0"/>
+              </a:rPr>
+              <a:t>0-5 </a:t>
+            </a:r>
+            <a:r>
+              <a:rPr lang="en-US" sz="2400" dirty="0" err="1" smtClean="0">
+                <a:latin typeface="Calibri" panose="020F0502020204030204" pitchFamily="34" charset="0"/>
+                <a:ea typeface="Calibri" panose="020F0502020204030204" pitchFamily="34" charset="0"/>
+                <a:cs typeface="Times New Roman" panose="02020603050405020304" pitchFamily="18" charset="0"/>
+              </a:rPr>
+              <a:t>ft</a:t>
+            </a:r>
+            <a:r>
+              <a:rPr lang="en-US" sz="2400" dirty="0" smtClean="0">
+                <a:latin typeface="Calibri" panose="020F0502020204030204" pitchFamily="34" charset="0"/>
+                <a:ea typeface="Calibri" panose="020F0502020204030204" pitchFamily="34" charset="0"/>
+                <a:cs typeface="Times New Roman" panose="02020603050405020304" pitchFamily="18" charset="0"/>
+              </a:rPr>
+              <a:t>, 5-10 </a:t>
+            </a:r>
+            <a:r>
+              <a:rPr lang="en-US" sz="2400" dirty="0" err="1" smtClean="0">
+                <a:latin typeface="Calibri" panose="020F0502020204030204" pitchFamily="34" charset="0"/>
+                <a:ea typeface="Calibri" panose="020F0502020204030204" pitchFamily="34" charset="0"/>
+                <a:cs typeface="Times New Roman" panose="02020603050405020304" pitchFamily="18" charset="0"/>
+              </a:rPr>
+              <a:t>ft</a:t>
+            </a:r>
+            <a:r>
+              <a:rPr lang="en-US" sz="2400" dirty="0" smtClean="0">
+                <a:latin typeface="Calibri" panose="020F0502020204030204" pitchFamily="34" charset="0"/>
+                <a:ea typeface="Calibri" panose="020F0502020204030204" pitchFamily="34" charset="0"/>
+                <a:cs typeface="Times New Roman" panose="02020603050405020304" pitchFamily="18" charset="0"/>
+              </a:rPr>
+              <a:t>, 10-15 </a:t>
+            </a:r>
+            <a:r>
+              <a:rPr lang="en-US" sz="2400" dirty="0" err="1" smtClean="0">
+                <a:latin typeface="Calibri" panose="020F0502020204030204" pitchFamily="34" charset="0"/>
+                <a:ea typeface="Calibri" panose="020F0502020204030204" pitchFamily="34" charset="0"/>
+                <a:cs typeface="Times New Roman" panose="02020603050405020304" pitchFamily="18" charset="0"/>
+              </a:rPr>
+              <a:t>ft</a:t>
+            </a:r>
+            <a:endParaRPr lang="en-US" sz="2400" dirty="0" smtClean="0">
+              <a:latin typeface="Calibri" panose="020F0502020204030204" pitchFamily="34" charset="0"/>
+              <a:ea typeface="Calibri" panose="020F0502020204030204" pitchFamily="34" charset="0"/>
+              <a:cs typeface="Times New Roman" panose="02020603050405020304" pitchFamily="18" charset="0"/>
+            </a:endParaRPr>
+          </a:p>
+          <a:p>
+            <a:pPr marL="342900" indent="-342900">
+              <a:lnSpc>
+                <a:spcPct val="107000"/>
+              </a:lnSpc>
+              <a:spcAft>
+                <a:spcPts val="800"/>
+              </a:spcAft>
+              <a:buFont typeface="Symbol" panose="05050102010706020507" pitchFamily="18" charset="2"/>
+              <a:buChar char=""/>
+            </a:pPr>
+            <a:r>
+              <a:rPr lang="en-US" sz="2400" dirty="0" smtClean="0">
+                <a:effectLst/>
+                <a:latin typeface="Calibri" panose="020F0502020204030204" pitchFamily="34" charset="0"/>
+                <a:ea typeface="Calibri" panose="020F0502020204030204" pitchFamily="34" charset="0"/>
+                <a:cs typeface="Times New Roman" panose="02020603050405020304" pitchFamily="18" charset="0"/>
+              </a:rPr>
+              <a:t>Weather resistant</a:t>
+            </a:r>
+          </a:p>
+          <a:p>
+            <a:pPr marL="342900" indent="-342900">
+              <a:lnSpc>
+                <a:spcPct val="107000"/>
+              </a:lnSpc>
+              <a:spcAft>
+                <a:spcPts val="800"/>
+              </a:spcAft>
+              <a:buFont typeface="Symbol" panose="05050102010706020507" pitchFamily="18" charset="2"/>
+              <a:buChar char=""/>
+            </a:pPr>
+            <a:r>
+              <a:rPr lang="en-US" sz="2400" dirty="0" smtClean="0">
+                <a:latin typeface="Calibri" panose="020F0502020204030204" pitchFamily="34" charset="0"/>
+                <a:ea typeface="Calibri" panose="020F0502020204030204" pitchFamily="34" charset="0"/>
+                <a:cs typeface="Times New Roman" panose="02020603050405020304" pitchFamily="18" charset="0"/>
+              </a:rPr>
+              <a:t>Battery powered</a:t>
+            </a:r>
+          </a:p>
+          <a:p>
+            <a:pPr marL="342900" indent="-342900">
+              <a:lnSpc>
+                <a:spcPct val="107000"/>
+              </a:lnSpc>
+              <a:spcAft>
+                <a:spcPts val="800"/>
+              </a:spcAft>
+              <a:buFont typeface="Symbol" panose="05050102010706020507" pitchFamily="18" charset="2"/>
+              <a:buChar char=""/>
+            </a:pPr>
+            <a:r>
+              <a:rPr lang="en-US" sz="2400" dirty="0" smtClean="0">
+                <a:latin typeface="Calibri" panose="020F0502020204030204" pitchFamily="34" charset="0"/>
+                <a:ea typeface="Calibri" panose="020F0502020204030204" pitchFamily="34" charset="0"/>
+                <a:cs typeface="Times New Roman" panose="02020603050405020304" pitchFamily="18" charset="0"/>
+              </a:rPr>
+              <a:t>Bright enough for sunlit conditions.	</a:t>
+            </a:r>
+          </a:p>
+          <a:p>
+            <a:pPr marL="342900" indent="-342900">
+              <a:lnSpc>
+                <a:spcPct val="107000"/>
+              </a:lnSpc>
+              <a:spcAft>
+                <a:spcPts val="800"/>
+              </a:spcAft>
+              <a:buFont typeface="Symbol" panose="05050102010706020507" pitchFamily="18" charset="2"/>
+              <a:buChar char=""/>
+            </a:pPr>
+            <a:r>
+              <a:rPr lang="en-US" sz="2400" dirty="0" smtClean="0">
+                <a:latin typeface="Calibri" panose="020F0502020204030204" pitchFamily="34" charset="0"/>
+                <a:ea typeface="Calibri" panose="020F0502020204030204" pitchFamily="34" charset="0"/>
+                <a:cs typeface="Times New Roman" panose="02020603050405020304" pitchFamily="18" charset="0"/>
+              </a:rPr>
+              <a:t>Low profile and easily mounted</a:t>
+            </a:r>
+          </a:p>
+        </p:txBody>
+      </p:sp>
+    </p:spTree>
+    <p:extLst>
+      <p:ext uri="{BB962C8B-B14F-4D97-AF65-F5344CB8AC3E}">
+        <p14:creationId xmlns:p14="http://schemas.microsoft.com/office/powerpoint/2010/main" val="2585547098"/>
+      </p:ext>
+    </p:extLst>
+  </p:cSld>
+  <p:clrMapOvr>
+    <a:masterClrMapping/>
+  </p:clrMapOvr>
+  <p:timing>
+    <p:tnLst>
+      <p:par>
+        <p:cTn id="1" dur="indefinite" restart="never" nodeType="tmRoot"/>
+      </p:par>
+    </p:tnLst>
+  </p:timing>
+</p:sld>
+</file>
+
+<file path=ppt/slides/slide5.xml><?xml version="1.0" encoding="utf-8"?>
+<p:sld xmlns:a="http://schemas.openxmlformats.org/drawingml/2006/main" xmlns:r="http://schemas.openxmlformats.org/officeDocument/2006/relationships" xmlns:p="http://schemas.openxmlformats.org/presentationml/2006/main">
+  <p:cSld>
+    <p:spTree>
+      <p:nvGrpSpPr>
+        <p:cNvPr id="1" name=""/>
+        <p:cNvGrpSpPr/>
+        <p:nvPr/>
+      </p:nvGrpSpPr>
+      <p:grpSpPr>
+        <a:xfrm>
+          <a:off x="0" y="0"/>
+          <a:ext cx="0" cy="0"/>
+          <a:chOff x="0" y="0"/>
+          <a:chExt cx="0" cy="0"/>
+        </a:xfrm>
+      </p:grpSpPr>
+      <p:sp>
+        <p:nvSpPr>
+          <p:cNvPr id="7" name="Slide Number Placeholder 6"/>
+          <p:cNvSpPr>
+            <a:spLocks noGrp="1"/>
+          </p:cNvSpPr>
+          <p:nvPr>
+            <p:ph type="sldNum" sz="quarter" idx="12"/>
+          </p:nvPr>
+        </p:nvSpPr>
+        <p:spPr/>
+        <p:txBody>
+          <a:bodyPr/>
+          <a:lstStyle/>
+          <a:p>
+            <a:fld id="{B6F15528-21DE-4FAA-801E-634DDDAF4B2B}" type="slidenum">
+              <a:rPr lang="en-US" smtClean="0"/>
+              <a:pPr/>
+              <a:t>5</a:t>
+            </a:fld>
+            <a:endParaRPr lang="en-US"/>
+          </a:p>
+        </p:txBody>
+      </p:sp>
+      <p:pic>
+        <p:nvPicPr>
+          <p:cNvPr id="8" name="Picture 2" descr="C:\Users\noaht_000\Documents\ECE411\Practicum2014\Wiki Images\logo.bmp"/>
+          <p:cNvPicPr>
+            <a:picLocks noChangeAspect="1" noChangeArrowheads="1"/>
+          </p:cNvPicPr>
+          <p:nvPr/>
+        </p:nvPicPr>
+        <p:blipFill>
+          <a:blip r:embed="rId2" cstate="print">
+            <a:extLst>
+              <a:ext uri="{28A0092B-C50C-407E-A947-70E740481C1C}">
+                <a14:useLocalDpi xmlns:a14="http://schemas.microsoft.com/office/drawing/2010/main" val="0"/>
+              </a:ext>
+            </a:extLst>
+          </a:blip>
+          <a:srcRect/>
+          <a:stretch>
+            <a:fillRect/>
+          </a:stretch>
+        </p:blipFill>
+        <p:spPr bwMode="auto">
+          <a:xfrm>
+            <a:off x="7391399" y="199181"/>
+            <a:ext cx="1477731" cy="639019"/>
+          </a:xfrm>
+          <a:prstGeom prst="rect">
+            <a:avLst/>
+          </a:prstGeom>
+          <a:noFill/>
+          <a:extLst>
+            <a:ext uri="{909E8E84-426E-40DD-AFC4-6F175D3DCCD1}">
+              <a14:hiddenFill xmlns:a14="http://schemas.microsoft.com/office/drawing/2010/main">
+                <a:solidFill>
+                  <a:srgbClr val="FFFFFF"/>
+                </a:solidFill>
+              </a14:hiddenFill>
+            </a:ext>
+          </a:extLst>
+        </p:spPr>
+      </p:pic>
+      <p:cxnSp>
+        <p:nvCxnSpPr>
+          <p:cNvPr id="9" name="Straight Connector 8"/>
+          <p:cNvCxnSpPr/>
+          <p:nvPr/>
+        </p:nvCxnSpPr>
+        <p:spPr>
+          <a:xfrm flipH="1">
+            <a:off x="533398" y="762000"/>
+            <a:ext cx="6857999" cy="0"/>
+          </a:xfrm>
+          <a:prstGeom prst="line">
+            <a:avLst/>
+          </a:prstGeom>
+          <a:ln w="38100">
+            <a:solidFill>
+              <a:schemeClr val="tx1"/>
+            </a:solidFill>
+          </a:ln>
+        </p:spPr>
+        <p:style>
+          <a:lnRef idx="1">
+            <a:schemeClr val="accent1"/>
+          </a:lnRef>
+          <a:fillRef idx="0">
+            <a:schemeClr val="accent1"/>
+          </a:fillRef>
+          <a:effectRef idx="0">
+            <a:schemeClr val="accent1"/>
+          </a:effectRef>
+          <a:fontRef idx="minor">
+            <a:schemeClr val="tx1"/>
+          </a:fontRef>
+        </p:style>
+      </p:cxnSp>
+      <p:sp>
+        <p:nvSpPr>
+          <p:cNvPr id="2" name="Rectangle 1"/>
+          <p:cNvSpPr/>
+          <p:nvPr/>
+        </p:nvSpPr>
+        <p:spPr>
+          <a:xfrm>
+            <a:off x="533398" y="990600"/>
+            <a:ext cx="5057776" cy="4659609"/>
+          </a:xfrm>
+          <a:prstGeom prst="rect">
+            <a:avLst/>
+          </a:prstGeom>
+        </p:spPr>
+        <p:txBody>
+          <a:bodyPr wrap="square">
+            <a:spAutoFit/>
+          </a:bodyPr>
+          <a:lstStyle/>
+          <a:p>
+            <a:pPr>
+              <a:lnSpc>
+                <a:spcPct val="107000"/>
+              </a:lnSpc>
+              <a:spcAft>
+                <a:spcPts val="800"/>
+              </a:spcAft>
+            </a:pPr>
+            <a:r>
+              <a:rPr lang="en-US" sz="2400" b="1" dirty="0" smtClean="0">
+                <a:latin typeface="Calibri" panose="020F0502020204030204" pitchFamily="34" charset="0"/>
+                <a:ea typeface="Calibri" panose="020F0502020204030204" pitchFamily="34" charset="0"/>
+                <a:cs typeface="Times New Roman" panose="02020603050405020304" pitchFamily="18" charset="0"/>
+              </a:rPr>
+              <a:t>Operation</a:t>
+            </a:r>
+          </a:p>
+          <a:p>
+            <a:pPr>
+              <a:lnSpc>
+                <a:spcPct val="107000"/>
+              </a:lnSpc>
+              <a:spcAft>
+                <a:spcPts val="800"/>
+              </a:spcAft>
+            </a:pPr>
+            <a:r>
+              <a:rPr lang="en-US" sz="2400" u="sng" dirty="0" smtClean="0">
+                <a:latin typeface="Calibri" panose="020F0502020204030204" pitchFamily="34" charset="0"/>
+                <a:cs typeface="Times New Roman" panose="02020603050405020304" pitchFamily="18" charset="0"/>
+              </a:rPr>
+              <a:t>Ultrasonic sensors </a:t>
+            </a:r>
+          </a:p>
+          <a:p>
+            <a:pPr marL="342900" indent="-342900">
+              <a:lnSpc>
+                <a:spcPct val="107000"/>
+              </a:lnSpc>
+              <a:spcAft>
+                <a:spcPts val="800"/>
+              </a:spcAft>
+              <a:buFont typeface="Arial" panose="020B0604020202020204" pitchFamily="34" charset="0"/>
+              <a:buChar char="•"/>
+            </a:pPr>
+            <a:r>
+              <a:rPr lang="en-US" sz="2400" dirty="0" smtClean="0">
+                <a:latin typeface="Calibri" panose="020F0502020204030204" pitchFamily="34" charset="0"/>
+                <a:cs typeface="Times New Roman" panose="02020603050405020304" pitchFamily="18" charset="0"/>
+              </a:rPr>
+              <a:t>HC-SR04</a:t>
+            </a:r>
+          </a:p>
+          <a:p>
+            <a:pPr marL="342900" indent="-342900">
+              <a:lnSpc>
+                <a:spcPct val="107000"/>
+              </a:lnSpc>
+              <a:spcAft>
+                <a:spcPts val="800"/>
+              </a:spcAft>
+              <a:buFont typeface="Arial" panose="020B0604020202020204" pitchFamily="34" charset="0"/>
+              <a:buChar char="•"/>
+            </a:pPr>
+            <a:r>
+              <a:rPr lang="en-US" sz="2400" dirty="0" smtClean="0">
+                <a:latin typeface="Calibri" panose="020F0502020204030204" pitchFamily="34" charset="0"/>
+                <a:cs typeface="Times New Roman" panose="02020603050405020304" pitchFamily="18" charset="0"/>
+              </a:rPr>
+              <a:t>Send and receive series of pulses when triggered</a:t>
+            </a:r>
+          </a:p>
+          <a:p>
+            <a:pPr marL="342900" indent="-342900">
+              <a:lnSpc>
+                <a:spcPct val="107000"/>
+              </a:lnSpc>
+              <a:spcAft>
+                <a:spcPts val="800"/>
+              </a:spcAft>
+              <a:buFont typeface="Arial" panose="020B0604020202020204" pitchFamily="34" charset="0"/>
+              <a:buChar char="•"/>
+            </a:pPr>
+            <a:r>
+              <a:rPr lang="en-US" sz="2400" dirty="0" smtClean="0">
+                <a:latin typeface="Calibri" panose="020F0502020204030204" pitchFamily="34" charset="0"/>
+                <a:cs typeface="Times New Roman" panose="02020603050405020304" pitchFamily="18" charset="0"/>
+              </a:rPr>
+              <a:t>Time between </a:t>
+            </a:r>
+            <a:r>
+              <a:rPr lang="en-US" sz="2400" dirty="0" err="1" smtClean="0">
+                <a:latin typeface="Calibri" panose="020F0502020204030204" pitchFamily="34" charset="0"/>
+                <a:cs typeface="Times New Roman" panose="02020603050405020304" pitchFamily="18" charset="0"/>
+              </a:rPr>
+              <a:t>tx</a:t>
+            </a:r>
+            <a:r>
+              <a:rPr lang="en-US" sz="2400" dirty="0" smtClean="0">
+                <a:latin typeface="Calibri" panose="020F0502020204030204" pitchFamily="34" charset="0"/>
+                <a:cs typeface="Times New Roman" panose="02020603050405020304" pitchFamily="18" charset="0"/>
+              </a:rPr>
+              <a:t> and </a:t>
+            </a:r>
+            <a:r>
+              <a:rPr lang="en-US" sz="2400" dirty="0" err="1" smtClean="0">
+                <a:latin typeface="Calibri" panose="020F0502020204030204" pitchFamily="34" charset="0"/>
+                <a:cs typeface="Times New Roman" panose="02020603050405020304" pitchFamily="18" charset="0"/>
+              </a:rPr>
+              <a:t>rx</a:t>
+            </a:r>
+            <a:r>
+              <a:rPr lang="en-US" sz="2400" dirty="0" smtClean="0">
+                <a:latin typeface="Calibri" panose="020F0502020204030204" pitchFamily="34" charset="0"/>
+                <a:cs typeface="Times New Roman" panose="02020603050405020304" pitchFamily="18" charset="0"/>
+              </a:rPr>
+              <a:t> passed as logic high</a:t>
+            </a:r>
+          </a:p>
+          <a:p>
+            <a:pPr marL="342900" indent="-342900">
+              <a:lnSpc>
+                <a:spcPct val="107000"/>
+              </a:lnSpc>
+              <a:spcAft>
+                <a:spcPts val="800"/>
+              </a:spcAft>
+              <a:buFont typeface="Arial" panose="020B0604020202020204" pitchFamily="34" charset="0"/>
+              <a:buChar char="•"/>
+            </a:pPr>
+            <a:r>
+              <a:rPr lang="en-US" sz="2400" dirty="0" smtClean="0">
+                <a:latin typeface="Calibri" panose="020F0502020204030204" pitchFamily="34" charset="0"/>
+                <a:cs typeface="Times New Roman" panose="02020603050405020304" pitchFamily="18" charset="0"/>
+              </a:rPr>
+              <a:t>Length of logic high tells timing to microprocessor</a:t>
+            </a:r>
+          </a:p>
+          <a:p>
+            <a:pPr marL="342900" indent="-342900">
+              <a:lnSpc>
+                <a:spcPct val="107000"/>
+              </a:lnSpc>
+              <a:spcAft>
+                <a:spcPts val="800"/>
+              </a:spcAft>
+              <a:buFont typeface="Arial" panose="020B0604020202020204" pitchFamily="34" charset="0"/>
+              <a:buChar char="•"/>
+            </a:pPr>
+            <a:r>
+              <a:rPr lang="en-US" sz="2400" dirty="0" smtClean="0">
+                <a:latin typeface="Calibri" panose="020F0502020204030204" pitchFamily="34" charset="0"/>
+                <a:cs typeface="Times New Roman" panose="02020603050405020304" pitchFamily="18" charset="0"/>
+              </a:rPr>
+              <a:t>Compatible with Arduino IDE</a:t>
+            </a:r>
+          </a:p>
+        </p:txBody>
+      </p:sp>
+      <p:pic>
+        <p:nvPicPr>
+          <p:cNvPr id="4" name="Picture 3"/>
+          <p:cNvPicPr>
+            <a:picLocks noChangeAspect="1"/>
+          </p:cNvPicPr>
+          <p:nvPr/>
+        </p:nvPicPr>
+        <p:blipFill>
+          <a:blip r:embed="rId3">
+            <a:extLst>
+              <a:ext uri="{28A0092B-C50C-407E-A947-70E740481C1C}">
+                <a14:useLocalDpi xmlns:a14="http://schemas.microsoft.com/office/drawing/2010/main" val="0"/>
+              </a:ext>
+            </a:extLst>
+          </a:blip>
+          <a:stretch>
+            <a:fillRect/>
+          </a:stretch>
+        </p:blipFill>
+        <p:spPr>
+          <a:xfrm>
+            <a:off x="5567434" y="2755900"/>
+            <a:ext cx="3340100" cy="3340100"/>
+          </a:xfrm>
+          <a:prstGeom prst="rect">
+            <a:avLst/>
+          </a:prstGeom>
+        </p:spPr>
+      </p:pic>
+    </p:spTree>
+    <p:extLst>
+      <p:ext uri="{BB962C8B-B14F-4D97-AF65-F5344CB8AC3E}">
+        <p14:creationId xmlns:p14="http://schemas.microsoft.com/office/powerpoint/2010/main" val="3828577778"/>
+      </p:ext>
+    </p:extLst>
+  </p:cSld>
+  <p:clrMapOvr>
+    <a:masterClrMapping/>
+  </p:clrMapOvr>
+  <p:timing>
+    <p:tnLst>
+      <p:par>
+        <p:cTn id="1" dur="indefinite" restart="never" nodeType="tmRoot"/>
+      </p:par>
+    </p:tnLst>
+  </p:timing>
+</p:sld>
+</file>
+
+<file path=ppt/slides/slide6.xml><?xml version="1.0" encoding="utf-8"?>
+<p:sld xmlns:a="http://schemas.openxmlformats.org/drawingml/2006/main" xmlns:r="http://schemas.openxmlformats.org/officeDocument/2006/relationships" xmlns:p="http://schemas.openxmlformats.org/presentationml/2006/main">
+  <p:cSld>
+    <p:spTree>
+      <p:nvGrpSpPr>
+        <p:cNvPr id="1" name=""/>
+        <p:cNvGrpSpPr/>
+        <p:nvPr/>
+      </p:nvGrpSpPr>
+      <p:grpSpPr>
+        <a:xfrm>
+          <a:off x="0" y="0"/>
+          <a:ext cx="0" cy="0"/>
+          <a:chOff x="0" y="0"/>
+          <a:chExt cx="0" cy="0"/>
+        </a:xfrm>
+      </p:grpSpPr>
+      <p:sp>
+        <p:nvSpPr>
+          <p:cNvPr id="7" name="Slide Number Placeholder 6"/>
+          <p:cNvSpPr>
+            <a:spLocks noGrp="1"/>
+          </p:cNvSpPr>
+          <p:nvPr>
+            <p:ph type="sldNum" sz="quarter" idx="12"/>
+          </p:nvPr>
+        </p:nvSpPr>
+        <p:spPr/>
+        <p:txBody>
+          <a:bodyPr/>
+          <a:lstStyle/>
+          <a:p>
+            <a:fld id="{B6F15528-21DE-4FAA-801E-634DDDAF4B2B}" type="slidenum">
+              <a:rPr lang="en-US" smtClean="0"/>
+              <a:pPr/>
+              <a:t>6</a:t>
+            </a:fld>
+            <a:endParaRPr lang="en-US"/>
+          </a:p>
+        </p:txBody>
+      </p:sp>
+      <p:pic>
+        <p:nvPicPr>
+          <p:cNvPr id="8" name="Picture 2" descr="C:\Users\noaht_000\Documents\ECE411\Practicum2014\Wiki Images\logo.bmp"/>
+          <p:cNvPicPr>
+            <a:picLocks noChangeAspect="1" noChangeArrowheads="1"/>
+          </p:cNvPicPr>
+          <p:nvPr/>
+        </p:nvPicPr>
+        <p:blipFill>
+          <a:blip r:embed="rId2" cstate="print">
+            <a:extLst>
+              <a:ext uri="{28A0092B-C50C-407E-A947-70E740481C1C}">
+                <a14:useLocalDpi xmlns:a14="http://schemas.microsoft.com/office/drawing/2010/main" val="0"/>
+              </a:ext>
+            </a:extLst>
+          </a:blip>
+          <a:srcRect/>
+          <a:stretch>
+            <a:fillRect/>
+          </a:stretch>
+        </p:blipFill>
+        <p:spPr bwMode="auto">
+          <a:xfrm>
+            <a:off x="7391399" y="199181"/>
+            <a:ext cx="1477731" cy="639019"/>
+          </a:xfrm>
+          <a:prstGeom prst="rect">
+            <a:avLst/>
+          </a:prstGeom>
+          <a:noFill/>
+          <a:extLst>
+            <a:ext uri="{909E8E84-426E-40DD-AFC4-6F175D3DCCD1}">
+              <a14:hiddenFill xmlns:a14="http://schemas.microsoft.com/office/drawing/2010/main">
+                <a:solidFill>
+                  <a:srgbClr val="FFFFFF"/>
+                </a:solidFill>
+              </a14:hiddenFill>
+            </a:ext>
+          </a:extLst>
+        </p:spPr>
+      </p:pic>
+      <p:cxnSp>
+        <p:nvCxnSpPr>
+          <p:cNvPr id="9" name="Straight Connector 8"/>
+          <p:cNvCxnSpPr/>
+          <p:nvPr/>
+        </p:nvCxnSpPr>
+        <p:spPr>
+          <a:xfrm flipH="1">
+            <a:off x="533398" y="762000"/>
+            <a:ext cx="6857999" cy="0"/>
+          </a:xfrm>
+          <a:prstGeom prst="line">
+            <a:avLst/>
+          </a:prstGeom>
+          <a:ln w="38100">
+            <a:solidFill>
+              <a:schemeClr val="tx1"/>
+            </a:solidFill>
+          </a:ln>
+        </p:spPr>
+        <p:style>
+          <a:lnRef idx="1">
+            <a:schemeClr val="accent1"/>
+          </a:lnRef>
+          <a:fillRef idx="0">
+            <a:schemeClr val="accent1"/>
+          </a:fillRef>
+          <a:effectRef idx="0">
+            <a:schemeClr val="accent1"/>
+          </a:effectRef>
+          <a:fontRef idx="minor">
+            <a:schemeClr val="tx1"/>
+          </a:fontRef>
+        </p:style>
+      </p:cxnSp>
+      <p:sp>
+        <p:nvSpPr>
+          <p:cNvPr id="2" name="TextBox 1"/>
           <p:cNvSpPr txBox="1"/>
           <p:nvPr/>
         </p:nvSpPr>
         <p:spPr>
           <a:xfrm>
-            <a:off x="457200" y="257080"/>
-            <a:ext cx="4495800" cy="523220"/>
+            <a:off x="609600" y="1219200"/>
+            <a:ext cx="3657600" cy="3693319"/>
           </a:xfrm>
           <a:prstGeom prst="rect">
             <a:avLst/>
@@ -4060,27 +5721,517 @@
           <a:lstStyle/>
           <a:p>
             <a:r>
-              <a:rPr lang="en-US" sz="2800" dirty="0" smtClean="0">
-                <a:solidFill>
-                  <a:srgbClr val="0090FF"/>
-                </a:solidFill>
-                <a:latin typeface="Fast Money" pitchFamily="2" charset="0"/>
-              </a:rPr>
-              <a:t>Title Here</a:t>
-            </a:r>
-            <a:endParaRPr lang="en-US" sz="2800" dirty="0">
-              <a:solidFill>
-                <a:srgbClr val="0090FF"/>
-              </a:solidFill>
-              <a:latin typeface="Fast Money" pitchFamily="2" charset="0"/>
-            </a:endParaRPr>
-          </a:p>
-        </p:txBody>
-      </p:sp>
+              <a:rPr lang="en-US" u="sng" dirty="0" smtClean="0"/>
+              <a:t>Microprocessor</a:t>
+            </a:r>
+          </a:p>
+          <a:p>
+            <a:endParaRPr lang="en-US" u="sng" dirty="0"/>
+          </a:p>
+          <a:p>
+            <a:r>
+              <a:rPr lang="en-US" dirty="0" smtClean="0"/>
+              <a:t>ATMega328-PU</a:t>
+            </a:r>
+          </a:p>
+          <a:p>
+            <a:r>
+              <a:rPr lang="en-US" dirty="0" smtClean="0"/>
+              <a:t>8-bit microcontroller</a:t>
+            </a:r>
+          </a:p>
+          <a:p>
+            <a:r>
+              <a:rPr lang="en-US" dirty="0" smtClean="0"/>
+              <a:t>RISC Architecture</a:t>
+            </a:r>
+          </a:p>
+          <a:p>
+            <a:r>
+              <a:rPr lang="en-US" dirty="0" smtClean="0"/>
+              <a:t>Programmed with Arduino IDE</a:t>
+            </a:r>
+          </a:p>
+          <a:p>
+            <a:endParaRPr lang="en-US" dirty="0" smtClean="0"/>
+          </a:p>
+          <a:p>
+            <a:r>
+              <a:rPr lang="en-US" u="sng" dirty="0" smtClean="0"/>
+              <a:t>Use</a:t>
+            </a:r>
+          </a:p>
+          <a:p>
+            <a:endParaRPr lang="en-US" dirty="0"/>
+          </a:p>
+          <a:p>
+            <a:r>
+              <a:rPr lang="en-US" dirty="0" smtClean="0"/>
+              <a:t>Trigger sensors</a:t>
+            </a:r>
+          </a:p>
+          <a:p>
+            <a:r>
+              <a:rPr lang="en-US" dirty="0" smtClean="0"/>
+              <a:t>Receive sensor data</a:t>
+            </a:r>
+          </a:p>
+          <a:p>
+            <a:r>
+              <a:rPr lang="en-US" dirty="0" smtClean="0"/>
+              <a:t>Output binary </a:t>
+            </a:r>
+          </a:p>
+          <a:p>
+            <a:endParaRPr lang="en-US" dirty="0"/>
+          </a:p>
+        </p:txBody>
+      </p:sp>
+      <p:pic>
+        <p:nvPicPr>
+          <p:cNvPr id="3" name="Picture 2"/>
+          <p:cNvPicPr>
+            <a:picLocks noChangeAspect="1"/>
+          </p:cNvPicPr>
+          <p:nvPr/>
+        </p:nvPicPr>
+        <p:blipFill>
+          <a:blip r:embed="rId3">
+            <a:extLst>
+              <a:ext uri="{28A0092B-C50C-407E-A947-70E740481C1C}">
+                <a14:useLocalDpi xmlns:a14="http://schemas.microsoft.com/office/drawing/2010/main" val="0"/>
+              </a:ext>
+            </a:extLst>
+          </a:blip>
+          <a:stretch>
+            <a:fillRect/>
+          </a:stretch>
+        </p:blipFill>
+        <p:spPr>
+          <a:xfrm>
+            <a:off x="4267200" y="1483636"/>
+            <a:ext cx="4267200" cy="3200400"/>
+          </a:xfrm>
+          <a:prstGeom prst="rect">
+            <a:avLst/>
+          </a:prstGeom>
+        </p:spPr>
+      </p:pic>
     </p:spTree>
     <p:extLst>
       <p:ext uri="{BB962C8B-B14F-4D97-AF65-F5344CB8AC3E}">
-        <p14:creationId xmlns:p14="http://schemas.microsoft.com/office/powerpoint/2010/main" val="2585547098"/>
+        <p14:creationId xmlns:p14="http://schemas.microsoft.com/office/powerpoint/2010/main" val="1403058786"/>
+      </p:ext>
+    </p:extLst>
+  </p:cSld>
+  <p:clrMapOvr>
+    <a:masterClrMapping/>
+  </p:clrMapOvr>
+  <p:timing>
+    <p:tnLst>
+      <p:par>
+        <p:cTn id="1" dur="indefinite" restart="never" nodeType="tmRoot"/>
+      </p:par>
+    </p:tnLst>
+  </p:timing>
+</p:sld>
+</file>
+
+<file path=ppt/slides/slide7.xml><?xml version="1.0" encoding="utf-8"?>
+<p:sld xmlns:a="http://schemas.openxmlformats.org/drawingml/2006/main" xmlns:r="http://schemas.openxmlformats.org/officeDocument/2006/relationships" xmlns:p="http://schemas.openxmlformats.org/presentationml/2006/main">
+  <p:cSld>
+    <p:spTree>
+      <p:nvGrpSpPr>
+        <p:cNvPr id="1" name=""/>
+        <p:cNvGrpSpPr/>
+        <p:nvPr/>
+      </p:nvGrpSpPr>
+      <p:grpSpPr>
+        <a:xfrm>
+          <a:off x="0" y="0"/>
+          <a:ext cx="0" cy="0"/>
+          <a:chOff x="0" y="0"/>
+          <a:chExt cx="0" cy="0"/>
+        </a:xfrm>
+      </p:grpSpPr>
+      <p:sp>
+        <p:nvSpPr>
+          <p:cNvPr id="7" name="Slide Number Placeholder 6"/>
+          <p:cNvSpPr>
+            <a:spLocks noGrp="1"/>
+          </p:cNvSpPr>
+          <p:nvPr>
+            <p:ph type="sldNum" sz="quarter" idx="12"/>
+          </p:nvPr>
+        </p:nvSpPr>
+        <p:spPr/>
+        <p:txBody>
+          <a:bodyPr/>
+          <a:lstStyle/>
+          <a:p>
+            <a:fld id="{B6F15528-21DE-4FAA-801E-634DDDAF4B2B}" type="slidenum">
+              <a:rPr lang="en-US" smtClean="0"/>
+              <a:pPr/>
+              <a:t>7</a:t>
+            </a:fld>
+            <a:endParaRPr lang="en-US"/>
+          </a:p>
+        </p:txBody>
+      </p:sp>
+      <p:pic>
+        <p:nvPicPr>
+          <p:cNvPr id="8" name="Picture 2" descr="C:\Users\noaht_000\Documents\ECE411\Practicum2014\Wiki Images\logo.bmp"/>
+          <p:cNvPicPr>
+            <a:picLocks noChangeAspect="1" noChangeArrowheads="1"/>
+          </p:cNvPicPr>
+          <p:nvPr/>
+        </p:nvPicPr>
+        <p:blipFill>
+          <a:blip r:embed="rId2" cstate="print">
+            <a:extLst>
+              <a:ext uri="{28A0092B-C50C-407E-A947-70E740481C1C}">
+                <a14:useLocalDpi xmlns:a14="http://schemas.microsoft.com/office/drawing/2010/main" val="0"/>
+              </a:ext>
+            </a:extLst>
+          </a:blip>
+          <a:srcRect/>
+          <a:stretch>
+            <a:fillRect/>
+          </a:stretch>
+        </p:blipFill>
+        <p:spPr bwMode="auto">
+          <a:xfrm>
+            <a:off x="7391399" y="199181"/>
+            <a:ext cx="1477731" cy="639019"/>
+          </a:xfrm>
+          <a:prstGeom prst="rect">
+            <a:avLst/>
+          </a:prstGeom>
+          <a:noFill/>
+          <a:extLst>
+            <a:ext uri="{909E8E84-426E-40DD-AFC4-6F175D3DCCD1}">
+              <a14:hiddenFill xmlns:a14="http://schemas.microsoft.com/office/drawing/2010/main">
+                <a:solidFill>
+                  <a:srgbClr val="FFFFFF"/>
+                </a:solidFill>
+              </a14:hiddenFill>
+            </a:ext>
+          </a:extLst>
+        </p:spPr>
+      </p:pic>
+      <p:cxnSp>
+        <p:nvCxnSpPr>
+          <p:cNvPr id="9" name="Straight Connector 8"/>
+          <p:cNvCxnSpPr/>
+          <p:nvPr/>
+        </p:nvCxnSpPr>
+        <p:spPr>
+          <a:xfrm flipH="1">
+            <a:off x="533398" y="762000"/>
+            <a:ext cx="6857999" cy="0"/>
+          </a:xfrm>
+          <a:prstGeom prst="line">
+            <a:avLst/>
+          </a:prstGeom>
+          <a:ln w="38100">
+            <a:solidFill>
+              <a:schemeClr val="tx1"/>
+            </a:solidFill>
+          </a:ln>
+        </p:spPr>
+        <p:style>
+          <a:lnRef idx="1">
+            <a:schemeClr val="accent1"/>
+          </a:lnRef>
+          <a:fillRef idx="0">
+            <a:schemeClr val="accent1"/>
+          </a:fillRef>
+          <a:effectRef idx="0">
+            <a:schemeClr val="accent1"/>
+          </a:effectRef>
+          <a:fontRef idx="minor">
+            <a:schemeClr val="tx1"/>
+          </a:fontRef>
+        </p:style>
+      </p:cxnSp>
+    </p:spTree>
+    <p:extLst>
+      <p:ext uri="{BB962C8B-B14F-4D97-AF65-F5344CB8AC3E}">
+        <p14:creationId xmlns:p14="http://schemas.microsoft.com/office/powerpoint/2010/main" val="3893253114"/>
+      </p:ext>
+    </p:extLst>
+  </p:cSld>
+  <p:clrMapOvr>
+    <a:masterClrMapping/>
+  </p:clrMapOvr>
+  <p:timing>
+    <p:tnLst>
+      <p:par>
+        <p:cTn id="1" dur="indefinite" restart="never" nodeType="tmRoot"/>
+      </p:par>
+    </p:tnLst>
+  </p:timing>
+</p:sld>
+</file>
+
+<file path=ppt/slides/slide8.xml><?xml version="1.0" encoding="utf-8"?>
+<p:sld xmlns:a="http://schemas.openxmlformats.org/drawingml/2006/main" xmlns:r="http://schemas.openxmlformats.org/officeDocument/2006/relationships" xmlns:p="http://schemas.openxmlformats.org/presentationml/2006/main">
+  <p:cSld>
+    <p:spTree>
+      <p:nvGrpSpPr>
+        <p:cNvPr id="1" name=""/>
+        <p:cNvGrpSpPr/>
+        <p:nvPr/>
+      </p:nvGrpSpPr>
+      <p:grpSpPr>
+        <a:xfrm>
+          <a:off x="0" y="0"/>
+          <a:ext cx="0" cy="0"/>
+          <a:chOff x="0" y="0"/>
+          <a:chExt cx="0" cy="0"/>
+        </a:xfrm>
+      </p:grpSpPr>
+      <p:sp>
+        <p:nvSpPr>
+          <p:cNvPr id="7" name="Slide Number Placeholder 6"/>
+          <p:cNvSpPr>
+            <a:spLocks noGrp="1"/>
+          </p:cNvSpPr>
+          <p:nvPr>
+            <p:ph type="sldNum" sz="quarter" idx="12"/>
+          </p:nvPr>
+        </p:nvSpPr>
+        <p:spPr/>
+        <p:txBody>
+          <a:bodyPr/>
+          <a:lstStyle/>
+          <a:p>
+            <a:fld id="{B6F15528-21DE-4FAA-801E-634DDDAF4B2B}" type="slidenum">
+              <a:rPr lang="en-US" smtClean="0"/>
+              <a:pPr/>
+              <a:t>8</a:t>
+            </a:fld>
+            <a:endParaRPr lang="en-US"/>
+          </a:p>
+        </p:txBody>
+      </p:sp>
+      <p:pic>
+        <p:nvPicPr>
+          <p:cNvPr id="8" name="Picture 2" descr="C:\Users\noaht_000\Documents\ECE411\Practicum2014\Wiki Images\logo.bmp"/>
+          <p:cNvPicPr>
+            <a:picLocks noChangeAspect="1" noChangeArrowheads="1"/>
+          </p:cNvPicPr>
+          <p:nvPr/>
+        </p:nvPicPr>
+        <p:blipFill>
+          <a:blip r:embed="rId2" cstate="print">
+            <a:extLst>
+              <a:ext uri="{28A0092B-C50C-407E-A947-70E740481C1C}">
+                <a14:useLocalDpi xmlns:a14="http://schemas.microsoft.com/office/drawing/2010/main" val="0"/>
+              </a:ext>
+            </a:extLst>
+          </a:blip>
+          <a:srcRect/>
+          <a:stretch>
+            <a:fillRect/>
+          </a:stretch>
+        </p:blipFill>
+        <p:spPr bwMode="auto">
+          <a:xfrm>
+            <a:off x="7391399" y="199181"/>
+            <a:ext cx="1477731" cy="639019"/>
+          </a:xfrm>
+          <a:prstGeom prst="rect">
+            <a:avLst/>
+          </a:prstGeom>
+          <a:noFill/>
+          <a:extLst>
+            <a:ext uri="{909E8E84-426E-40DD-AFC4-6F175D3DCCD1}">
+              <a14:hiddenFill xmlns:a14="http://schemas.microsoft.com/office/drawing/2010/main">
+                <a:solidFill>
+                  <a:srgbClr val="FFFFFF"/>
+                </a:solidFill>
+              </a14:hiddenFill>
+            </a:ext>
+          </a:extLst>
+        </p:spPr>
+      </p:pic>
+      <p:cxnSp>
+        <p:nvCxnSpPr>
+          <p:cNvPr id="9" name="Straight Connector 8"/>
+          <p:cNvCxnSpPr/>
+          <p:nvPr/>
+        </p:nvCxnSpPr>
+        <p:spPr>
+          <a:xfrm flipH="1">
+            <a:off x="533398" y="762000"/>
+            <a:ext cx="6857999" cy="0"/>
+          </a:xfrm>
+          <a:prstGeom prst="line">
+            <a:avLst/>
+          </a:prstGeom>
+          <a:ln w="38100">
+            <a:solidFill>
+              <a:schemeClr val="tx1"/>
+            </a:solidFill>
+          </a:ln>
+        </p:spPr>
+        <p:style>
+          <a:lnRef idx="1">
+            <a:schemeClr val="accent1"/>
+          </a:lnRef>
+          <a:fillRef idx="0">
+            <a:schemeClr val="accent1"/>
+          </a:fillRef>
+          <a:effectRef idx="0">
+            <a:schemeClr val="accent1"/>
+          </a:effectRef>
+          <a:fontRef idx="minor">
+            <a:schemeClr val="tx1"/>
+          </a:fontRef>
+        </p:style>
+      </p:cxnSp>
+    </p:spTree>
+    <p:extLst>
+      <p:ext uri="{BB962C8B-B14F-4D97-AF65-F5344CB8AC3E}">
+        <p14:creationId xmlns:p14="http://schemas.microsoft.com/office/powerpoint/2010/main" val="1583150724"/>
+      </p:ext>
+    </p:extLst>
+  </p:cSld>
+  <p:clrMapOvr>
+    <a:masterClrMapping/>
+  </p:clrMapOvr>
+  <p:timing>
+    <p:tnLst>
+      <p:par>
+        <p:cTn id="1" dur="indefinite" restart="never" nodeType="tmRoot"/>
+      </p:par>
+    </p:tnLst>
+  </p:timing>
+</p:sld>
+</file>
+
+<file path=ppt/slides/slide9.xml><?xml version="1.0" encoding="utf-8"?>
+<p:sld xmlns:a="http://schemas.openxmlformats.org/drawingml/2006/main" xmlns:r="http://schemas.openxmlformats.org/officeDocument/2006/relationships" xmlns:p="http://schemas.openxmlformats.org/presentationml/2006/main">
+  <p:cSld>
+    <p:spTree>
+      <p:nvGrpSpPr>
+        <p:cNvPr id="1" name=""/>
+        <p:cNvGrpSpPr/>
+        <p:nvPr/>
+      </p:nvGrpSpPr>
+      <p:grpSpPr>
+        <a:xfrm>
+          <a:off x="0" y="0"/>
+          <a:ext cx="0" cy="0"/>
+          <a:chOff x="0" y="0"/>
+          <a:chExt cx="0" cy="0"/>
+        </a:xfrm>
+      </p:grpSpPr>
+      <p:sp>
+        <p:nvSpPr>
+          <p:cNvPr id="7" name="Slide Number Placeholder 6"/>
+          <p:cNvSpPr>
+            <a:spLocks noGrp="1"/>
+          </p:cNvSpPr>
+          <p:nvPr>
+            <p:ph type="sldNum" sz="quarter" idx="12"/>
+          </p:nvPr>
+        </p:nvSpPr>
+        <p:spPr/>
+        <p:txBody>
+          <a:bodyPr/>
+          <a:lstStyle/>
+          <a:p>
+            <a:fld id="{B6F15528-21DE-4FAA-801E-634DDDAF4B2B}" type="slidenum">
+              <a:rPr lang="en-US" smtClean="0"/>
+              <a:pPr/>
+              <a:t>9</a:t>
+            </a:fld>
+            <a:endParaRPr lang="en-US"/>
+          </a:p>
+        </p:txBody>
+      </p:sp>
+      <p:pic>
+        <p:nvPicPr>
+          <p:cNvPr id="8" name="Picture 2" descr="C:\Users\noaht_000\Documents\ECE411\Practicum2014\Wiki Images\logo.bmp"/>
+          <p:cNvPicPr>
+            <a:picLocks noChangeAspect="1" noChangeArrowheads="1"/>
+          </p:cNvPicPr>
+          <p:nvPr/>
+        </p:nvPicPr>
+        <p:blipFill>
+          <a:blip r:embed="rId2" cstate="print">
+            <a:extLst>
+              <a:ext uri="{28A0092B-C50C-407E-A947-70E740481C1C}">
+                <a14:useLocalDpi xmlns:a14="http://schemas.microsoft.com/office/drawing/2010/main" val="0"/>
+              </a:ext>
+            </a:extLst>
+          </a:blip>
+          <a:srcRect/>
+          <a:stretch>
+            <a:fillRect/>
+          </a:stretch>
+        </p:blipFill>
+        <p:spPr bwMode="auto">
+          <a:xfrm>
+            <a:off x="7391399" y="199181"/>
+            <a:ext cx="1477731" cy="639019"/>
+          </a:xfrm>
+          <a:prstGeom prst="rect">
+            <a:avLst/>
+          </a:prstGeom>
+          <a:noFill/>
+          <a:extLst>
+            <a:ext uri="{909E8E84-426E-40DD-AFC4-6F175D3DCCD1}">
+              <a14:hiddenFill xmlns:a14="http://schemas.microsoft.com/office/drawing/2010/main">
+                <a:solidFill>
+                  <a:srgbClr val="FFFFFF"/>
+                </a:solidFill>
+              </a14:hiddenFill>
+            </a:ext>
+          </a:extLst>
+        </p:spPr>
+      </p:pic>
+      <p:cxnSp>
+        <p:nvCxnSpPr>
+          <p:cNvPr id="9" name="Straight Connector 8"/>
+          <p:cNvCxnSpPr/>
+          <p:nvPr/>
+        </p:nvCxnSpPr>
+        <p:spPr>
+          <a:xfrm flipH="1">
+            <a:off x="533398" y="762000"/>
+            <a:ext cx="6857999" cy="0"/>
+          </a:xfrm>
+          <a:prstGeom prst="line">
+            <a:avLst/>
+          </a:prstGeom>
+          <a:ln w="38100">
+            <a:solidFill>
+              <a:schemeClr val="tx1"/>
+            </a:solidFill>
+          </a:ln>
+        </p:spPr>
+        <p:style>
+          <a:lnRef idx="1">
+            <a:schemeClr val="accent1"/>
+          </a:lnRef>
+          <a:fillRef idx="0">
+            <a:schemeClr val="accent1"/>
+          </a:fillRef>
+          <a:effectRef idx="0">
+            <a:schemeClr val="accent1"/>
+          </a:effectRef>
+          <a:fontRef idx="minor">
+            <a:schemeClr val="tx1"/>
+          </a:fontRef>
+        </p:style>
+      </p:cxnSp>
+    </p:spTree>
+    <p:extLst>
+      <p:ext uri="{BB962C8B-B14F-4D97-AF65-F5344CB8AC3E}">
+        <p14:creationId xmlns:p14="http://schemas.microsoft.com/office/powerpoint/2010/main" val="4216677911"/>
       </p:ext>
     </p:extLst>
   </p:cSld>

</xml_diff>

<commit_message>
this is actually Noah fixing the powerpoint!
</commit_message>
<xml_diff>
--- a/Presentation/T04_Presentation.pptx
+++ b/Presentation/T04_Presentation.pptx
@@ -5,7 +5,7 @@
     <p:sldMasterId id="2147483648" r:id="rId1"/>
   </p:sldMasterIdLst>
   <p:notesMasterIdLst>
-    <p:notesMasterId r:id="rId18"/>
+    <p:notesMasterId r:id="rId20"/>
   </p:notesMasterIdLst>
   <p:sldIdLst>
     <p:sldId id="256" r:id="rId2"/>
@@ -24,20 +24,22 @@
     <p:sldId id="267" r:id="rId15"/>
     <p:sldId id="266" r:id="rId16"/>
     <p:sldId id="272" r:id="rId17"/>
+    <p:sldId id="273" r:id="rId18"/>
+    <p:sldId id="274" r:id="rId19"/>
   </p:sldIdLst>
   <p:sldSz cx="9144000" cy="6858000" type="screen4x3"/>
   <p:notesSz cx="6858000" cy="9144000"/>
   <p:embeddedFontLst>
     <p:embeddedFont>
-      <p:font typeface="Fast Money" pitchFamily="2" charset="0"/>
-      <p:regular r:id="rId19"/>
+      <p:font typeface="Calibri" panose="020F0502020204030204" pitchFamily="34" charset="0"/>
+      <p:regular r:id="rId21"/>
+      <p:bold r:id="rId22"/>
+      <p:italic r:id="rId23"/>
+      <p:boldItalic r:id="rId24"/>
     </p:embeddedFont>
     <p:embeddedFont>
-      <p:font typeface="Calibri" pitchFamily="34" charset="0"/>
-      <p:regular r:id="rId20"/>
-      <p:bold r:id="rId21"/>
-      <p:italic r:id="rId22"/>
-      <p:boldItalic r:id="rId23"/>
+      <p:font typeface="Fast Money" panose="00000400000000000000" pitchFamily="2" charset="0"/>
+      <p:regular r:id="rId25"/>
     </p:embeddedFont>
   </p:embeddedFontLst>
   <p:defaultTextStyle>
@@ -137,7 +139,7 @@
   </p:defaultTextStyle>
   <p:extLst>
     <p:ext uri="{EFAFB233-063F-42B5-8137-9DF3F51BA10A}">
-      <p15:sldGuideLst xmlns:p15="http://schemas.microsoft.com/office/powerpoint/2012/main" xmlns="">
+      <p15:sldGuideLst xmlns:p15="http://schemas.microsoft.com/office/powerpoint/2012/main">
         <p15:guide id="1" orient="horz" pos="2160">
           <p15:clr>
             <a:srgbClr val="A4A3A4"/>
@@ -236,7 +238,7 @@
           <a:p>
             <a:fld id="{7D2BA66B-4B43-4B31-8C46-01F4587945DE}" type="datetimeFigureOut">
               <a:rPr lang="en-US" smtClean="0"/>
-              <a:t>12/11/2014</a:t>
+              <a:t>12/12/2014</a:t>
             </a:fld>
             <a:endParaRPr lang="en-US"/>
           </a:p>
@@ -1128,6 +1130,274 @@
 </p:notes>
 </file>
 
+<file path=ppt/notesSlides/notesSlide16.xml><?xml version="1.0" encoding="utf-8"?>
+<p:notes xmlns:a="http://schemas.openxmlformats.org/drawingml/2006/main" xmlns:r="http://schemas.openxmlformats.org/officeDocument/2006/relationships" xmlns:p="http://schemas.openxmlformats.org/presentationml/2006/main">
+  <p:cSld>
+    <p:spTree>
+      <p:nvGrpSpPr>
+        <p:cNvPr id="1" name=""/>
+        <p:cNvGrpSpPr/>
+        <p:nvPr/>
+      </p:nvGrpSpPr>
+      <p:grpSpPr>
+        <a:xfrm>
+          <a:off x="0" y="0"/>
+          <a:ext cx="0" cy="0"/>
+          <a:chOff x="0" y="0"/>
+          <a:chExt cx="0" cy="0"/>
+        </a:xfrm>
+      </p:grpSpPr>
+      <p:sp>
+        <p:nvSpPr>
+          <p:cNvPr id="2" name="Slide Image Placeholder 1"/>
+          <p:cNvSpPr>
+            <a:spLocks noGrp="1" noRot="1" noChangeAspect="1"/>
+          </p:cNvSpPr>
+          <p:nvPr>
+            <p:ph type="sldImg"/>
+          </p:nvPr>
+        </p:nvSpPr>
+        <p:spPr/>
+      </p:sp>
+      <p:sp>
+        <p:nvSpPr>
+          <p:cNvPr id="3" name="Notes Placeholder 2"/>
+          <p:cNvSpPr>
+            <a:spLocks noGrp="1"/>
+          </p:cNvSpPr>
+          <p:nvPr>
+            <p:ph type="body" idx="1"/>
+          </p:nvPr>
+        </p:nvSpPr>
+        <p:spPr/>
+        <p:txBody>
+          <a:bodyPr/>
+          <a:lstStyle/>
+          <a:p>
+            <a:endParaRPr lang="en-US"/>
+          </a:p>
+        </p:txBody>
+      </p:sp>
+      <p:sp>
+        <p:nvSpPr>
+          <p:cNvPr id="4" name="Slide Number Placeholder 3"/>
+          <p:cNvSpPr>
+            <a:spLocks noGrp="1"/>
+          </p:cNvSpPr>
+          <p:nvPr>
+            <p:ph type="sldNum" sz="quarter" idx="10"/>
+          </p:nvPr>
+        </p:nvSpPr>
+        <p:spPr/>
+        <p:txBody>
+          <a:bodyPr/>
+          <a:lstStyle/>
+          <a:p>
+            <a:fld id="{603E23E5-3609-43E5-8DC9-3CC5799A9D7E}" type="slidenum">
+              <a:rPr lang="en-US" smtClean="0"/>
+              <a:t>16</a:t>
+            </a:fld>
+            <a:endParaRPr lang="en-US"/>
+          </a:p>
+        </p:txBody>
+      </p:sp>
+    </p:spTree>
+    <p:extLst>
+      <p:ext uri="{BB962C8B-B14F-4D97-AF65-F5344CB8AC3E}">
+        <p14:creationId xmlns:p14="http://schemas.microsoft.com/office/powerpoint/2010/main" val="3581487043"/>
+      </p:ext>
+    </p:extLst>
+  </p:cSld>
+  <p:clrMapOvr>
+    <a:masterClrMapping/>
+  </p:clrMapOvr>
+</p:notes>
+</file>
+
+<file path=ppt/notesSlides/notesSlide17.xml><?xml version="1.0" encoding="utf-8"?>
+<p:notes xmlns:a="http://schemas.openxmlformats.org/drawingml/2006/main" xmlns:r="http://schemas.openxmlformats.org/officeDocument/2006/relationships" xmlns:p="http://schemas.openxmlformats.org/presentationml/2006/main">
+  <p:cSld>
+    <p:spTree>
+      <p:nvGrpSpPr>
+        <p:cNvPr id="1" name=""/>
+        <p:cNvGrpSpPr/>
+        <p:nvPr/>
+      </p:nvGrpSpPr>
+      <p:grpSpPr>
+        <a:xfrm>
+          <a:off x="0" y="0"/>
+          <a:ext cx="0" cy="0"/>
+          <a:chOff x="0" y="0"/>
+          <a:chExt cx="0" cy="0"/>
+        </a:xfrm>
+      </p:grpSpPr>
+      <p:sp>
+        <p:nvSpPr>
+          <p:cNvPr id="2" name="Slide Image Placeholder 1"/>
+          <p:cNvSpPr>
+            <a:spLocks noGrp="1" noRot="1" noChangeAspect="1"/>
+          </p:cNvSpPr>
+          <p:nvPr>
+            <p:ph type="sldImg"/>
+          </p:nvPr>
+        </p:nvSpPr>
+        <p:spPr/>
+      </p:sp>
+      <p:sp>
+        <p:nvSpPr>
+          <p:cNvPr id="3" name="Notes Placeholder 2"/>
+          <p:cNvSpPr>
+            <a:spLocks noGrp="1"/>
+          </p:cNvSpPr>
+          <p:nvPr>
+            <p:ph type="body" idx="1"/>
+          </p:nvPr>
+        </p:nvSpPr>
+        <p:spPr/>
+        <p:txBody>
+          <a:bodyPr/>
+          <a:lstStyle/>
+          <a:p>
+            <a:r>
+              <a:rPr lang="en-US" dirty="0" smtClean="0"/>
+              <a:t>Dan 1</a:t>
+            </a:r>
+            <a:r>
+              <a:rPr lang="en-US" baseline="0" dirty="0" smtClean="0"/>
+              <a:t> min</a:t>
+            </a:r>
+            <a:endParaRPr lang="en-US" dirty="0"/>
+          </a:p>
+        </p:txBody>
+      </p:sp>
+      <p:sp>
+        <p:nvSpPr>
+          <p:cNvPr id="4" name="Slide Number Placeholder 3"/>
+          <p:cNvSpPr>
+            <a:spLocks noGrp="1"/>
+          </p:cNvSpPr>
+          <p:nvPr>
+            <p:ph type="sldNum" sz="quarter" idx="10"/>
+          </p:nvPr>
+        </p:nvSpPr>
+        <p:spPr/>
+        <p:txBody>
+          <a:bodyPr/>
+          <a:lstStyle/>
+          <a:p>
+            <a:fld id="{603E23E5-3609-43E5-8DC9-3CC5799A9D7E}" type="slidenum">
+              <a:rPr lang="en-US" smtClean="0"/>
+              <a:t>17</a:t>
+            </a:fld>
+            <a:endParaRPr lang="en-US"/>
+          </a:p>
+        </p:txBody>
+      </p:sp>
+    </p:spTree>
+    <p:extLst>
+      <p:ext uri="{BB962C8B-B14F-4D97-AF65-F5344CB8AC3E}">
+        <p14:creationId xmlns:p14="http://schemas.microsoft.com/office/powerpoint/2010/main" val="3902255951"/>
+      </p:ext>
+    </p:extLst>
+  </p:cSld>
+  <p:clrMapOvr>
+    <a:masterClrMapping/>
+  </p:clrMapOvr>
+</p:notes>
+</file>
+
+<file path=ppt/notesSlides/notesSlide18.xml><?xml version="1.0" encoding="utf-8"?>
+<p:notes xmlns:a="http://schemas.openxmlformats.org/drawingml/2006/main" xmlns:r="http://schemas.openxmlformats.org/officeDocument/2006/relationships" xmlns:p="http://schemas.openxmlformats.org/presentationml/2006/main">
+  <p:cSld>
+    <p:spTree>
+      <p:nvGrpSpPr>
+        <p:cNvPr id="1" name=""/>
+        <p:cNvGrpSpPr/>
+        <p:nvPr/>
+      </p:nvGrpSpPr>
+      <p:grpSpPr>
+        <a:xfrm>
+          <a:off x="0" y="0"/>
+          <a:ext cx="0" cy="0"/>
+          <a:chOff x="0" y="0"/>
+          <a:chExt cx="0" cy="0"/>
+        </a:xfrm>
+      </p:grpSpPr>
+      <p:sp>
+        <p:nvSpPr>
+          <p:cNvPr id="2" name="Slide Image Placeholder 1"/>
+          <p:cNvSpPr>
+            <a:spLocks noGrp="1" noRot="1" noChangeAspect="1"/>
+          </p:cNvSpPr>
+          <p:nvPr>
+            <p:ph type="sldImg"/>
+          </p:nvPr>
+        </p:nvSpPr>
+        <p:spPr/>
+      </p:sp>
+      <p:sp>
+        <p:nvSpPr>
+          <p:cNvPr id="3" name="Notes Placeholder 2"/>
+          <p:cNvSpPr>
+            <a:spLocks noGrp="1"/>
+          </p:cNvSpPr>
+          <p:nvPr>
+            <p:ph type="body" idx="1"/>
+          </p:nvPr>
+        </p:nvSpPr>
+        <p:spPr/>
+        <p:txBody>
+          <a:bodyPr/>
+          <a:lstStyle/>
+          <a:p>
+            <a:r>
+              <a:rPr lang="en-US" dirty="0" smtClean="0"/>
+              <a:t>Dan 1</a:t>
+            </a:r>
+            <a:r>
+              <a:rPr lang="en-US" baseline="0" dirty="0" smtClean="0"/>
+              <a:t> min</a:t>
+            </a:r>
+            <a:endParaRPr lang="en-US" dirty="0"/>
+          </a:p>
+        </p:txBody>
+      </p:sp>
+      <p:sp>
+        <p:nvSpPr>
+          <p:cNvPr id="4" name="Slide Number Placeholder 3"/>
+          <p:cNvSpPr>
+            <a:spLocks noGrp="1"/>
+          </p:cNvSpPr>
+          <p:nvPr>
+            <p:ph type="sldNum" sz="quarter" idx="10"/>
+          </p:nvPr>
+        </p:nvSpPr>
+        <p:spPr/>
+        <p:txBody>
+          <a:bodyPr/>
+          <a:lstStyle/>
+          <a:p>
+            <a:fld id="{603E23E5-3609-43E5-8DC9-3CC5799A9D7E}" type="slidenum">
+              <a:rPr lang="en-US" smtClean="0"/>
+              <a:t>18</a:t>
+            </a:fld>
+            <a:endParaRPr lang="en-US"/>
+          </a:p>
+        </p:txBody>
+      </p:sp>
+    </p:spTree>
+    <p:extLst>
+      <p:ext uri="{BB962C8B-B14F-4D97-AF65-F5344CB8AC3E}">
+        <p14:creationId xmlns:p14="http://schemas.microsoft.com/office/powerpoint/2010/main" val="1749253616"/>
+      </p:ext>
+    </p:extLst>
+  </p:cSld>
+  <p:clrMapOvr>
+    <a:masterClrMapping/>
+  </p:clrMapOvr>
+</p:notes>
+</file>
+
 <file path=ppt/notesSlides/notesSlide2.xml><?xml version="1.0" encoding="utf-8"?>
 <p:notes xmlns:a="http://schemas.openxmlformats.org/drawingml/2006/main" xmlns:r="http://schemas.openxmlformats.org/officeDocument/2006/relationships" xmlns:p="http://schemas.openxmlformats.org/presentationml/2006/main">
   <p:cSld>
@@ -2017,7 +2287,7 @@
           <a:p>
             <a:fld id="{025B5F04-3DD3-4015-B751-EB091AF79283}" type="datetime1">
               <a:rPr lang="en-US" smtClean="0"/>
-              <a:t>12/11/2014</a:t>
+              <a:t>12/12/2014</a:t>
             </a:fld>
             <a:endParaRPr lang="en-US"/>
           </a:p>
@@ -2183,7 +2453,7 @@
           <a:p>
             <a:fld id="{90BEF6DF-84C5-4CB9-A878-58935F46D0CB}" type="datetime1">
               <a:rPr lang="en-US" smtClean="0"/>
-              <a:t>12/11/2014</a:t>
+              <a:t>12/12/2014</a:t>
             </a:fld>
             <a:endParaRPr lang="en-US"/>
           </a:p>
@@ -2359,7 +2629,7 @@
           <a:p>
             <a:fld id="{926F7C8E-82A0-4137-A012-6AB94CC2C3D0}" type="datetime1">
               <a:rPr lang="en-US" smtClean="0"/>
-              <a:t>12/11/2014</a:t>
+              <a:t>12/12/2014</a:t>
             </a:fld>
             <a:endParaRPr lang="en-US"/>
           </a:p>
@@ -2525,7 +2795,7 @@
           <a:p>
             <a:fld id="{6A159409-9D08-4690-825E-5ED9F03EE865}" type="datetime1">
               <a:rPr lang="en-US" smtClean="0"/>
-              <a:t>12/11/2014</a:t>
+              <a:t>12/12/2014</a:t>
             </a:fld>
             <a:endParaRPr lang="en-US"/>
           </a:p>
@@ -2767,7 +3037,7 @@
           <a:p>
             <a:fld id="{F1E2C436-A717-4F84-8496-7EEC60793F47}" type="datetime1">
               <a:rPr lang="en-US" smtClean="0"/>
-              <a:t>12/11/2014</a:t>
+              <a:t>12/12/2014</a:t>
             </a:fld>
             <a:endParaRPr lang="en-US"/>
           </a:p>
@@ -3051,7 +3321,7 @@
           <a:p>
             <a:fld id="{19304878-91CF-49FF-BB18-4640DC08F114}" type="datetime1">
               <a:rPr lang="en-US" smtClean="0"/>
-              <a:t>12/11/2014</a:t>
+              <a:t>12/12/2014</a:t>
             </a:fld>
             <a:endParaRPr lang="en-US"/>
           </a:p>
@@ -3469,7 +3739,7 @@
           <a:p>
             <a:fld id="{DE440A11-7842-4023-B4B1-5DAD949EF209}" type="datetime1">
               <a:rPr lang="en-US" smtClean="0"/>
-              <a:t>12/11/2014</a:t>
+              <a:t>12/12/2014</a:t>
             </a:fld>
             <a:endParaRPr lang="en-US"/>
           </a:p>
@@ -3583,7 +3853,7 @@
           <a:p>
             <a:fld id="{2E101D02-24BF-4BFB-80A5-AE8E6DB0539A}" type="datetime1">
               <a:rPr lang="en-US" smtClean="0"/>
-              <a:t>12/11/2014</a:t>
+              <a:t>12/12/2014</a:t>
             </a:fld>
             <a:endParaRPr lang="en-US"/>
           </a:p>
@@ -3674,7 +3944,7 @@
           <a:p>
             <a:fld id="{5E2FF4E6-EE57-4D29-829B-C404F7C131C6}" type="datetime1">
               <a:rPr lang="en-US" smtClean="0"/>
-              <a:t>12/11/2014</a:t>
+              <a:t>12/12/2014</a:t>
             </a:fld>
             <a:endParaRPr lang="en-US"/>
           </a:p>
@@ -3947,7 +4217,7 @@
           <a:p>
             <a:fld id="{BAAF4B9B-620F-499E-AF3A-2F71910048FD}" type="datetime1">
               <a:rPr lang="en-US" smtClean="0"/>
-              <a:t>12/11/2014</a:t>
+              <a:t>12/12/2014</a:t>
             </a:fld>
             <a:endParaRPr lang="en-US"/>
           </a:p>
@@ -4196,7 +4466,7 @@
           <a:p>
             <a:fld id="{136A608F-68E0-4239-BD3E-E06A458AFA0A}" type="datetime1">
               <a:rPr lang="en-US" smtClean="0"/>
-              <a:t>12/11/2014</a:t>
+              <a:t>12/12/2014</a:t>
             </a:fld>
             <a:endParaRPr lang="en-US"/>
           </a:p>
@@ -4405,7 +4675,7 @@
           <a:p>
             <a:fld id="{5211721D-4FFA-4AB5-9DBE-AEF9FD825DF9}" type="datetime1">
               <a:rPr lang="en-US" smtClean="0"/>
-              <a:t>12/11/2014</a:t>
+              <a:t>12/12/2014</a:t>
             </a:fld>
             <a:endParaRPr lang="en-US"/>
           </a:p>
@@ -5910,13 +6180,8 @@
             </a:pPr>
             <a:r>
               <a:rPr lang="en-US" sz="2400" dirty="0" smtClean="0"/>
-              <a:t>Integration Test Two: Connect sensor boards to processor and run the short distance detection code</a:t>
-            </a:r>
-            <a:r>
-              <a:rPr lang="en-US" sz="2400" dirty="0" smtClean="0"/>
-              <a:t>.</a:t>
-            </a:r>
-            <a:endParaRPr lang="en-US" sz="2400" dirty="0" smtClean="0"/>
+              <a:t>Integration Test Two: Connect sensor boards to processor and run the short distance detection code.</a:t>
+            </a:r>
           </a:p>
         </p:txBody>
       </p:sp>
@@ -6339,7 +6604,7 @@
         <p:spPr>
           <a:xfrm>
             <a:off x="533398" y="1066800"/>
-            <a:ext cx="7696202" cy="2677656"/>
+            <a:ext cx="7696202" cy="3785652"/>
           </a:xfrm>
           <a:prstGeom prst="rect">
             <a:avLst/>
@@ -6408,7 +6673,41 @@
             </a:pPr>
             <a:r>
               <a:rPr lang="en-US" sz="2400" dirty="0" smtClean="0"/>
-              <a:t>Minimize number of boards</a:t>
+              <a:t>Minimize number of </a:t>
+            </a:r>
+            <a:r>
+              <a:rPr lang="en-US" sz="2400" dirty="0" smtClean="0"/>
+              <a:t>boards</a:t>
+            </a:r>
+          </a:p>
+          <a:p>
+            <a:pPr marL="285750" indent="-285750">
+              <a:buFont typeface="Arial" panose="020B0604020202020204" pitchFamily="34" charset="0"/>
+              <a:buChar char="•"/>
+            </a:pPr>
+            <a:r>
+              <a:rPr lang="en-US" sz="2400" dirty="0" smtClean="0"/>
+              <a:t>Method on display board of disabling components</a:t>
+            </a:r>
+          </a:p>
+          <a:p>
+            <a:pPr marL="285750" indent="-285750">
+              <a:buFont typeface="Arial" panose="020B0604020202020204" pitchFamily="34" charset="0"/>
+              <a:buChar char="•"/>
+            </a:pPr>
+            <a:r>
+              <a:rPr lang="en-US" sz="2400" dirty="0" smtClean="0"/>
+              <a:t>Keep up weekly meetings</a:t>
+            </a:r>
+          </a:p>
+          <a:p>
+            <a:pPr marL="285750" indent="-285750">
+              <a:buFont typeface="Arial" panose="020B0604020202020204" pitchFamily="34" charset="0"/>
+              <a:buChar char="•"/>
+            </a:pPr>
+            <a:r>
+              <a:rPr lang="en-US" sz="2400" dirty="0" smtClean="0"/>
+              <a:t>Testing and debugging earlier is better</a:t>
             </a:r>
             <a:endParaRPr lang="en-US" sz="2400" dirty="0"/>
           </a:p>
@@ -7041,7 +7340,7 @@
           <p:nvPr/>
         </p:nvPicPr>
         <p:blipFill>
-          <a:blip r:embed="rId2">
+          <a:blip r:embed="rId3">
             <a:extLst>
               <a:ext uri="{28A0092B-C50C-407E-A947-70E740481C1C}">
                 <a14:useLocalDpi xmlns:a14="http://schemas.microsoft.com/office/drawing/2010/main" val="0"/>
@@ -7054,14 +7353,102 @@
         </p:blipFill>
         <p:spPr>
           <a:xfrm>
-            <a:off x="846667" y="1600200"/>
-            <a:ext cx="7450667" cy="4191000"/>
+            <a:off x="2201333" y="1600200"/>
+            <a:ext cx="4741334" cy="2667000"/>
           </a:xfrm>
           <a:prstGeom prst="rect">
             <a:avLst/>
           </a:prstGeom>
         </p:spPr>
       </p:pic>
+      <p:sp>
+        <p:nvSpPr>
+          <p:cNvPr id="3" name="TextBox 2"/>
+          <p:cNvSpPr txBox="1"/>
+          <p:nvPr/>
+        </p:nvSpPr>
+        <p:spPr>
+          <a:xfrm>
+            <a:off x="3276600" y="4810035"/>
+            <a:ext cx="4240648" cy="1200329"/>
+          </a:xfrm>
+          <a:prstGeom prst="rect">
+            <a:avLst/>
+          </a:prstGeom>
+          <a:noFill/>
+        </p:spPr>
+        <p:txBody>
+          <a:bodyPr wrap="none" rtlCol="0">
+            <a:spAutoFit/>
+          </a:bodyPr>
+          <a:lstStyle/>
+          <a:p>
+            <a:r>
+              <a:rPr lang="en-US" dirty="0" smtClean="0"/>
+              <a:t>133 Lines of code</a:t>
+            </a:r>
+          </a:p>
+          <a:p>
+            <a:r>
+              <a:rPr lang="en-US" dirty="0" smtClean="0"/>
+              <a:t>$48.45 per system</a:t>
+            </a:r>
+          </a:p>
+          <a:p>
+            <a:r>
+              <a:rPr lang="en-US" dirty="0" smtClean="0"/>
+              <a:t>70% surface mount components for system</a:t>
+            </a:r>
+          </a:p>
+          <a:p>
+            <a:r>
+              <a:rPr lang="en-US" dirty="0" smtClean="0"/>
+              <a:t>NO MOD WIRES!</a:t>
+            </a:r>
+            <a:endParaRPr lang="en-US" dirty="0"/>
+          </a:p>
+        </p:txBody>
+      </p:sp>
+      <p:sp>
+        <p:nvSpPr>
+          <p:cNvPr id="6" name="TextBox 5"/>
+          <p:cNvSpPr txBox="1"/>
+          <p:nvPr/>
+        </p:nvSpPr>
+        <p:spPr>
+          <a:xfrm>
+            <a:off x="609600" y="5179366"/>
+            <a:ext cx="1723549" cy="461665"/>
+          </a:xfrm>
+          <a:prstGeom prst="rect">
+            <a:avLst/>
+          </a:prstGeom>
+          <a:noFill/>
+        </p:spPr>
+        <p:txBody>
+          <a:bodyPr wrap="none" rtlCol="0">
+            <a:spAutoFit/>
+          </a:bodyPr>
+          <a:lstStyle/>
+          <a:p>
+            <a:r>
+              <a:rPr lang="en-US" sz="2400" dirty="0" smtClean="0">
+                <a:solidFill>
+                  <a:srgbClr val="0090FF"/>
+                </a:solidFill>
+                <a:latin typeface="Fast Money" panose="00000400000000000000" pitchFamily="2" charset="0"/>
+              </a:rPr>
+              <a:t>stats</a:t>
+            </a:r>
+            <a:endParaRPr lang="en-US" sz="2400" dirty="0">
+              <a:solidFill>
+                <a:srgbClr val="0090FF"/>
+              </a:solidFill>
+              <a:latin typeface="Fast Money" panose="00000400000000000000" pitchFamily="2" charset="0"/>
+            </a:endParaRPr>
+          </a:p>
+        </p:txBody>
+      </p:sp>
     </p:spTree>
     <p:extLst>
       <p:ext uri="{BB962C8B-B14F-4D97-AF65-F5344CB8AC3E}">
@@ -7072,10 +7459,17 @@
   <p:clrMapOvr>
     <a:masterClrMapping/>
   </p:clrMapOvr>
+  <p:timing>
+    <p:tnLst>
+      <p:par>
+        <p:cTn id="1" dur="indefinite" restart="never" nodeType="tmRoot"/>
+      </p:par>
+    </p:tnLst>
+  </p:timing>
 </p:sld>
 </file>
 
-<file path=ppt/slides/slide2.xml><?xml version="1.0" encoding="utf-8"?>
+<file path=ppt/slides/slide17.xml><?xml version="1.0" encoding="utf-8"?>
 <p:sld xmlns:a="http://schemas.openxmlformats.org/drawingml/2006/main" xmlns:r="http://schemas.openxmlformats.org/officeDocument/2006/relationships" xmlns:p="http://schemas.openxmlformats.org/presentationml/2006/main">
   <p:cSld>
     <p:spTree>
@@ -7110,7 +7504,7 @@
             <a:fld id="{B6F15528-21DE-4FAA-801E-634DDDAF4B2B}" type="slidenum">
               <a:rPr lang="en-US" smtClean="0"/>
               <a:pPr/>
-              <a:t>2</a:t>
+              <a:t>17</a:t>
             </a:fld>
             <a:endParaRPr lang="en-US"/>
           </a:p>
@@ -7194,234 +7588,14 @@
       </p:cxnSp>
       <p:sp>
         <p:nvSpPr>
-          <p:cNvPr id="2" name="Rectangle 1"/>
-          <p:cNvSpPr/>
-          <p:nvPr/>
-        </p:nvSpPr>
-        <p:spPr>
-          <a:xfrm>
-            <a:off x="533397" y="1066800"/>
-            <a:ext cx="8153403" cy="3648884"/>
-          </a:xfrm>
-          <a:prstGeom prst="rect">
-            <a:avLst/>
-          </a:prstGeom>
-        </p:spPr>
-        <p:txBody>
-          <a:bodyPr wrap="square">
-            <a:spAutoFit/>
-          </a:bodyPr>
-          <a:lstStyle/>
-          <a:p>
-            <a:pPr marL="342900" marR="0" lvl="0" indent="-342900">
-              <a:lnSpc>
-                <a:spcPct val="107000"/>
-              </a:lnSpc>
-              <a:spcBef>
-                <a:spcPts val="0"/>
-              </a:spcBef>
-              <a:spcAft>
-                <a:spcPts val="0"/>
-              </a:spcAft>
-              <a:buFont typeface="Symbol" panose="05050102010706020507" pitchFamily="18" charset="2"/>
-              <a:buChar char=""/>
-            </a:pPr>
-            <a:r>
-              <a:rPr lang="en-US" sz="2400" dirty="0" smtClean="0">
-                <a:latin typeface="Calibri" panose="020F0502020204030204" pitchFamily="34" charset="0"/>
-                <a:ea typeface="Calibri" panose="020F0502020204030204" pitchFamily="34" charset="0"/>
-                <a:cs typeface="Times New Roman" panose="02020603050405020304" pitchFamily="18" charset="0"/>
-              </a:rPr>
-              <a:t>Limited </a:t>
-            </a:r>
-            <a:r>
-              <a:rPr lang="en-US" sz="2400" dirty="0">
-                <a:latin typeface="Calibri" panose="020F0502020204030204" pitchFamily="34" charset="0"/>
-                <a:ea typeface="Calibri" panose="020F0502020204030204" pitchFamily="34" charset="0"/>
-                <a:cs typeface="Times New Roman" panose="02020603050405020304" pitchFamily="18" charset="0"/>
-              </a:rPr>
-              <a:t>rear and blind spot visibility for motorcycle riders wearing full-faced helmets.</a:t>
-            </a:r>
-          </a:p>
-          <a:p>
-            <a:pPr marL="742950" marR="0" lvl="1" indent="-285750">
-              <a:lnSpc>
-                <a:spcPct val="107000"/>
-              </a:lnSpc>
-              <a:spcBef>
-                <a:spcPts val="0"/>
-              </a:spcBef>
-              <a:spcAft>
-                <a:spcPts val="0"/>
-              </a:spcAft>
-              <a:buFont typeface="Courier New" panose="02070309020205020404" pitchFamily="49" charset="0"/>
-              <a:buChar char="o"/>
-            </a:pPr>
-            <a:r>
-              <a:rPr lang="en-US" sz="2400" dirty="0">
-                <a:latin typeface="Calibri" panose="020F0502020204030204" pitchFamily="34" charset="0"/>
-                <a:ea typeface="Calibri" panose="020F0502020204030204" pitchFamily="34" charset="0"/>
-                <a:cs typeface="Times New Roman" panose="02020603050405020304" pitchFamily="18" charset="0"/>
-              </a:rPr>
-              <a:t>Turning head takes attention off the road in front</a:t>
-            </a:r>
-          </a:p>
-          <a:p>
-            <a:pPr marL="342900" marR="0" lvl="0" indent="-342900">
-              <a:lnSpc>
-                <a:spcPct val="107000"/>
-              </a:lnSpc>
-              <a:spcBef>
-                <a:spcPts val="0"/>
-              </a:spcBef>
-              <a:spcAft>
-                <a:spcPts val="0"/>
-              </a:spcAft>
-              <a:buFont typeface="Symbol" panose="05050102010706020507" pitchFamily="18" charset="2"/>
-              <a:buChar char=""/>
-            </a:pPr>
-            <a:r>
-              <a:rPr lang="en-US" sz="2400" dirty="0">
-                <a:latin typeface="Calibri" panose="020F0502020204030204" pitchFamily="34" charset="0"/>
-                <a:ea typeface="Calibri" panose="020F0502020204030204" pitchFamily="34" charset="0"/>
-                <a:cs typeface="Times New Roman" panose="02020603050405020304" pitchFamily="18" charset="0"/>
-              </a:rPr>
-              <a:t>Rearview mirrors are not always reliable or easy to see</a:t>
-            </a:r>
-          </a:p>
-          <a:p>
-            <a:pPr marL="742950" marR="0" lvl="1" indent="-285750">
-              <a:lnSpc>
-                <a:spcPct val="107000"/>
-              </a:lnSpc>
-              <a:spcBef>
-                <a:spcPts val="0"/>
-              </a:spcBef>
-              <a:spcAft>
-                <a:spcPts val="0"/>
-              </a:spcAft>
-              <a:buFont typeface="Courier New" panose="02070309020205020404" pitchFamily="49" charset="0"/>
-              <a:buChar char="o"/>
-            </a:pPr>
-            <a:r>
-              <a:rPr lang="en-US" sz="2400" dirty="0">
-                <a:latin typeface="Calibri" panose="020F0502020204030204" pitchFamily="34" charset="0"/>
-                <a:ea typeface="Calibri" panose="020F0502020204030204" pitchFamily="34" charset="0"/>
-                <a:cs typeface="Times New Roman" panose="02020603050405020304" pitchFamily="18" charset="0"/>
-              </a:rPr>
-              <a:t>Bar end mirrors</a:t>
-            </a:r>
-          </a:p>
-          <a:p>
-            <a:pPr marL="742950" marR="0" lvl="1" indent="-285750">
-              <a:lnSpc>
-                <a:spcPct val="107000"/>
-              </a:lnSpc>
-              <a:spcBef>
-                <a:spcPts val="0"/>
-              </a:spcBef>
-              <a:spcAft>
-                <a:spcPts val="0"/>
-              </a:spcAft>
-              <a:buFont typeface="Courier New" panose="02070309020205020404" pitchFamily="49" charset="0"/>
-              <a:buChar char="o"/>
-            </a:pPr>
-            <a:r>
-              <a:rPr lang="en-US" sz="2400" dirty="0">
-                <a:latin typeface="Calibri" panose="020F0502020204030204" pitchFamily="34" charset="0"/>
-                <a:ea typeface="Calibri" panose="020F0502020204030204" pitchFamily="34" charset="0"/>
-                <a:cs typeface="Times New Roman" panose="02020603050405020304" pitchFamily="18" charset="0"/>
-              </a:rPr>
-              <a:t>Vibration</a:t>
-            </a:r>
-          </a:p>
-          <a:p>
-            <a:pPr marL="342900" marR="0" lvl="0" indent="-342900">
-              <a:lnSpc>
-                <a:spcPct val="107000"/>
-              </a:lnSpc>
-              <a:spcBef>
-                <a:spcPts val="0"/>
-              </a:spcBef>
-              <a:spcAft>
-                <a:spcPts val="0"/>
-              </a:spcAft>
-              <a:buFont typeface="Symbol" panose="05050102010706020507" pitchFamily="18" charset="2"/>
-              <a:buChar char=""/>
-            </a:pPr>
-            <a:r>
-              <a:rPr lang="en-US" sz="2400" dirty="0">
-                <a:latin typeface="Calibri" panose="020F0502020204030204" pitchFamily="34" charset="0"/>
-                <a:ea typeface="Calibri" panose="020F0502020204030204" pitchFamily="34" charset="0"/>
-                <a:cs typeface="Times New Roman" panose="02020603050405020304" pitchFamily="18" charset="0"/>
-              </a:rPr>
-              <a:t>Safety and riding awareness</a:t>
-            </a:r>
-          </a:p>
-          <a:p>
-            <a:pPr marL="742950" marR="0" lvl="1" indent="-285750">
-              <a:lnSpc>
-                <a:spcPct val="107000"/>
-              </a:lnSpc>
-              <a:spcBef>
-                <a:spcPts val="0"/>
-              </a:spcBef>
-              <a:spcAft>
-                <a:spcPts val="0"/>
-              </a:spcAft>
-              <a:buFont typeface="Courier New" panose="02070309020205020404" pitchFamily="49" charset="0"/>
-              <a:buChar char="o"/>
-            </a:pPr>
-            <a:r>
-              <a:rPr lang="en-US" sz="2400" dirty="0">
-                <a:latin typeface="Calibri" panose="020F0502020204030204" pitchFamily="34" charset="0"/>
-                <a:ea typeface="Calibri" panose="020F0502020204030204" pitchFamily="34" charset="0"/>
-                <a:cs typeface="Times New Roman" panose="02020603050405020304" pitchFamily="18" charset="0"/>
-              </a:rPr>
-              <a:t>Lane positioning</a:t>
-            </a:r>
-          </a:p>
-          <a:p>
-            <a:pPr marL="742950" marR="0" lvl="1" indent="-285750">
-              <a:lnSpc>
-                <a:spcPct val="107000"/>
-              </a:lnSpc>
-              <a:spcBef>
-                <a:spcPts val="0"/>
-              </a:spcBef>
-              <a:spcAft>
-                <a:spcPts val="800"/>
-              </a:spcAft>
-              <a:buFont typeface="Courier New" panose="02070309020205020404" pitchFamily="49" charset="0"/>
-              <a:buChar char="o"/>
-            </a:pPr>
-            <a:r>
-              <a:rPr lang="en-US" sz="2400" dirty="0">
-                <a:latin typeface="Calibri" panose="020F0502020204030204" pitchFamily="34" charset="0"/>
-                <a:ea typeface="Calibri" panose="020F0502020204030204" pitchFamily="34" charset="0"/>
-                <a:cs typeface="Times New Roman" panose="02020603050405020304" pitchFamily="18" charset="0"/>
-              </a:rPr>
-              <a:t>Traffic density</a:t>
-            </a:r>
-            <a:endParaRPr lang="en-US" sz="2400" dirty="0">
-              <a:effectLst/>
-              <a:latin typeface="Calibri" panose="020F0502020204030204" pitchFamily="34" charset="0"/>
-              <a:ea typeface="Calibri" panose="020F0502020204030204" pitchFamily="34" charset="0"/>
-              <a:cs typeface="Times New Roman" panose="02020603050405020304" pitchFamily="18" charset="0"/>
-            </a:endParaRPr>
-          </a:p>
-        </p:txBody>
-      </p:sp>
-      <p:sp>
-        <p:nvSpPr>
-          <p:cNvPr id="3" name="TextBox 2"/>
+          <p:cNvPr id="10" name="TextBox 9"/>
           <p:cNvSpPr txBox="1"/>
           <p:nvPr/>
         </p:nvSpPr>
         <p:spPr>
           <a:xfrm>
             <a:off x="457200" y="199181"/>
-            <a:ext cx="2971800" cy="461665"/>
+            <a:ext cx="4876800" cy="461665"/>
           </a:xfrm>
           <a:prstGeom prst="rect">
             <a:avLst/>
@@ -7441,7 +7615,7 @@
                 </a:solidFill>
                 <a:latin typeface="Fast Money" pitchFamily="2" charset="0"/>
               </a:rPr>
-              <a:t>PROBLEM</a:t>
+              <a:t>Schematics</a:t>
             </a:r>
             <a:endParaRPr lang="en-US" sz="2400" dirty="0">
               <a:solidFill>
@@ -7452,10 +7626,56 @@
           </a:p>
         </p:txBody>
       </p:sp>
+      <p:pic>
+        <p:nvPicPr>
+          <p:cNvPr id="2" name="Picture 1"/>
+          <p:cNvPicPr>
+            <a:picLocks noChangeAspect="1"/>
+          </p:cNvPicPr>
+          <p:nvPr/>
+        </p:nvPicPr>
+        <p:blipFill rotWithShape="1">
+          <a:blip r:embed="rId4"/>
+          <a:srcRect l="24231" t="20330" r="15447" b="6044"/>
+          <a:stretch/>
+        </p:blipFill>
+        <p:spPr>
+          <a:xfrm>
+            <a:off x="533399" y="2097687"/>
+            <a:ext cx="4648202" cy="3023588"/>
+          </a:xfrm>
+          <a:prstGeom prst="rect">
+            <a:avLst/>
+          </a:prstGeom>
+        </p:spPr>
+      </p:pic>
+      <p:pic>
+        <p:nvPicPr>
+          <p:cNvPr id="5" name="Picture 4"/>
+          <p:cNvPicPr>
+            <a:picLocks noChangeAspect="1"/>
+          </p:cNvPicPr>
+          <p:nvPr/>
+        </p:nvPicPr>
+        <p:blipFill rotWithShape="1">
+          <a:blip r:embed="rId5"/>
+          <a:srcRect l="27746" t="20330" r="25402" b="8242"/>
+          <a:stretch/>
+        </p:blipFill>
+        <p:spPr>
+          <a:xfrm>
+            <a:off x="5351060" y="2097686"/>
+            <a:ext cx="3420448" cy="2779113"/>
+          </a:xfrm>
+          <a:prstGeom prst="rect">
+            <a:avLst/>
+          </a:prstGeom>
+        </p:spPr>
+      </p:pic>
     </p:spTree>
     <p:extLst>
       <p:ext uri="{BB962C8B-B14F-4D97-AF65-F5344CB8AC3E}">
-        <p14:creationId xmlns:p14="http://schemas.microsoft.com/office/powerpoint/2010/main" val="2706470271"/>
+        <p14:creationId xmlns:p14="http://schemas.microsoft.com/office/powerpoint/2010/main" val="3216878000"/>
       </p:ext>
     </p:extLst>
   </p:cSld>
@@ -7472,7 +7692,7 @@
 </p:sld>
 </file>
 
-<file path=ppt/slides/slide3.xml><?xml version="1.0" encoding="utf-8"?>
+<file path=ppt/slides/slide18.xml><?xml version="1.0" encoding="utf-8"?>
 <p:sld xmlns:a="http://schemas.openxmlformats.org/drawingml/2006/main" xmlns:r="http://schemas.openxmlformats.org/officeDocument/2006/relationships" xmlns:p="http://schemas.openxmlformats.org/presentationml/2006/main">
   <p:cSld>
     <p:spTree>
@@ -7507,7 +7727,7 @@
             <a:fld id="{B6F15528-21DE-4FAA-801E-634DDDAF4B2B}" type="slidenum">
               <a:rPr lang="en-US" smtClean="0"/>
               <a:pPr/>
-              <a:t>3</a:t>
+              <a:t>18</a:t>
             </a:fld>
             <a:endParaRPr lang="en-US"/>
           </a:p>
@@ -7591,176 +7811,14 @@
       </p:cxnSp>
       <p:sp>
         <p:nvSpPr>
-          <p:cNvPr id="2" name="Rectangle 1"/>
-          <p:cNvSpPr/>
-          <p:nvPr/>
-        </p:nvSpPr>
-        <p:spPr>
-          <a:xfrm>
-            <a:off x="555006" y="1062363"/>
-            <a:ext cx="8131793" cy="5155066"/>
-          </a:xfrm>
-          <a:prstGeom prst="rect">
-            <a:avLst/>
-          </a:prstGeom>
-        </p:spPr>
-        <p:txBody>
-          <a:bodyPr wrap="square">
-            <a:spAutoFit/>
-          </a:bodyPr>
-          <a:lstStyle/>
-          <a:p>
-            <a:pPr>
-              <a:lnSpc>
-                <a:spcPct val="107000"/>
-              </a:lnSpc>
-              <a:spcAft>
-                <a:spcPts val="800"/>
-              </a:spcAft>
-            </a:pPr>
-            <a:r>
-              <a:rPr lang="en-US" sz="2400" dirty="0" smtClean="0">
-                <a:latin typeface="Calibri" panose="020F0502020204030204" pitchFamily="34" charset="0"/>
-                <a:ea typeface="Calibri" panose="020F0502020204030204" pitchFamily="34" charset="0"/>
-                <a:cs typeface="Times New Roman" panose="02020603050405020304" pitchFamily="18" charset="0"/>
-              </a:rPr>
-              <a:t>A </a:t>
-            </a:r>
-            <a:r>
-              <a:rPr lang="en-US" sz="2400" dirty="0" smtClean="0">
-                <a:latin typeface="Calibri" panose="020F0502020204030204" pitchFamily="34" charset="0"/>
-                <a:ea typeface="Calibri" panose="020F0502020204030204" pitchFamily="34" charset="0"/>
-                <a:cs typeface="Times New Roman" panose="02020603050405020304" pitchFamily="18" charset="0"/>
-              </a:rPr>
-              <a:t>working prototype that will give visual indication of position of close proximity traffic to the rear and sides of the motorcycle behind the rider’s field of view.  A simple non-video display will lend an old-school vibe to appeal to vintage enthusiasts.</a:t>
-            </a:r>
-          </a:p>
-          <a:p>
-            <a:pPr>
-              <a:lnSpc>
-                <a:spcPct val="107000"/>
-              </a:lnSpc>
-              <a:spcAft>
-                <a:spcPts val="800"/>
-              </a:spcAft>
-            </a:pPr>
-            <a:endParaRPr lang="en-US" sz="2400" dirty="0" smtClean="0">
-              <a:latin typeface="Calibri" panose="020F0502020204030204" pitchFamily="34" charset="0"/>
-              <a:ea typeface="Calibri" panose="020F0502020204030204" pitchFamily="34" charset="0"/>
-              <a:cs typeface="Times New Roman" panose="02020603050405020304" pitchFamily="18" charset="0"/>
-            </a:endParaRPr>
-          </a:p>
-          <a:p>
-            <a:r>
-              <a:rPr lang="en-US" sz="2400" b="1" dirty="0" smtClean="0"/>
-              <a:t>Alternatives</a:t>
-            </a:r>
-            <a:endParaRPr lang="en-US" sz="2400" dirty="0" smtClean="0"/>
-          </a:p>
-          <a:p>
-            <a:pPr marL="342900" lvl="0" indent="-342900">
-              <a:buFont typeface="Arial" panose="020B0604020202020204" pitchFamily="34" charset="0"/>
-              <a:buChar char="•"/>
-            </a:pPr>
-            <a:r>
-              <a:rPr lang="en-US" sz="2400" dirty="0" err="1" smtClean="0"/>
-              <a:t>Reevu</a:t>
-            </a:r>
-            <a:r>
-              <a:rPr lang="en-US" sz="2400" dirty="0" smtClean="0"/>
-              <a:t> MSX-1 Rear-View Helmet - $399.99</a:t>
-            </a:r>
-          </a:p>
-          <a:p>
-            <a:pPr marL="800100" lvl="1" indent="-342900">
-              <a:buFont typeface="Arial" panose="020B0604020202020204" pitchFamily="34" charset="0"/>
-              <a:buChar char="•"/>
-            </a:pPr>
-            <a:r>
-              <a:rPr lang="en-US" sz="2400" dirty="0" smtClean="0"/>
-              <a:t>Internal rear-view mirror, works off rear-reflection</a:t>
-            </a:r>
-          </a:p>
-          <a:p>
-            <a:pPr marL="342900" lvl="0" indent="-342900">
-              <a:buFont typeface="Arial" panose="020B0604020202020204" pitchFamily="34" charset="0"/>
-              <a:buChar char="•"/>
-            </a:pPr>
-            <a:r>
-              <a:rPr lang="en-US" sz="2400" dirty="0" err="1" smtClean="0"/>
-              <a:t>Skully</a:t>
-            </a:r>
-            <a:r>
-              <a:rPr lang="en-US" sz="2400" dirty="0" smtClean="0"/>
-              <a:t> AR-1 Helmet - $1499</a:t>
-            </a:r>
-          </a:p>
-          <a:p>
-            <a:pPr marL="800100" lvl="1" indent="-342900">
-              <a:buFont typeface="Arial" panose="020B0604020202020204" pitchFamily="34" charset="0"/>
-              <a:buChar char="•"/>
-            </a:pPr>
-            <a:r>
-              <a:rPr lang="en-US" sz="2400" dirty="0" smtClean="0"/>
-              <a:t>Rear-view camera, internal HUD</a:t>
-            </a:r>
-          </a:p>
-          <a:p>
-            <a:pPr marL="342900" lvl="0" indent="-342900">
-              <a:buFont typeface="Arial" panose="020B0604020202020204" pitchFamily="34" charset="0"/>
-              <a:buChar char="•"/>
-            </a:pPr>
-            <a:r>
-              <a:rPr lang="en-US" sz="2400" dirty="0" smtClean="0"/>
-              <a:t>Lucky Bike </a:t>
-            </a:r>
-            <a:r>
-              <a:rPr lang="en-US" sz="2400" dirty="0" err="1" smtClean="0"/>
-              <a:t>Motorcyle</a:t>
-            </a:r>
-            <a:r>
-              <a:rPr lang="en-US" sz="2400" dirty="0" smtClean="0"/>
-              <a:t> Rear-View Camera System - $89</a:t>
-            </a:r>
-          </a:p>
-          <a:p>
-            <a:pPr marL="800100" lvl="1" indent="-342900">
-              <a:buFont typeface="Arial" panose="020B0604020202020204" pitchFamily="34" charset="0"/>
-              <a:buChar char="•"/>
-            </a:pPr>
-            <a:r>
-              <a:rPr lang="en-US" sz="2400" dirty="0" smtClean="0"/>
-              <a:t>4.3” Video display with night vision</a:t>
-            </a:r>
-          </a:p>
-          <a:p>
-            <a:pPr>
-              <a:lnSpc>
-                <a:spcPct val="107000"/>
-              </a:lnSpc>
-              <a:spcAft>
-                <a:spcPts val="800"/>
-              </a:spcAft>
-            </a:pPr>
-            <a:endParaRPr lang="en-US" dirty="0">
-              <a:effectLst/>
-              <a:latin typeface="Calibri" panose="020F0502020204030204" pitchFamily="34" charset="0"/>
-              <a:ea typeface="Calibri" panose="020F0502020204030204" pitchFamily="34" charset="0"/>
-              <a:cs typeface="Times New Roman" panose="02020603050405020304" pitchFamily="18" charset="0"/>
-            </a:endParaRPr>
-          </a:p>
-        </p:txBody>
-      </p:sp>
-      <p:sp>
-        <p:nvSpPr>
-          <p:cNvPr id="11" name="TextBox 10"/>
+          <p:cNvPr id="10" name="TextBox 9"/>
           <p:cNvSpPr txBox="1"/>
           <p:nvPr/>
         </p:nvSpPr>
         <p:spPr>
           <a:xfrm>
             <a:off x="457200" y="199181"/>
-            <a:ext cx="2971800" cy="461665"/>
+            <a:ext cx="4876800" cy="461665"/>
           </a:xfrm>
           <a:prstGeom prst="rect">
             <a:avLst/>
@@ -7780,7 +7838,7 @@
                 </a:solidFill>
                 <a:latin typeface="Fast Money" pitchFamily="2" charset="0"/>
               </a:rPr>
-              <a:t>Objective</a:t>
+              <a:t>Schematics</a:t>
             </a:r>
             <a:endParaRPr lang="en-US" sz="2400" dirty="0">
               <a:solidFill>
@@ -7791,10 +7849,56 @@
           </a:p>
         </p:txBody>
       </p:sp>
+      <p:pic>
+        <p:nvPicPr>
+          <p:cNvPr id="2" name="Picture 1"/>
+          <p:cNvPicPr>
+            <a:picLocks noChangeAspect="1"/>
+          </p:cNvPicPr>
+          <p:nvPr/>
+        </p:nvPicPr>
+        <p:blipFill rotWithShape="1">
+          <a:blip r:embed="rId4"/>
+          <a:srcRect l="24817" t="21428" r="16033" b="6044"/>
+          <a:stretch/>
+        </p:blipFill>
+        <p:spPr>
+          <a:xfrm>
+            <a:off x="533399" y="942766"/>
+            <a:ext cx="4620956" cy="3019634"/>
+          </a:xfrm>
+          <a:prstGeom prst="rect">
+            <a:avLst/>
+          </a:prstGeom>
+        </p:spPr>
+      </p:pic>
+      <p:pic>
+        <p:nvPicPr>
+          <p:cNvPr id="5" name="Picture 4"/>
+          <p:cNvPicPr>
+            <a:picLocks noChangeAspect="1"/>
+          </p:cNvPicPr>
+          <p:nvPr/>
+        </p:nvPicPr>
+        <p:blipFill rotWithShape="1">
+          <a:blip r:embed="rId5"/>
+          <a:srcRect l="27746" t="57692" r="36530" b="7143"/>
+          <a:stretch/>
+        </p:blipFill>
+        <p:spPr>
+          <a:xfrm>
+            <a:off x="3581400" y="3954344"/>
+            <a:ext cx="4648201" cy="2438400"/>
+          </a:xfrm>
+          <a:prstGeom prst="rect">
+            <a:avLst/>
+          </a:prstGeom>
+        </p:spPr>
+      </p:pic>
     </p:spTree>
     <p:extLst>
       <p:ext uri="{BB962C8B-B14F-4D97-AF65-F5344CB8AC3E}">
-        <p14:creationId xmlns:p14="http://schemas.microsoft.com/office/powerpoint/2010/main" val="1664973044"/>
+        <p14:creationId xmlns:p14="http://schemas.microsoft.com/office/powerpoint/2010/main" val="2956644823"/>
       </p:ext>
     </p:extLst>
   </p:cSld>
@@ -7811,7 +7915,7 @@
 </p:sld>
 </file>
 
-<file path=ppt/slides/slide4.xml><?xml version="1.0" encoding="utf-8"?>
+<file path=ppt/slides/slide2.xml><?xml version="1.0" encoding="utf-8"?>
 <p:sld xmlns:a="http://schemas.openxmlformats.org/drawingml/2006/main" xmlns:r="http://schemas.openxmlformats.org/officeDocument/2006/relationships" xmlns:p="http://schemas.openxmlformats.org/presentationml/2006/main">
   <p:cSld>
     <p:spTree>
@@ -7846,7 +7950,7 @@
             <a:fld id="{B6F15528-21DE-4FAA-801E-634DDDAF4B2B}" type="slidenum">
               <a:rPr lang="en-US" smtClean="0"/>
               <a:pPr/>
-              <a:t>4</a:t>
+              <a:t>2</a:t>
             </a:fld>
             <a:endParaRPr lang="en-US"/>
           </a:p>
@@ -7930,14 +8034,14 @@
       </p:cxnSp>
       <p:sp>
         <p:nvSpPr>
-          <p:cNvPr id="3" name="Rectangle 2"/>
+          <p:cNvPr id="2" name="Rectangle 1"/>
           <p:cNvSpPr/>
           <p:nvPr/>
         </p:nvSpPr>
         <p:spPr>
           <a:xfrm>
-            <a:off x="524298" y="1003608"/>
-            <a:ext cx="8162501" cy="3751476"/>
+            <a:off x="533397" y="1066800"/>
+            <a:ext cx="8153403" cy="3648884"/>
           </a:xfrm>
           <a:prstGeom prst="rect">
             <a:avLst/>
@@ -7948,29 +8052,6 @@
             <a:spAutoFit/>
           </a:bodyPr>
           <a:lstStyle/>
-          <a:p>
-            <a:pPr>
-              <a:lnSpc>
-                <a:spcPct val="107000"/>
-              </a:lnSpc>
-              <a:spcAft>
-                <a:spcPts val="800"/>
-              </a:spcAft>
-            </a:pPr>
-            <a:r>
-              <a:rPr lang="en-US" sz="2400" b="1" dirty="0">
-                <a:latin typeface="Calibri" panose="020F0502020204030204" pitchFamily="34" charset="0"/>
-                <a:ea typeface="Calibri" panose="020F0502020204030204" pitchFamily="34" charset="0"/>
-                <a:cs typeface="Times New Roman" panose="02020603050405020304" pitchFamily="18" charset="0"/>
-              </a:rPr>
-              <a:t>Requirements</a:t>
-            </a:r>
-            <a:endParaRPr lang="en-US" sz="2400" dirty="0">
-              <a:latin typeface="Calibri" panose="020F0502020204030204" pitchFamily="34" charset="0"/>
-              <a:ea typeface="Calibri" panose="020F0502020204030204" pitchFamily="34" charset="0"/>
-              <a:cs typeface="Times New Roman" panose="02020603050405020304" pitchFamily="18" charset="0"/>
-            </a:endParaRPr>
-          </a:p>
           <a:p>
             <a:pPr marL="342900" marR="0" lvl="0" indent="-342900">
               <a:lnSpc>
@@ -7982,30 +8063,48 @@
               <a:spcAft>
                 <a:spcPts val="0"/>
               </a:spcAft>
-              <a:buFont typeface="Arial" panose="020B0604020202020204" pitchFamily="34" charset="0"/>
-              <a:buChar char="•"/>
+              <a:buFont typeface="Symbol" panose="05050102010706020507" pitchFamily="18" charset="2"/>
+              <a:buChar char=""/>
             </a:pPr>
+            <a:r>
+              <a:rPr lang="en-US" sz="2400" dirty="0" smtClean="0">
+                <a:latin typeface="Calibri" panose="020F0502020204030204" pitchFamily="34" charset="0"/>
+                <a:ea typeface="Calibri" panose="020F0502020204030204" pitchFamily="34" charset="0"/>
+                <a:cs typeface="Times New Roman" panose="02020603050405020304" pitchFamily="18" charset="0"/>
+              </a:rPr>
+              <a:t>Limited </a:t>
+            </a:r>
             <a:r>
               <a:rPr lang="en-US" sz="2400" dirty="0">
                 <a:latin typeface="Calibri" panose="020F0502020204030204" pitchFamily="34" charset="0"/>
                 <a:ea typeface="Calibri" panose="020F0502020204030204" pitchFamily="34" charset="0"/>
                 <a:cs typeface="Times New Roman" panose="02020603050405020304" pitchFamily="18" charset="0"/>
               </a:rPr>
-              <a:t>Easy to </a:t>
-            </a:r>
-            <a:r>
-              <a:rPr lang="en-US" sz="2400" dirty="0" smtClean="0">
+              <a:t>rear and blind spot visibility for motorcycle riders wearing full-faced helmets.</a:t>
+            </a:r>
+          </a:p>
+          <a:p>
+            <a:pPr marL="742950" marR="0" lvl="1" indent="-285750">
+              <a:lnSpc>
+                <a:spcPct val="107000"/>
+              </a:lnSpc>
+              <a:spcBef>
+                <a:spcPts val="0"/>
+              </a:spcBef>
+              <a:spcAft>
+                <a:spcPts val="0"/>
+              </a:spcAft>
+              <a:buFont typeface="Courier New" panose="02070309020205020404" pitchFamily="49" charset="0"/>
+              <a:buChar char="o"/>
+            </a:pPr>
+            <a:r>
+              <a:rPr lang="en-US" sz="2400" dirty="0">
                 <a:latin typeface="Calibri" panose="020F0502020204030204" pitchFamily="34" charset="0"/>
                 <a:ea typeface="Calibri" panose="020F0502020204030204" pitchFamily="34" charset="0"/>
                 <a:cs typeface="Times New Roman" panose="02020603050405020304" pitchFamily="18" charset="0"/>
               </a:rPr>
-              <a:t>use</a:t>
-            </a:r>
-            <a:endParaRPr lang="en-US" sz="2400" dirty="0">
-              <a:latin typeface="Calibri" panose="020F0502020204030204" pitchFamily="34" charset="0"/>
-              <a:ea typeface="Calibri" panose="020F0502020204030204" pitchFamily="34" charset="0"/>
-              <a:cs typeface="Times New Roman" panose="02020603050405020304" pitchFamily="18" charset="0"/>
-            </a:endParaRPr>
+              <a:t>Turning head takes attention off the road in front</a:t>
+            </a:r>
           </a:p>
           <a:p>
             <a:pPr marL="342900" marR="0" lvl="0" indent="-342900">
@@ -8018,17 +8117,62 @@
               <a:spcAft>
                 <a:spcPts val="0"/>
               </a:spcAft>
-              <a:buFont typeface="Arial" panose="020B0604020202020204" pitchFamily="34" charset="0"/>
-              <a:buChar char="•"/>
+              <a:buFont typeface="Symbol" panose="05050102010706020507" pitchFamily="18" charset="2"/>
+              <a:buChar char=""/>
             </a:pPr>
             <a:r>
-              <a:rPr lang="en-US" sz="2400" dirty="0" smtClean="0">
-                <a:effectLst/>
+              <a:rPr lang="en-US" sz="2400" dirty="0">
                 <a:latin typeface="Calibri" panose="020F0502020204030204" pitchFamily="34" charset="0"/>
                 <a:ea typeface="Calibri" panose="020F0502020204030204" pitchFamily="34" charset="0"/>
                 <a:cs typeface="Times New Roman" panose="02020603050405020304" pitchFamily="18" charset="0"/>
               </a:rPr>
-              <a:t>Real-time visual indication of distance to rear and sides</a:t>
+              <a:t>Rearview mirrors are not always reliable or easy to see</a:t>
+            </a:r>
+          </a:p>
+          <a:p>
+            <a:pPr marL="742950" marR="0" lvl="1" indent="-285750">
+              <a:lnSpc>
+                <a:spcPct val="107000"/>
+              </a:lnSpc>
+              <a:spcBef>
+                <a:spcPts val="0"/>
+              </a:spcBef>
+              <a:spcAft>
+                <a:spcPts val="0"/>
+              </a:spcAft>
+              <a:buFont typeface="Courier New" panose="02070309020205020404" pitchFamily="49" charset="0"/>
+              <a:buChar char="o"/>
+            </a:pPr>
+            <a:r>
+              <a:rPr lang="en-US" sz="2400" dirty="0">
+                <a:latin typeface="Calibri" panose="020F0502020204030204" pitchFamily="34" charset="0"/>
+                <a:ea typeface="Calibri" panose="020F0502020204030204" pitchFamily="34" charset="0"/>
+                <a:cs typeface="Times New Roman" panose="02020603050405020304" pitchFamily="18" charset="0"/>
+              </a:rPr>
+              <a:t>Bar end mirrors</a:t>
+            </a:r>
+          </a:p>
+          <a:p>
+            <a:pPr marL="742950" marR="0" lvl="1" indent="-285750">
+              <a:lnSpc>
+                <a:spcPct val="107000"/>
+              </a:lnSpc>
+              <a:spcBef>
+                <a:spcPts val="0"/>
+              </a:spcBef>
+              <a:spcAft>
+                <a:spcPts val="0"/>
+              </a:spcAft>
+              <a:buFont typeface="Courier New" panose="02070309020205020404" pitchFamily="49" charset="0"/>
+              <a:buChar char="o"/>
+            </a:pPr>
+            <a:r>
+              <a:rPr lang="en-US" sz="2400" dirty="0">
+                <a:latin typeface="Calibri" panose="020F0502020204030204" pitchFamily="34" charset="0"/>
+                <a:ea typeface="Calibri" panose="020F0502020204030204" pitchFamily="34" charset="0"/>
+                <a:cs typeface="Times New Roman" panose="02020603050405020304" pitchFamily="18" charset="0"/>
+              </a:rPr>
+              <a:t>Vibration</a:t>
             </a:r>
           </a:p>
           <a:p>
@@ -8042,20 +8186,20 @@
               <a:spcAft>
                 <a:spcPts val="0"/>
               </a:spcAft>
-              <a:buFont typeface="Arial" panose="020B0604020202020204" pitchFamily="34" charset="0"/>
-              <a:buChar char="•"/>
+              <a:buFont typeface="Symbol" panose="05050102010706020507" pitchFamily="18" charset="2"/>
+              <a:buChar char=""/>
             </a:pPr>
             <a:r>
-              <a:rPr lang="en-US" sz="2400" dirty="0" smtClean="0">
+              <a:rPr lang="en-US" sz="2400" dirty="0">
                 <a:latin typeface="Calibri" panose="020F0502020204030204" pitchFamily="34" charset="0"/>
                 <a:ea typeface="Calibri" panose="020F0502020204030204" pitchFamily="34" charset="0"/>
                 <a:cs typeface="Times New Roman" panose="02020603050405020304" pitchFamily="18" charset="0"/>
               </a:rPr>
-              <a:t>Three zones</a:t>
-            </a:r>
-          </a:p>
-          <a:p>
-            <a:pPr marL="342900" marR="0" lvl="0" indent="-342900">
+              <a:t>Safety and riding awareness</a:t>
+            </a:r>
+          </a:p>
+          <a:p>
+            <a:pPr marL="742950" marR="0" lvl="1" indent="-285750">
               <a:lnSpc>
                 <a:spcPct val="107000"/>
               </a:lnSpc>
@@ -8065,65 +8209,20 @@
               <a:spcAft>
                 <a:spcPts val="0"/>
               </a:spcAft>
-              <a:buFont typeface="Arial" panose="020B0604020202020204" pitchFamily="34" charset="0"/>
-              <a:buChar char="•"/>
+              <a:buFont typeface="Courier New" panose="02070309020205020404" pitchFamily="49" charset="0"/>
+              <a:buChar char="o"/>
             </a:pPr>
             <a:r>
-              <a:rPr lang="en-US" sz="2400" dirty="0" smtClean="0">
+              <a:rPr lang="en-US" sz="2400" dirty="0">
                 <a:latin typeface="Calibri" panose="020F0502020204030204" pitchFamily="34" charset="0"/>
                 <a:ea typeface="Calibri" panose="020F0502020204030204" pitchFamily="34" charset="0"/>
                 <a:cs typeface="Times New Roman" panose="02020603050405020304" pitchFamily="18" charset="0"/>
               </a:rPr>
-              <a:t>0-5 </a:t>
-            </a:r>
-            <a:r>
-              <a:rPr lang="en-US" sz="2400" dirty="0" err="1" smtClean="0">
-                <a:latin typeface="Calibri" panose="020F0502020204030204" pitchFamily="34" charset="0"/>
-                <a:ea typeface="Calibri" panose="020F0502020204030204" pitchFamily="34" charset="0"/>
-                <a:cs typeface="Times New Roman" panose="02020603050405020304" pitchFamily="18" charset="0"/>
-              </a:rPr>
-              <a:t>ft</a:t>
-            </a:r>
-            <a:r>
-              <a:rPr lang="en-US" sz="2400" dirty="0" smtClean="0">
-                <a:latin typeface="Calibri" panose="020F0502020204030204" pitchFamily="34" charset="0"/>
-                <a:ea typeface="Calibri" panose="020F0502020204030204" pitchFamily="34" charset="0"/>
-                <a:cs typeface="Times New Roman" panose="02020603050405020304" pitchFamily="18" charset="0"/>
-              </a:rPr>
-              <a:t>, 5-10 </a:t>
-            </a:r>
-            <a:r>
-              <a:rPr lang="en-US" sz="2400" dirty="0" err="1" smtClean="0">
-                <a:latin typeface="Calibri" panose="020F0502020204030204" pitchFamily="34" charset="0"/>
-                <a:ea typeface="Calibri" panose="020F0502020204030204" pitchFamily="34" charset="0"/>
-                <a:cs typeface="Times New Roman" panose="02020603050405020304" pitchFamily="18" charset="0"/>
-              </a:rPr>
-              <a:t>ft</a:t>
-            </a:r>
-            <a:r>
-              <a:rPr lang="en-US" sz="2400" dirty="0" smtClean="0">
-                <a:latin typeface="Calibri" panose="020F0502020204030204" pitchFamily="34" charset="0"/>
-                <a:ea typeface="Calibri" panose="020F0502020204030204" pitchFamily="34" charset="0"/>
-                <a:cs typeface="Times New Roman" panose="02020603050405020304" pitchFamily="18" charset="0"/>
-              </a:rPr>
-              <a:t>, 10-15 </a:t>
-            </a:r>
-            <a:r>
-              <a:rPr lang="en-US" sz="2400" dirty="0" err="1" smtClean="0">
-                <a:latin typeface="Calibri" panose="020F0502020204030204" pitchFamily="34" charset="0"/>
-                <a:ea typeface="Calibri" panose="020F0502020204030204" pitchFamily="34" charset="0"/>
-                <a:cs typeface="Times New Roman" panose="02020603050405020304" pitchFamily="18" charset="0"/>
-              </a:rPr>
-              <a:t>ft</a:t>
-            </a:r>
-            <a:endParaRPr lang="en-US" sz="2400" dirty="0">
-              <a:latin typeface="Calibri" panose="020F0502020204030204" pitchFamily="34" charset="0"/>
-              <a:ea typeface="Calibri" panose="020F0502020204030204" pitchFamily="34" charset="0"/>
-              <a:cs typeface="Times New Roman" panose="02020603050405020304" pitchFamily="18" charset="0"/>
-            </a:endParaRPr>
-          </a:p>
-          <a:p>
-            <a:pPr marL="342900" marR="0" lvl="0" indent="-342900">
+              <a:t>Lane positioning</a:t>
+            </a:r>
+          </a:p>
+          <a:p>
+            <a:pPr marL="742950" marR="0" lvl="1" indent="-285750">
               <a:lnSpc>
                 <a:spcPct val="107000"/>
               </a:lnSpc>
@@ -8131,102 +8230,38 @@
                 <a:spcPts val="0"/>
               </a:spcBef>
               <a:spcAft>
-                <a:spcPts val="0"/>
+                <a:spcPts val="800"/>
               </a:spcAft>
-              <a:buFont typeface="Arial" panose="020B0604020202020204" pitchFamily="34" charset="0"/>
-              <a:buChar char="•"/>
+              <a:buFont typeface="Courier New" panose="02070309020205020404" pitchFamily="49" charset="0"/>
+              <a:buChar char="o"/>
             </a:pPr>
             <a:r>
-              <a:rPr lang="en-US" sz="2400" dirty="0" smtClean="0">
-                <a:effectLst/>
+              <a:rPr lang="en-US" sz="2400" dirty="0">
                 <a:latin typeface="Calibri" panose="020F0502020204030204" pitchFamily="34" charset="0"/>
                 <a:ea typeface="Calibri" panose="020F0502020204030204" pitchFamily="34" charset="0"/>
                 <a:cs typeface="Times New Roman" panose="02020603050405020304" pitchFamily="18" charset="0"/>
               </a:rPr>
-              <a:t>Weather resistant</a:t>
-            </a:r>
-          </a:p>
-          <a:p>
-            <a:pPr marL="342900" marR="0" lvl="0" indent="-342900">
-              <a:lnSpc>
-                <a:spcPct val="107000"/>
-              </a:lnSpc>
-              <a:spcBef>
-                <a:spcPts val="0"/>
-              </a:spcBef>
-              <a:spcAft>
-                <a:spcPts val="0"/>
-              </a:spcAft>
-              <a:buFont typeface="Arial" panose="020B0604020202020204" pitchFamily="34" charset="0"/>
-              <a:buChar char="•"/>
-            </a:pPr>
-            <a:r>
-              <a:rPr lang="en-US" sz="2400" dirty="0" smtClean="0">
-                <a:latin typeface="Calibri" panose="020F0502020204030204" pitchFamily="34" charset="0"/>
-                <a:ea typeface="Calibri" panose="020F0502020204030204" pitchFamily="34" charset="0"/>
-                <a:cs typeface="Times New Roman" panose="02020603050405020304" pitchFamily="18" charset="0"/>
-              </a:rPr>
-              <a:t>Battery powered</a:t>
-            </a:r>
-          </a:p>
-          <a:p>
-            <a:pPr marL="342900" marR="0" lvl="0" indent="-342900">
-              <a:lnSpc>
-                <a:spcPct val="107000"/>
-              </a:lnSpc>
-              <a:spcBef>
-                <a:spcPts val="0"/>
-              </a:spcBef>
-              <a:spcAft>
-                <a:spcPts val="0"/>
-              </a:spcAft>
-              <a:buFont typeface="Arial" panose="020B0604020202020204" pitchFamily="34" charset="0"/>
-              <a:buChar char="•"/>
-            </a:pPr>
-            <a:r>
-              <a:rPr lang="en-US" sz="2400" dirty="0" smtClean="0">
-                <a:latin typeface="Calibri" panose="020F0502020204030204" pitchFamily="34" charset="0"/>
-                <a:ea typeface="Calibri" panose="020F0502020204030204" pitchFamily="34" charset="0"/>
-                <a:cs typeface="Times New Roman" panose="02020603050405020304" pitchFamily="18" charset="0"/>
-              </a:rPr>
-              <a:t>Bright enough for sunlit conditions.	</a:t>
-            </a:r>
-          </a:p>
-          <a:p>
-            <a:pPr marL="342900" marR="0" lvl="0" indent="-342900">
-              <a:lnSpc>
-                <a:spcPct val="107000"/>
-              </a:lnSpc>
-              <a:spcBef>
-                <a:spcPts val="0"/>
-              </a:spcBef>
-              <a:spcAft>
-                <a:spcPts val="0"/>
-              </a:spcAft>
-              <a:buFont typeface="Arial" panose="020B0604020202020204" pitchFamily="34" charset="0"/>
-              <a:buChar char="•"/>
-            </a:pPr>
-            <a:r>
-              <a:rPr lang="en-US" sz="2400" dirty="0" smtClean="0">
-                <a:latin typeface="Calibri" panose="020F0502020204030204" pitchFamily="34" charset="0"/>
-                <a:ea typeface="Calibri" panose="020F0502020204030204" pitchFamily="34" charset="0"/>
-                <a:cs typeface="Times New Roman" panose="02020603050405020304" pitchFamily="18" charset="0"/>
-              </a:rPr>
-              <a:t>Low profile and easily mounted</a:t>
-            </a:r>
-          </a:p>
-        </p:txBody>
-      </p:sp>
-      <p:sp>
-        <p:nvSpPr>
-          <p:cNvPr id="6" name="TextBox 5"/>
+              <a:t>Traffic density</a:t>
+            </a:r>
+            <a:endParaRPr lang="en-US" sz="2400" dirty="0">
+              <a:effectLst/>
+              <a:latin typeface="Calibri" panose="020F0502020204030204" pitchFamily="34" charset="0"/>
+              <a:ea typeface="Calibri" panose="020F0502020204030204" pitchFamily="34" charset="0"/>
+              <a:cs typeface="Times New Roman" panose="02020603050405020304" pitchFamily="18" charset="0"/>
+            </a:endParaRPr>
+          </a:p>
+        </p:txBody>
+      </p:sp>
+      <p:sp>
+        <p:nvSpPr>
+          <p:cNvPr id="3" name="TextBox 2"/>
           <p:cNvSpPr txBox="1"/>
           <p:nvPr/>
         </p:nvSpPr>
         <p:spPr>
           <a:xfrm>
             <a:off x="457200" y="199181"/>
-            <a:ext cx="4648200" cy="461665"/>
+            <a:ext cx="2971800" cy="461665"/>
           </a:xfrm>
           <a:prstGeom prst="rect">
             <a:avLst/>
@@ -8246,7 +8281,7 @@
                 </a:solidFill>
                 <a:latin typeface="Fast Money" pitchFamily="2" charset="0"/>
               </a:rPr>
-              <a:t>Requirements</a:t>
+              <a:t>PROBLEM</a:t>
             </a:r>
             <a:endParaRPr lang="en-US" sz="2400" dirty="0">
               <a:solidFill>
@@ -8260,7 +8295,7 @@
     </p:spTree>
     <p:extLst>
       <p:ext uri="{BB962C8B-B14F-4D97-AF65-F5344CB8AC3E}">
-        <p14:creationId xmlns:p14="http://schemas.microsoft.com/office/powerpoint/2010/main" val="2585547098"/>
+        <p14:creationId xmlns:p14="http://schemas.microsoft.com/office/powerpoint/2010/main" val="2706470271"/>
       </p:ext>
     </p:extLst>
   </p:cSld>
@@ -8277,7 +8312,7 @@
 </p:sld>
 </file>
 
-<file path=ppt/slides/slide5.xml><?xml version="1.0" encoding="utf-8"?>
+<file path=ppt/slides/slide3.xml><?xml version="1.0" encoding="utf-8"?>
 <p:sld xmlns:a="http://schemas.openxmlformats.org/drawingml/2006/main" xmlns:r="http://schemas.openxmlformats.org/officeDocument/2006/relationships" xmlns:p="http://schemas.openxmlformats.org/presentationml/2006/main">
   <p:cSld>
     <p:spTree>
@@ -8312,7 +8347,7 @@
             <a:fld id="{B6F15528-21DE-4FAA-801E-634DDDAF4B2B}" type="slidenum">
               <a:rPr lang="en-US" smtClean="0"/>
               <a:pPr/>
-              <a:t>5</a:t>
+              <a:t>3</a:t>
             </a:fld>
             <a:endParaRPr lang="en-US"/>
           </a:p>
@@ -8396,14 +8431,168 @@
       </p:cxnSp>
       <p:sp>
         <p:nvSpPr>
-          <p:cNvPr id="2" name="TextBox 1"/>
+          <p:cNvPr id="2" name="Rectangle 1"/>
+          <p:cNvSpPr/>
+          <p:nvPr/>
+        </p:nvSpPr>
+        <p:spPr>
+          <a:xfrm>
+            <a:off x="555006" y="1062363"/>
+            <a:ext cx="8131793" cy="5155066"/>
+          </a:xfrm>
+          <a:prstGeom prst="rect">
+            <a:avLst/>
+          </a:prstGeom>
+        </p:spPr>
+        <p:txBody>
+          <a:bodyPr wrap="square">
+            <a:spAutoFit/>
+          </a:bodyPr>
+          <a:lstStyle/>
+          <a:p>
+            <a:pPr>
+              <a:lnSpc>
+                <a:spcPct val="107000"/>
+              </a:lnSpc>
+              <a:spcAft>
+                <a:spcPts val="800"/>
+              </a:spcAft>
+            </a:pPr>
+            <a:r>
+              <a:rPr lang="en-US" sz="2400" dirty="0" smtClean="0">
+                <a:latin typeface="Calibri" panose="020F0502020204030204" pitchFamily="34" charset="0"/>
+                <a:ea typeface="Calibri" panose="020F0502020204030204" pitchFamily="34" charset="0"/>
+                <a:cs typeface="Times New Roman" panose="02020603050405020304" pitchFamily="18" charset="0"/>
+              </a:rPr>
+              <a:t>A working prototype that will give visual indication of position of close proximity traffic to the rear and sides of the motorcycle behind the rider’s field of view.  A simple non-video display will lend an old-school vibe to appeal to vintage enthusiasts.</a:t>
+            </a:r>
+          </a:p>
+          <a:p>
+            <a:pPr>
+              <a:lnSpc>
+                <a:spcPct val="107000"/>
+              </a:lnSpc>
+              <a:spcAft>
+                <a:spcPts val="800"/>
+              </a:spcAft>
+            </a:pPr>
+            <a:endParaRPr lang="en-US" sz="2400" dirty="0" smtClean="0">
+              <a:latin typeface="Calibri" panose="020F0502020204030204" pitchFamily="34" charset="0"/>
+              <a:ea typeface="Calibri" panose="020F0502020204030204" pitchFamily="34" charset="0"/>
+              <a:cs typeface="Times New Roman" panose="02020603050405020304" pitchFamily="18" charset="0"/>
+            </a:endParaRPr>
+          </a:p>
+          <a:p>
+            <a:r>
+              <a:rPr lang="en-US" sz="2400" b="1" dirty="0" smtClean="0"/>
+              <a:t>Alternatives</a:t>
+            </a:r>
+            <a:endParaRPr lang="en-US" sz="2400" dirty="0" smtClean="0"/>
+          </a:p>
+          <a:p>
+            <a:pPr marL="342900" lvl="0" indent="-342900">
+              <a:buFont typeface="Arial" panose="020B0604020202020204" pitchFamily="34" charset="0"/>
+              <a:buChar char="•"/>
+            </a:pPr>
+            <a:r>
+              <a:rPr lang="en-US" sz="2400" dirty="0" err="1" smtClean="0"/>
+              <a:t>Reevu</a:t>
+            </a:r>
+            <a:r>
+              <a:rPr lang="en-US" sz="2400" dirty="0" smtClean="0"/>
+              <a:t> MSX-1 Rear-View Helmet - $399.99</a:t>
+            </a:r>
+          </a:p>
+          <a:p>
+            <a:pPr marL="800100" lvl="1" indent="-342900">
+              <a:buFont typeface="Arial" panose="020B0604020202020204" pitchFamily="34" charset="0"/>
+              <a:buChar char="•"/>
+            </a:pPr>
+            <a:r>
+              <a:rPr lang="en-US" sz="2400" dirty="0" smtClean="0"/>
+              <a:t>Internal rear-view mirror, works off rear-reflection</a:t>
+            </a:r>
+          </a:p>
+          <a:p>
+            <a:pPr marL="342900" lvl="0" indent="-342900">
+              <a:buFont typeface="Arial" panose="020B0604020202020204" pitchFamily="34" charset="0"/>
+              <a:buChar char="•"/>
+            </a:pPr>
+            <a:r>
+              <a:rPr lang="en-US" sz="2400" dirty="0" err="1" smtClean="0"/>
+              <a:t>Skully</a:t>
+            </a:r>
+            <a:r>
+              <a:rPr lang="en-US" sz="2400" dirty="0" smtClean="0"/>
+              <a:t> AR-1 Helmet - $1499</a:t>
+            </a:r>
+          </a:p>
+          <a:p>
+            <a:pPr marL="800100" lvl="1" indent="-342900">
+              <a:buFont typeface="Arial" panose="020B0604020202020204" pitchFamily="34" charset="0"/>
+              <a:buChar char="•"/>
+            </a:pPr>
+            <a:r>
+              <a:rPr lang="en-US" sz="2400" dirty="0" smtClean="0"/>
+              <a:t>Rear-view camera, internal HUD</a:t>
+            </a:r>
+          </a:p>
+          <a:p>
+            <a:pPr marL="342900" lvl="0" indent="-342900">
+              <a:buFont typeface="Arial" panose="020B0604020202020204" pitchFamily="34" charset="0"/>
+              <a:buChar char="•"/>
+            </a:pPr>
+            <a:r>
+              <a:rPr lang="en-US" sz="2400" dirty="0" smtClean="0"/>
+              <a:t>Lucky Bike </a:t>
+            </a:r>
+            <a:r>
+              <a:rPr lang="en-US" sz="2400" dirty="0" err="1" smtClean="0"/>
+              <a:t>Motorcyle</a:t>
+            </a:r>
+            <a:r>
+              <a:rPr lang="en-US" sz="2400" dirty="0" smtClean="0"/>
+              <a:t> Rear-View Camera System - $89</a:t>
+            </a:r>
+          </a:p>
+          <a:p>
+            <a:pPr marL="800100" lvl="1" indent="-342900">
+              <a:buFont typeface="Arial" panose="020B0604020202020204" pitchFamily="34" charset="0"/>
+              <a:buChar char="•"/>
+            </a:pPr>
+            <a:r>
+              <a:rPr lang="en-US" sz="2400" dirty="0" smtClean="0"/>
+              <a:t>4.3” Video display with night vision</a:t>
+            </a:r>
+          </a:p>
+          <a:p>
+            <a:pPr>
+              <a:lnSpc>
+                <a:spcPct val="107000"/>
+              </a:lnSpc>
+              <a:spcAft>
+                <a:spcPts val="800"/>
+              </a:spcAft>
+            </a:pPr>
+            <a:endParaRPr lang="en-US" dirty="0">
+              <a:effectLst/>
+              <a:latin typeface="Calibri" panose="020F0502020204030204" pitchFamily="34" charset="0"/>
+              <a:ea typeface="Calibri" panose="020F0502020204030204" pitchFamily="34" charset="0"/>
+              <a:cs typeface="Times New Roman" panose="02020603050405020304" pitchFamily="18" charset="0"/>
+            </a:endParaRPr>
+          </a:p>
+        </p:txBody>
+      </p:sp>
+      <p:sp>
+        <p:nvSpPr>
+          <p:cNvPr id="11" name="TextBox 10"/>
           <p:cNvSpPr txBox="1"/>
           <p:nvPr/>
         </p:nvSpPr>
         <p:spPr>
           <a:xfrm>
-            <a:off x="533398" y="1066800"/>
-            <a:ext cx="7543802" cy="5355312"/>
+            <a:off x="457200" y="199181"/>
+            <a:ext cx="2971800" cy="461665"/>
           </a:xfrm>
           <a:prstGeom prst="rect">
             <a:avLst/>
@@ -8417,215 +8606,13 @@
           <a:lstStyle/>
           <a:p>
             <a:r>
-              <a:rPr lang="en-US" dirty="0" smtClean="0"/>
-              <a:t>Sensor Module</a:t>
-            </a:r>
-          </a:p>
-          <a:p>
-            <a:pPr marL="285750" indent="-285750">
-              <a:buFont typeface="Arial" panose="020B0604020202020204" pitchFamily="34" charset="0"/>
-              <a:buChar char="•"/>
-            </a:pPr>
-            <a:r>
-              <a:rPr lang="en-US" dirty="0" smtClean="0"/>
-              <a:t>Sensor range ~15ft.</a:t>
-            </a:r>
-          </a:p>
-          <a:p>
-            <a:pPr marL="285750" indent="-285750">
-              <a:buFont typeface="Arial" panose="020B0604020202020204" pitchFamily="34" charset="0"/>
-              <a:buChar char="•"/>
-            </a:pPr>
-            <a:r>
-              <a:rPr lang="en-US" dirty="0" smtClean="0"/>
-              <a:t>Type of sensor (ultrasonic, IR, </a:t>
-            </a:r>
-            <a:r>
-              <a:rPr lang="en-US" dirty="0" err="1" smtClean="0"/>
-              <a:t>etc</a:t>
-            </a:r>
-            <a:r>
-              <a:rPr lang="en-US" dirty="0" smtClean="0"/>
-              <a:t>)</a:t>
-            </a:r>
-          </a:p>
-          <a:p>
-            <a:pPr marL="285750" indent="-285750">
-              <a:buFont typeface="Arial" panose="020B0604020202020204" pitchFamily="34" charset="0"/>
-              <a:buChar char="•"/>
-            </a:pPr>
-            <a:r>
-              <a:rPr lang="en-US" dirty="0" smtClean="0"/>
-              <a:t>Integration with microprocessor</a:t>
-            </a:r>
-          </a:p>
-          <a:p>
-            <a:endParaRPr lang="en-US" dirty="0"/>
-          </a:p>
-          <a:p>
-            <a:r>
-              <a:rPr lang="en-US" dirty="0" smtClean="0"/>
-              <a:t>Power</a:t>
-            </a:r>
-          </a:p>
-          <a:p>
-            <a:pPr marL="285750" indent="-285750">
-              <a:buFont typeface="Arial" panose="020B0604020202020204" pitchFamily="34" charset="0"/>
-              <a:buChar char="•"/>
-            </a:pPr>
-            <a:r>
-              <a:rPr lang="en-US" dirty="0" smtClean="0"/>
-              <a:t>Regulation</a:t>
-            </a:r>
-          </a:p>
-          <a:p>
-            <a:pPr marL="285750" indent="-285750">
-              <a:buFont typeface="Arial" panose="020B0604020202020204" pitchFamily="34" charset="0"/>
-              <a:buChar char="•"/>
-            </a:pPr>
-            <a:r>
-              <a:rPr lang="en-US" dirty="0" smtClean="0"/>
-              <a:t>Sources</a:t>
-            </a:r>
-          </a:p>
-          <a:p>
-            <a:endParaRPr lang="en-US" dirty="0"/>
-          </a:p>
-          <a:p>
-            <a:r>
-              <a:rPr lang="en-US" dirty="0" smtClean="0"/>
-              <a:t>Microprocessor</a:t>
-            </a:r>
-          </a:p>
-          <a:p>
-            <a:pPr marL="285750" indent="-285750">
-              <a:buFont typeface="Arial" panose="020B0604020202020204" pitchFamily="34" charset="0"/>
-              <a:buChar char="•"/>
-            </a:pPr>
-            <a:r>
-              <a:rPr lang="en-US" dirty="0" smtClean="0"/>
-              <a:t>Number/type of I/O ports</a:t>
-            </a:r>
-          </a:p>
-          <a:p>
-            <a:pPr marL="285750" indent="-285750">
-              <a:buFont typeface="Arial" panose="020B0604020202020204" pitchFamily="34" charset="0"/>
-              <a:buChar char="•"/>
-            </a:pPr>
-            <a:r>
-              <a:rPr lang="en-US" dirty="0" smtClean="0"/>
-              <a:t>IDE/support</a:t>
-            </a:r>
-          </a:p>
-          <a:p>
-            <a:pPr marL="285750" indent="-285750">
-              <a:buFont typeface="Arial" panose="020B0604020202020204" pitchFamily="34" charset="0"/>
-              <a:buChar char="•"/>
-            </a:pPr>
-            <a:r>
-              <a:rPr lang="en-US" dirty="0" smtClean="0"/>
-              <a:t>Power Consumption</a:t>
-            </a:r>
-          </a:p>
-          <a:p>
-            <a:pPr marL="285750" indent="-285750">
-              <a:buFont typeface="Arial" panose="020B0604020202020204" pitchFamily="34" charset="0"/>
-              <a:buChar char="•"/>
-            </a:pPr>
-            <a:r>
-              <a:rPr lang="en-US" dirty="0" smtClean="0"/>
-              <a:t>Simplicity</a:t>
-            </a:r>
-          </a:p>
-          <a:p>
-            <a:endParaRPr lang="en-US" dirty="0" smtClean="0"/>
-          </a:p>
-          <a:p>
-            <a:r>
-              <a:rPr lang="en-US" dirty="0" smtClean="0"/>
-              <a:t>Display</a:t>
-            </a:r>
-          </a:p>
-          <a:p>
-            <a:pPr marL="285750" indent="-285750">
-              <a:buFont typeface="Arial" panose="020B0604020202020204" pitchFamily="34" charset="0"/>
-              <a:buChar char="•"/>
-            </a:pPr>
-            <a:r>
-              <a:rPr lang="en-US" dirty="0" smtClean="0"/>
-              <a:t>Visibility</a:t>
-            </a:r>
-          </a:p>
-          <a:p>
-            <a:pPr marL="285750" indent="-285750">
-              <a:buFont typeface="Arial" panose="020B0604020202020204" pitchFamily="34" charset="0"/>
-              <a:buChar char="•"/>
-            </a:pPr>
-            <a:r>
-              <a:rPr lang="en-US" dirty="0" smtClean="0"/>
-              <a:t>Size</a:t>
-            </a:r>
-          </a:p>
-          <a:p>
-            <a:pPr marL="285750" indent="-285750">
-              <a:buFont typeface="Arial" panose="020B0604020202020204" pitchFamily="34" charset="0"/>
-              <a:buChar char="•"/>
-            </a:pPr>
-            <a:r>
-              <a:rPr lang="en-US" dirty="0" smtClean="0"/>
-              <a:t>Intuitive</a:t>
-            </a:r>
-          </a:p>
-        </p:txBody>
-      </p:sp>
-      <p:sp>
-        <p:nvSpPr>
-          <p:cNvPr id="10" name="TextBox 9"/>
-          <p:cNvSpPr txBox="1"/>
-          <p:nvPr/>
-        </p:nvSpPr>
-        <p:spPr>
-          <a:xfrm>
-            <a:off x="457200" y="199181"/>
-            <a:ext cx="6858000" cy="461665"/>
-          </a:xfrm>
-          <a:prstGeom prst="rect">
-            <a:avLst/>
-          </a:prstGeom>
-          <a:noFill/>
-        </p:spPr>
-        <p:txBody>
-          <a:bodyPr wrap="square" rtlCol="0">
-            <a:spAutoFit/>
-          </a:bodyPr>
-          <a:lstStyle/>
-          <a:p>
-            <a:r>
               <a:rPr lang="en-US" sz="2400" dirty="0" smtClean="0">
                 <a:solidFill>
                   <a:srgbClr val="0090F1"/>
                 </a:solidFill>
                 <a:latin typeface="Fast Money" pitchFamily="2" charset="0"/>
               </a:rPr>
-              <a:t>Design</a:t>
-            </a:r>
-            <a:r>
-              <a:rPr lang="en-US" sz="2400" dirty="0" smtClean="0">
-                <a:solidFill>
-                  <a:srgbClr val="41DCF1"/>
-                </a:solidFill>
-                <a:latin typeface="Fast Money" pitchFamily="2" charset="0"/>
-              </a:rPr>
-              <a:t> </a:t>
-            </a:r>
-            <a:r>
-              <a:rPr lang="en-US" sz="2400" dirty="0" smtClean="0">
-                <a:solidFill>
-                  <a:srgbClr val="0090F1"/>
-                </a:solidFill>
-                <a:latin typeface="Fast Money" pitchFamily="2" charset="0"/>
-              </a:rPr>
-              <a:t>considerations</a:t>
+              <a:t>Objective</a:t>
             </a:r>
             <a:endParaRPr lang="en-US" sz="2400" dirty="0">
               <a:solidFill>
@@ -8639,7 +8626,7 @@
     </p:spTree>
     <p:extLst>
       <p:ext uri="{BB962C8B-B14F-4D97-AF65-F5344CB8AC3E}">
-        <p14:creationId xmlns:p14="http://schemas.microsoft.com/office/powerpoint/2010/main" val="3934321023"/>
+        <p14:creationId xmlns:p14="http://schemas.microsoft.com/office/powerpoint/2010/main" val="1664973044"/>
       </p:ext>
     </p:extLst>
   </p:cSld>
@@ -8656,7 +8643,7 @@
 </p:sld>
 </file>
 
-<file path=ppt/slides/slide6.xml><?xml version="1.0" encoding="utf-8"?>
+<file path=ppt/slides/slide4.xml><?xml version="1.0" encoding="utf-8"?>
 <p:sld xmlns:a="http://schemas.openxmlformats.org/drawingml/2006/main" xmlns:r="http://schemas.openxmlformats.org/officeDocument/2006/relationships" xmlns:p="http://schemas.openxmlformats.org/presentationml/2006/main">
   <p:cSld>
     <p:spTree>
@@ -8691,7 +8678,7 @@
             <a:fld id="{B6F15528-21DE-4FAA-801E-634DDDAF4B2B}" type="slidenum">
               <a:rPr lang="en-US" smtClean="0"/>
               <a:pPr/>
-              <a:t>6</a:t>
+              <a:t>4</a:t>
             </a:fld>
             <a:endParaRPr lang="en-US"/>
           </a:p>
@@ -8775,6 +8762,851 @@
       </p:cxnSp>
       <p:sp>
         <p:nvSpPr>
+          <p:cNvPr id="3" name="Rectangle 2"/>
+          <p:cNvSpPr/>
+          <p:nvPr/>
+        </p:nvSpPr>
+        <p:spPr>
+          <a:xfrm>
+            <a:off x="524298" y="1003608"/>
+            <a:ext cx="8162501" cy="3751476"/>
+          </a:xfrm>
+          <a:prstGeom prst="rect">
+            <a:avLst/>
+          </a:prstGeom>
+        </p:spPr>
+        <p:txBody>
+          <a:bodyPr wrap="square">
+            <a:spAutoFit/>
+          </a:bodyPr>
+          <a:lstStyle/>
+          <a:p>
+            <a:pPr>
+              <a:lnSpc>
+                <a:spcPct val="107000"/>
+              </a:lnSpc>
+              <a:spcAft>
+                <a:spcPts val="800"/>
+              </a:spcAft>
+            </a:pPr>
+            <a:r>
+              <a:rPr lang="en-US" sz="2400" b="1" dirty="0">
+                <a:latin typeface="Calibri" panose="020F0502020204030204" pitchFamily="34" charset="0"/>
+                <a:ea typeface="Calibri" panose="020F0502020204030204" pitchFamily="34" charset="0"/>
+                <a:cs typeface="Times New Roman" panose="02020603050405020304" pitchFamily="18" charset="0"/>
+              </a:rPr>
+              <a:t>Requirements</a:t>
+            </a:r>
+            <a:endParaRPr lang="en-US" sz="2400" dirty="0">
+              <a:latin typeface="Calibri" panose="020F0502020204030204" pitchFamily="34" charset="0"/>
+              <a:ea typeface="Calibri" panose="020F0502020204030204" pitchFamily="34" charset="0"/>
+              <a:cs typeface="Times New Roman" panose="02020603050405020304" pitchFamily="18" charset="0"/>
+            </a:endParaRPr>
+          </a:p>
+          <a:p>
+            <a:pPr marL="342900" marR="0" lvl="0" indent="-342900">
+              <a:lnSpc>
+                <a:spcPct val="107000"/>
+              </a:lnSpc>
+              <a:spcBef>
+                <a:spcPts val="0"/>
+              </a:spcBef>
+              <a:spcAft>
+                <a:spcPts val="0"/>
+              </a:spcAft>
+              <a:buFont typeface="Arial" panose="020B0604020202020204" pitchFamily="34" charset="0"/>
+              <a:buChar char="•"/>
+            </a:pPr>
+            <a:r>
+              <a:rPr lang="en-US" sz="2400" dirty="0">
+                <a:latin typeface="Calibri" panose="020F0502020204030204" pitchFamily="34" charset="0"/>
+                <a:ea typeface="Calibri" panose="020F0502020204030204" pitchFamily="34" charset="0"/>
+                <a:cs typeface="Times New Roman" panose="02020603050405020304" pitchFamily="18" charset="0"/>
+              </a:rPr>
+              <a:t>Easy to </a:t>
+            </a:r>
+            <a:r>
+              <a:rPr lang="en-US" sz="2400" dirty="0" smtClean="0">
+                <a:latin typeface="Calibri" panose="020F0502020204030204" pitchFamily="34" charset="0"/>
+                <a:ea typeface="Calibri" panose="020F0502020204030204" pitchFamily="34" charset="0"/>
+                <a:cs typeface="Times New Roman" panose="02020603050405020304" pitchFamily="18" charset="0"/>
+              </a:rPr>
+              <a:t>use</a:t>
+            </a:r>
+            <a:endParaRPr lang="en-US" sz="2400" dirty="0">
+              <a:latin typeface="Calibri" panose="020F0502020204030204" pitchFamily="34" charset="0"/>
+              <a:ea typeface="Calibri" panose="020F0502020204030204" pitchFamily="34" charset="0"/>
+              <a:cs typeface="Times New Roman" panose="02020603050405020304" pitchFamily="18" charset="0"/>
+            </a:endParaRPr>
+          </a:p>
+          <a:p>
+            <a:pPr marL="342900" marR="0" lvl="0" indent="-342900">
+              <a:lnSpc>
+                <a:spcPct val="107000"/>
+              </a:lnSpc>
+              <a:spcBef>
+                <a:spcPts val="0"/>
+              </a:spcBef>
+              <a:spcAft>
+                <a:spcPts val="0"/>
+              </a:spcAft>
+              <a:buFont typeface="Arial" panose="020B0604020202020204" pitchFamily="34" charset="0"/>
+              <a:buChar char="•"/>
+            </a:pPr>
+            <a:r>
+              <a:rPr lang="en-US" sz="2400" dirty="0" smtClean="0">
+                <a:effectLst/>
+                <a:latin typeface="Calibri" panose="020F0502020204030204" pitchFamily="34" charset="0"/>
+                <a:ea typeface="Calibri" panose="020F0502020204030204" pitchFamily="34" charset="0"/>
+                <a:cs typeface="Times New Roman" panose="02020603050405020304" pitchFamily="18" charset="0"/>
+              </a:rPr>
+              <a:t>Real-time visual indication of distance to rear and sides</a:t>
+            </a:r>
+          </a:p>
+          <a:p>
+            <a:pPr marL="342900" marR="0" lvl="0" indent="-342900">
+              <a:lnSpc>
+                <a:spcPct val="107000"/>
+              </a:lnSpc>
+              <a:spcBef>
+                <a:spcPts val="0"/>
+              </a:spcBef>
+              <a:spcAft>
+                <a:spcPts val="0"/>
+              </a:spcAft>
+              <a:buFont typeface="Arial" panose="020B0604020202020204" pitchFamily="34" charset="0"/>
+              <a:buChar char="•"/>
+            </a:pPr>
+            <a:r>
+              <a:rPr lang="en-US" sz="2400" dirty="0" smtClean="0">
+                <a:latin typeface="Calibri" panose="020F0502020204030204" pitchFamily="34" charset="0"/>
+                <a:ea typeface="Calibri" panose="020F0502020204030204" pitchFamily="34" charset="0"/>
+                <a:cs typeface="Times New Roman" panose="02020603050405020304" pitchFamily="18" charset="0"/>
+              </a:rPr>
+              <a:t>Three zones</a:t>
+            </a:r>
+          </a:p>
+          <a:p>
+            <a:pPr marL="342900" marR="0" lvl="0" indent="-342900">
+              <a:lnSpc>
+                <a:spcPct val="107000"/>
+              </a:lnSpc>
+              <a:spcBef>
+                <a:spcPts val="0"/>
+              </a:spcBef>
+              <a:spcAft>
+                <a:spcPts val="0"/>
+              </a:spcAft>
+              <a:buFont typeface="Arial" panose="020B0604020202020204" pitchFamily="34" charset="0"/>
+              <a:buChar char="•"/>
+            </a:pPr>
+            <a:r>
+              <a:rPr lang="en-US" sz="2400" dirty="0" smtClean="0">
+                <a:latin typeface="Calibri" panose="020F0502020204030204" pitchFamily="34" charset="0"/>
+                <a:ea typeface="Calibri" panose="020F0502020204030204" pitchFamily="34" charset="0"/>
+                <a:cs typeface="Times New Roman" panose="02020603050405020304" pitchFamily="18" charset="0"/>
+              </a:rPr>
+              <a:t>0-5 </a:t>
+            </a:r>
+            <a:r>
+              <a:rPr lang="en-US" sz="2400" dirty="0" err="1" smtClean="0">
+                <a:latin typeface="Calibri" panose="020F0502020204030204" pitchFamily="34" charset="0"/>
+                <a:ea typeface="Calibri" panose="020F0502020204030204" pitchFamily="34" charset="0"/>
+                <a:cs typeface="Times New Roman" panose="02020603050405020304" pitchFamily="18" charset="0"/>
+              </a:rPr>
+              <a:t>ft</a:t>
+            </a:r>
+            <a:r>
+              <a:rPr lang="en-US" sz="2400" dirty="0" smtClean="0">
+                <a:latin typeface="Calibri" panose="020F0502020204030204" pitchFamily="34" charset="0"/>
+                <a:ea typeface="Calibri" panose="020F0502020204030204" pitchFamily="34" charset="0"/>
+                <a:cs typeface="Times New Roman" panose="02020603050405020304" pitchFamily="18" charset="0"/>
+              </a:rPr>
+              <a:t>, 5-10 </a:t>
+            </a:r>
+            <a:r>
+              <a:rPr lang="en-US" sz="2400" dirty="0" err="1" smtClean="0">
+                <a:latin typeface="Calibri" panose="020F0502020204030204" pitchFamily="34" charset="0"/>
+                <a:ea typeface="Calibri" panose="020F0502020204030204" pitchFamily="34" charset="0"/>
+                <a:cs typeface="Times New Roman" panose="02020603050405020304" pitchFamily="18" charset="0"/>
+              </a:rPr>
+              <a:t>ft</a:t>
+            </a:r>
+            <a:r>
+              <a:rPr lang="en-US" sz="2400" dirty="0" smtClean="0">
+                <a:latin typeface="Calibri" panose="020F0502020204030204" pitchFamily="34" charset="0"/>
+                <a:ea typeface="Calibri" panose="020F0502020204030204" pitchFamily="34" charset="0"/>
+                <a:cs typeface="Times New Roman" panose="02020603050405020304" pitchFamily="18" charset="0"/>
+              </a:rPr>
+              <a:t>, 10-15 </a:t>
+            </a:r>
+            <a:r>
+              <a:rPr lang="en-US" sz="2400" dirty="0" err="1" smtClean="0">
+                <a:latin typeface="Calibri" panose="020F0502020204030204" pitchFamily="34" charset="0"/>
+                <a:ea typeface="Calibri" panose="020F0502020204030204" pitchFamily="34" charset="0"/>
+                <a:cs typeface="Times New Roman" panose="02020603050405020304" pitchFamily="18" charset="0"/>
+              </a:rPr>
+              <a:t>ft</a:t>
+            </a:r>
+            <a:endParaRPr lang="en-US" sz="2400" dirty="0">
+              <a:latin typeface="Calibri" panose="020F0502020204030204" pitchFamily="34" charset="0"/>
+              <a:ea typeface="Calibri" panose="020F0502020204030204" pitchFamily="34" charset="0"/>
+              <a:cs typeface="Times New Roman" panose="02020603050405020304" pitchFamily="18" charset="0"/>
+            </a:endParaRPr>
+          </a:p>
+          <a:p>
+            <a:pPr marL="342900" marR="0" lvl="0" indent="-342900">
+              <a:lnSpc>
+                <a:spcPct val="107000"/>
+              </a:lnSpc>
+              <a:spcBef>
+                <a:spcPts val="0"/>
+              </a:spcBef>
+              <a:spcAft>
+                <a:spcPts val="0"/>
+              </a:spcAft>
+              <a:buFont typeface="Arial" panose="020B0604020202020204" pitchFamily="34" charset="0"/>
+              <a:buChar char="•"/>
+            </a:pPr>
+            <a:r>
+              <a:rPr lang="en-US" sz="2400" dirty="0" smtClean="0">
+                <a:effectLst/>
+                <a:latin typeface="Calibri" panose="020F0502020204030204" pitchFamily="34" charset="0"/>
+                <a:ea typeface="Calibri" panose="020F0502020204030204" pitchFamily="34" charset="0"/>
+                <a:cs typeface="Times New Roman" panose="02020603050405020304" pitchFamily="18" charset="0"/>
+              </a:rPr>
+              <a:t>Weather resistant</a:t>
+            </a:r>
+          </a:p>
+          <a:p>
+            <a:pPr marL="342900" marR="0" lvl="0" indent="-342900">
+              <a:lnSpc>
+                <a:spcPct val="107000"/>
+              </a:lnSpc>
+              <a:spcBef>
+                <a:spcPts val="0"/>
+              </a:spcBef>
+              <a:spcAft>
+                <a:spcPts val="0"/>
+              </a:spcAft>
+              <a:buFont typeface="Arial" panose="020B0604020202020204" pitchFamily="34" charset="0"/>
+              <a:buChar char="•"/>
+            </a:pPr>
+            <a:r>
+              <a:rPr lang="en-US" sz="2400" dirty="0" smtClean="0">
+                <a:latin typeface="Calibri" panose="020F0502020204030204" pitchFamily="34" charset="0"/>
+                <a:ea typeface="Calibri" panose="020F0502020204030204" pitchFamily="34" charset="0"/>
+                <a:cs typeface="Times New Roman" panose="02020603050405020304" pitchFamily="18" charset="0"/>
+              </a:rPr>
+              <a:t>Battery powered</a:t>
+            </a:r>
+          </a:p>
+          <a:p>
+            <a:pPr marL="342900" marR="0" lvl="0" indent="-342900">
+              <a:lnSpc>
+                <a:spcPct val="107000"/>
+              </a:lnSpc>
+              <a:spcBef>
+                <a:spcPts val="0"/>
+              </a:spcBef>
+              <a:spcAft>
+                <a:spcPts val="0"/>
+              </a:spcAft>
+              <a:buFont typeface="Arial" panose="020B0604020202020204" pitchFamily="34" charset="0"/>
+              <a:buChar char="•"/>
+            </a:pPr>
+            <a:r>
+              <a:rPr lang="en-US" sz="2400" dirty="0" smtClean="0">
+                <a:latin typeface="Calibri" panose="020F0502020204030204" pitchFamily="34" charset="0"/>
+                <a:ea typeface="Calibri" panose="020F0502020204030204" pitchFamily="34" charset="0"/>
+                <a:cs typeface="Times New Roman" panose="02020603050405020304" pitchFamily="18" charset="0"/>
+              </a:rPr>
+              <a:t>Bright enough for sunlit conditions.	</a:t>
+            </a:r>
+          </a:p>
+          <a:p>
+            <a:pPr marL="342900" marR="0" lvl="0" indent="-342900">
+              <a:lnSpc>
+                <a:spcPct val="107000"/>
+              </a:lnSpc>
+              <a:spcBef>
+                <a:spcPts val="0"/>
+              </a:spcBef>
+              <a:spcAft>
+                <a:spcPts val="0"/>
+              </a:spcAft>
+              <a:buFont typeface="Arial" panose="020B0604020202020204" pitchFamily="34" charset="0"/>
+              <a:buChar char="•"/>
+            </a:pPr>
+            <a:r>
+              <a:rPr lang="en-US" sz="2400" dirty="0" smtClean="0">
+                <a:latin typeface="Calibri" panose="020F0502020204030204" pitchFamily="34" charset="0"/>
+                <a:ea typeface="Calibri" panose="020F0502020204030204" pitchFamily="34" charset="0"/>
+                <a:cs typeface="Times New Roman" panose="02020603050405020304" pitchFamily="18" charset="0"/>
+              </a:rPr>
+              <a:t>Low profile and easily mounted</a:t>
+            </a:r>
+          </a:p>
+        </p:txBody>
+      </p:sp>
+      <p:sp>
+        <p:nvSpPr>
+          <p:cNvPr id="6" name="TextBox 5"/>
+          <p:cNvSpPr txBox="1"/>
+          <p:nvPr/>
+        </p:nvSpPr>
+        <p:spPr>
+          <a:xfrm>
+            <a:off x="457200" y="199181"/>
+            <a:ext cx="4648200" cy="461665"/>
+          </a:xfrm>
+          <a:prstGeom prst="rect">
+            <a:avLst/>
+          </a:prstGeom>
+          <a:noFill/>
+        </p:spPr>
+        <p:txBody>
+          <a:bodyPr wrap="square" rtlCol="0">
+            <a:spAutoFit/>
+          </a:bodyPr>
+          <a:lstStyle/>
+          <a:p>
+            <a:r>
+              <a:rPr lang="en-US" sz="2400" dirty="0" smtClean="0">
+                <a:solidFill>
+                  <a:srgbClr val="0090F1"/>
+                </a:solidFill>
+                <a:latin typeface="Fast Money" pitchFamily="2" charset="0"/>
+              </a:rPr>
+              <a:t>Requirements</a:t>
+            </a:r>
+            <a:endParaRPr lang="en-US" sz="2400" dirty="0">
+              <a:solidFill>
+                <a:srgbClr val="0090F1"/>
+              </a:solidFill>
+              <a:latin typeface="Fast Money" pitchFamily="2" charset="0"/>
+            </a:endParaRPr>
+          </a:p>
+        </p:txBody>
+      </p:sp>
+    </p:spTree>
+    <p:extLst>
+      <p:ext uri="{BB962C8B-B14F-4D97-AF65-F5344CB8AC3E}">
+        <p14:creationId xmlns:p14="http://schemas.microsoft.com/office/powerpoint/2010/main" val="2585547098"/>
+      </p:ext>
+    </p:extLst>
+  </p:cSld>
+  <p:clrMapOvr>
+    <a:masterClrMapping/>
+  </p:clrMapOvr>
+  <p:timing>
+    <p:tnLst>
+      <p:par>
+        <p:cTn id="1" dur="indefinite" restart="never" nodeType="tmRoot"/>
+      </p:par>
+    </p:tnLst>
+  </p:timing>
+</p:sld>
+</file>
+
+<file path=ppt/slides/slide5.xml><?xml version="1.0" encoding="utf-8"?>
+<p:sld xmlns:a="http://schemas.openxmlformats.org/drawingml/2006/main" xmlns:r="http://schemas.openxmlformats.org/officeDocument/2006/relationships" xmlns:p="http://schemas.openxmlformats.org/presentationml/2006/main">
+  <p:cSld>
+    <p:spTree>
+      <p:nvGrpSpPr>
+        <p:cNvPr id="1" name=""/>
+        <p:cNvGrpSpPr/>
+        <p:nvPr/>
+      </p:nvGrpSpPr>
+      <p:grpSpPr>
+        <a:xfrm>
+          <a:off x="0" y="0"/>
+          <a:ext cx="0" cy="0"/>
+          <a:chOff x="0" y="0"/>
+          <a:chExt cx="0" cy="0"/>
+        </a:xfrm>
+      </p:grpSpPr>
+      <p:sp>
+        <p:nvSpPr>
+          <p:cNvPr id="7" name="Slide Number Placeholder 6"/>
+          <p:cNvSpPr>
+            <a:spLocks noGrp="1"/>
+          </p:cNvSpPr>
+          <p:nvPr>
+            <p:ph type="sldNum" sz="quarter" idx="12"/>
+          </p:nvPr>
+        </p:nvSpPr>
+        <p:spPr/>
+        <p:txBody>
+          <a:bodyPr/>
+          <a:lstStyle/>
+          <a:p>
+            <a:fld id="{B6F15528-21DE-4FAA-801E-634DDDAF4B2B}" type="slidenum">
+              <a:rPr lang="en-US" smtClean="0"/>
+              <a:pPr/>
+              <a:t>5</a:t>
+            </a:fld>
+            <a:endParaRPr lang="en-US"/>
+          </a:p>
+        </p:txBody>
+      </p:sp>
+      <p:pic>
+        <p:nvPicPr>
+          <p:cNvPr id="8" name="Picture 2" descr="C:\Users\noaht_000\Documents\ECE411\Practicum2014\Wiki Images\logo.bmp"/>
+          <p:cNvPicPr>
+            <a:picLocks noChangeAspect="1" noChangeArrowheads="1"/>
+          </p:cNvPicPr>
+          <p:nvPr/>
+        </p:nvPicPr>
+        <p:blipFill>
+          <a:blip r:embed="rId3" cstate="print">
+            <a:extLst>
+              <a:ext uri="{28A0092B-C50C-407E-A947-70E740481C1C}">
+                <a14:useLocalDpi xmlns:a14="http://schemas.microsoft.com/office/drawing/2010/main" val="0"/>
+              </a:ext>
+            </a:extLst>
+          </a:blip>
+          <a:srcRect/>
+          <a:stretch>
+            <a:fillRect/>
+          </a:stretch>
+        </p:blipFill>
+        <p:spPr bwMode="auto">
+          <a:xfrm>
+            <a:off x="7391399" y="199181"/>
+            <a:ext cx="1477731" cy="639019"/>
+          </a:xfrm>
+          <a:prstGeom prst="rect">
+            <a:avLst/>
+          </a:prstGeom>
+          <a:noFill/>
+          <a:extLst>
+            <a:ext uri="{909E8E84-426E-40DD-AFC4-6F175D3DCCD1}">
+              <a14:hiddenFill xmlns:a14="http://schemas.microsoft.com/office/drawing/2010/main">
+                <a:solidFill>
+                  <a:srgbClr val="FFFFFF"/>
+                </a:solidFill>
+              </a14:hiddenFill>
+            </a:ext>
+          </a:extLst>
+        </p:spPr>
+      </p:pic>
+      <p:cxnSp>
+        <p:nvCxnSpPr>
+          <p:cNvPr id="9" name="Straight Connector 8"/>
+          <p:cNvCxnSpPr/>
+          <p:nvPr/>
+        </p:nvCxnSpPr>
+        <p:spPr>
+          <a:xfrm flipH="1">
+            <a:off x="533398" y="762000"/>
+            <a:ext cx="6857999" cy="0"/>
+          </a:xfrm>
+          <a:prstGeom prst="line">
+            <a:avLst/>
+          </a:prstGeom>
+          <a:ln w="38100">
+            <a:solidFill>
+              <a:schemeClr val="tx1"/>
+            </a:solidFill>
+          </a:ln>
+        </p:spPr>
+        <p:style>
+          <a:lnRef idx="1">
+            <a:schemeClr val="accent1"/>
+          </a:lnRef>
+          <a:fillRef idx="0">
+            <a:schemeClr val="accent1"/>
+          </a:fillRef>
+          <a:effectRef idx="0">
+            <a:schemeClr val="accent1"/>
+          </a:effectRef>
+          <a:fontRef idx="minor">
+            <a:schemeClr val="tx1"/>
+          </a:fontRef>
+        </p:style>
+      </p:cxnSp>
+      <p:sp>
+        <p:nvSpPr>
+          <p:cNvPr id="2" name="TextBox 1"/>
+          <p:cNvSpPr txBox="1"/>
+          <p:nvPr/>
+        </p:nvSpPr>
+        <p:spPr>
+          <a:xfrm>
+            <a:off x="533398" y="1066800"/>
+            <a:ext cx="7543802" cy="5355312"/>
+          </a:xfrm>
+          <a:prstGeom prst="rect">
+            <a:avLst/>
+          </a:prstGeom>
+          <a:noFill/>
+        </p:spPr>
+        <p:txBody>
+          <a:bodyPr wrap="square" rtlCol="0">
+            <a:spAutoFit/>
+          </a:bodyPr>
+          <a:lstStyle/>
+          <a:p>
+            <a:r>
+              <a:rPr lang="en-US" dirty="0" smtClean="0"/>
+              <a:t>Sensor Module</a:t>
+            </a:r>
+          </a:p>
+          <a:p>
+            <a:pPr marL="285750" indent="-285750">
+              <a:buFont typeface="Arial" panose="020B0604020202020204" pitchFamily="34" charset="0"/>
+              <a:buChar char="•"/>
+            </a:pPr>
+            <a:r>
+              <a:rPr lang="en-US" dirty="0" smtClean="0"/>
+              <a:t>Sensor range ~15ft.</a:t>
+            </a:r>
+          </a:p>
+          <a:p>
+            <a:pPr marL="285750" indent="-285750">
+              <a:buFont typeface="Arial" panose="020B0604020202020204" pitchFamily="34" charset="0"/>
+              <a:buChar char="•"/>
+            </a:pPr>
+            <a:r>
+              <a:rPr lang="en-US" dirty="0" smtClean="0"/>
+              <a:t>Type of sensor (ultrasonic, IR, </a:t>
+            </a:r>
+            <a:r>
+              <a:rPr lang="en-US" dirty="0" err="1" smtClean="0"/>
+              <a:t>etc</a:t>
+            </a:r>
+            <a:r>
+              <a:rPr lang="en-US" dirty="0" smtClean="0"/>
+              <a:t>)</a:t>
+            </a:r>
+          </a:p>
+          <a:p>
+            <a:pPr marL="285750" indent="-285750">
+              <a:buFont typeface="Arial" panose="020B0604020202020204" pitchFamily="34" charset="0"/>
+              <a:buChar char="•"/>
+            </a:pPr>
+            <a:r>
+              <a:rPr lang="en-US" dirty="0" smtClean="0"/>
+              <a:t>Integration with microprocessor</a:t>
+            </a:r>
+          </a:p>
+          <a:p>
+            <a:endParaRPr lang="en-US" dirty="0"/>
+          </a:p>
+          <a:p>
+            <a:r>
+              <a:rPr lang="en-US" dirty="0" smtClean="0"/>
+              <a:t>Power</a:t>
+            </a:r>
+          </a:p>
+          <a:p>
+            <a:pPr marL="285750" indent="-285750">
+              <a:buFont typeface="Arial" panose="020B0604020202020204" pitchFamily="34" charset="0"/>
+              <a:buChar char="•"/>
+            </a:pPr>
+            <a:r>
+              <a:rPr lang="en-US" dirty="0" smtClean="0"/>
+              <a:t>Regulation</a:t>
+            </a:r>
+          </a:p>
+          <a:p>
+            <a:pPr marL="285750" indent="-285750">
+              <a:buFont typeface="Arial" panose="020B0604020202020204" pitchFamily="34" charset="0"/>
+              <a:buChar char="•"/>
+            </a:pPr>
+            <a:r>
+              <a:rPr lang="en-US" dirty="0" smtClean="0"/>
+              <a:t>Sources</a:t>
+            </a:r>
+          </a:p>
+          <a:p>
+            <a:endParaRPr lang="en-US" dirty="0"/>
+          </a:p>
+          <a:p>
+            <a:r>
+              <a:rPr lang="en-US" dirty="0" smtClean="0"/>
+              <a:t>Microprocessor</a:t>
+            </a:r>
+          </a:p>
+          <a:p>
+            <a:pPr marL="285750" indent="-285750">
+              <a:buFont typeface="Arial" panose="020B0604020202020204" pitchFamily="34" charset="0"/>
+              <a:buChar char="•"/>
+            </a:pPr>
+            <a:r>
+              <a:rPr lang="en-US" dirty="0" smtClean="0"/>
+              <a:t>Number/type of I/O ports</a:t>
+            </a:r>
+          </a:p>
+          <a:p>
+            <a:pPr marL="285750" indent="-285750">
+              <a:buFont typeface="Arial" panose="020B0604020202020204" pitchFamily="34" charset="0"/>
+              <a:buChar char="•"/>
+            </a:pPr>
+            <a:r>
+              <a:rPr lang="en-US" dirty="0" smtClean="0"/>
+              <a:t>IDE/support</a:t>
+            </a:r>
+          </a:p>
+          <a:p>
+            <a:pPr marL="285750" indent="-285750">
+              <a:buFont typeface="Arial" panose="020B0604020202020204" pitchFamily="34" charset="0"/>
+              <a:buChar char="•"/>
+            </a:pPr>
+            <a:r>
+              <a:rPr lang="en-US" dirty="0" smtClean="0"/>
+              <a:t>Power Consumption</a:t>
+            </a:r>
+          </a:p>
+          <a:p>
+            <a:pPr marL="285750" indent="-285750">
+              <a:buFont typeface="Arial" panose="020B0604020202020204" pitchFamily="34" charset="0"/>
+              <a:buChar char="•"/>
+            </a:pPr>
+            <a:r>
+              <a:rPr lang="en-US" dirty="0" smtClean="0"/>
+              <a:t>Simplicity</a:t>
+            </a:r>
+          </a:p>
+          <a:p>
+            <a:endParaRPr lang="en-US" dirty="0" smtClean="0"/>
+          </a:p>
+          <a:p>
+            <a:r>
+              <a:rPr lang="en-US" dirty="0" smtClean="0"/>
+              <a:t>Display</a:t>
+            </a:r>
+          </a:p>
+          <a:p>
+            <a:pPr marL="285750" indent="-285750">
+              <a:buFont typeface="Arial" panose="020B0604020202020204" pitchFamily="34" charset="0"/>
+              <a:buChar char="•"/>
+            </a:pPr>
+            <a:r>
+              <a:rPr lang="en-US" dirty="0" smtClean="0"/>
+              <a:t>Visibility</a:t>
+            </a:r>
+          </a:p>
+          <a:p>
+            <a:pPr marL="285750" indent="-285750">
+              <a:buFont typeface="Arial" panose="020B0604020202020204" pitchFamily="34" charset="0"/>
+              <a:buChar char="•"/>
+            </a:pPr>
+            <a:r>
+              <a:rPr lang="en-US" dirty="0" smtClean="0"/>
+              <a:t>Size</a:t>
+            </a:r>
+          </a:p>
+          <a:p>
+            <a:pPr marL="285750" indent="-285750">
+              <a:buFont typeface="Arial" panose="020B0604020202020204" pitchFamily="34" charset="0"/>
+              <a:buChar char="•"/>
+            </a:pPr>
+            <a:r>
+              <a:rPr lang="en-US" dirty="0" smtClean="0"/>
+              <a:t>Intuitive</a:t>
+            </a:r>
+          </a:p>
+        </p:txBody>
+      </p:sp>
+      <p:sp>
+        <p:nvSpPr>
+          <p:cNvPr id="10" name="TextBox 9"/>
+          <p:cNvSpPr txBox="1"/>
+          <p:nvPr/>
+        </p:nvSpPr>
+        <p:spPr>
+          <a:xfrm>
+            <a:off x="457200" y="199181"/>
+            <a:ext cx="6858000" cy="461665"/>
+          </a:xfrm>
+          <a:prstGeom prst="rect">
+            <a:avLst/>
+          </a:prstGeom>
+          <a:noFill/>
+        </p:spPr>
+        <p:txBody>
+          <a:bodyPr wrap="square" rtlCol="0">
+            <a:spAutoFit/>
+          </a:bodyPr>
+          <a:lstStyle/>
+          <a:p>
+            <a:r>
+              <a:rPr lang="en-US" sz="2400" dirty="0" smtClean="0">
+                <a:solidFill>
+                  <a:srgbClr val="0090F1"/>
+                </a:solidFill>
+                <a:latin typeface="Fast Money" pitchFamily="2" charset="0"/>
+              </a:rPr>
+              <a:t>Design</a:t>
+            </a:r>
+            <a:r>
+              <a:rPr lang="en-US" sz="2400" dirty="0" smtClean="0">
+                <a:solidFill>
+                  <a:srgbClr val="41DCF1"/>
+                </a:solidFill>
+                <a:latin typeface="Fast Money" pitchFamily="2" charset="0"/>
+              </a:rPr>
+              <a:t> </a:t>
+            </a:r>
+            <a:r>
+              <a:rPr lang="en-US" sz="2400" dirty="0" smtClean="0">
+                <a:solidFill>
+                  <a:srgbClr val="0090F1"/>
+                </a:solidFill>
+                <a:latin typeface="Fast Money" pitchFamily="2" charset="0"/>
+              </a:rPr>
+              <a:t>considerations</a:t>
+            </a:r>
+            <a:endParaRPr lang="en-US" sz="2400" dirty="0">
+              <a:solidFill>
+                <a:srgbClr val="0090F1"/>
+              </a:solidFill>
+              <a:latin typeface="Fast Money" pitchFamily="2" charset="0"/>
+            </a:endParaRPr>
+          </a:p>
+        </p:txBody>
+      </p:sp>
+    </p:spTree>
+    <p:extLst>
+      <p:ext uri="{BB962C8B-B14F-4D97-AF65-F5344CB8AC3E}">
+        <p14:creationId xmlns:p14="http://schemas.microsoft.com/office/powerpoint/2010/main" val="3934321023"/>
+      </p:ext>
+    </p:extLst>
+  </p:cSld>
+  <p:clrMapOvr>
+    <a:masterClrMapping/>
+  </p:clrMapOvr>
+  <p:timing>
+    <p:tnLst>
+      <p:par>
+        <p:cTn id="1" dur="indefinite" restart="never" nodeType="tmRoot"/>
+      </p:par>
+    </p:tnLst>
+  </p:timing>
+</p:sld>
+</file>
+
+<file path=ppt/slides/slide6.xml><?xml version="1.0" encoding="utf-8"?>
+<p:sld xmlns:a="http://schemas.openxmlformats.org/drawingml/2006/main" xmlns:r="http://schemas.openxmlformats.org/officeDocument/2006/relationships" xmlns:p="http://schemas.openxmlformats.org/presentationml/2006/main">
+  <p:cSld>
+    <p:spTree>
+      <p:nvGrpSpPr>
+        <p:cNvPr id="1" name=""/>
+        <p:cNvGrpSpPr/>
+        <p:nvPr/>
+      </p:nvGrpSpPr>
+      <p:grpSpPr>
+        <a:xfrm>
+          <a:off x="0" y="0"/>
+          <a:ext cx="0" cy="0"/>
+          <a:chOff x="0" y="0"/>
+          <a:chExt cx="0" cy="0"/>
+        </a:xfrm>
+      </p:grpSpPr>
+      <p:sp>
+        <p:nvSpPr>
+          <p:cNvPr id="7" name="Slide Number Placeholder 6"/>
+          <p:cNvSpPr>
+            <a:spLocks noGrp="1"/>
+          </p:cNvSpPr>
+          <p:nvPr>
+            <p:ph type="sldNum" sz="quarter" idx="12"/>
+          </p:nvPr>
+        </p:nvSpPr>
+        <p:spPr/>
+        <p:txBody>
+          <a:bodyPr/>
+          <a:lstStyle/>
+          <a:p>
+            <a:fld id="{B6F15528-21DE-4FAA-801E-634DDDAF4B2B}" type="slidenum">
+              <a:rPr lang="en-US" smtClean="0"/>
+              <a:pPr/>
+              <a:t>6</a:t>
+            </a:fld>
+            <a:endParaRPr lang="en-US"/>
+          </a:p>
+        </p:txBody>
+      </p:sp>
+      <p:pic>
+        <p:nvPicPr>
+          <p:cNvPr id="8" name="Picture 2" descr="C:\Users\noaht_000\Documents\ECE411\Practicum2014\Wiki Images\logo.bmp"/>
+          <p:cNvPicPr>
+            <a:picLocks noChangeAspect="1" noChangeArrowheads="1"/>
+          </p:cNvPicPr>
+          <p:nvPr/>
+        </p:nvPicPr>
+        <p:blipFill>
+          <a:blip r:embed="rId3" cstate="print">
+            <a:extLst>
+              <a:ext uri="{28A0092B-C50C-407E-A947-70E740481C1C}">
+                <a14:useLocalDpi xmlns:a14="http://schemas.microsoft.com/office/drawing/2010/main" val="0"/>
+              </a:ext>
+            </a:extLst>
+          </a:blip>
+          <a:srcRect/>
+          <a:stretch>
+            <a:fillRect/>
+          </a:stretch>
+        </p:blipFill>
+        <p:spPr bwMode="auto">
+          <a:xfrm>
+            <a:off x="7391399" y="199181"/>
+            <a:ext cx="1477731" cy="639019"/>
+          </a:xfrm>
+          <a:prstGeom prst="rect">
+            <a:avLst/>
+          </a:prstGeom>
+          <a:noFill/>
+          <a:extLst>
+            <a:ext uri="{909E8E84-426E-40DD-AFC4-6F175D3DCCD1}">
+              <a14:hiddenFill xmlns:a14="http://schemas.microsoft.com/office/drawing/2010/main">
+                <a:solidFill>
+                  <a:srgbClr val="FFFFFF"/>
+                </a:solidFill>
+              </a14:hiddenFill>
+            </a:ext>
+          </a:extLst>
+        </p:spPr>
+      </p:pic>
+      <p:cxnSp>
+        <p:nvCxnSpPr>
+          <p:cNvPr id="9" name="Straight Connector 8"/>
+          <p:cNvCxnSpPr/>
+          <p:nvPr/>
+        </p:nvCxnSpPr>
+        <p:spPr>
+          <a:xfrm flipH="1">
+            <a:off x="533398" y="762000"/>
+            <a:ext cx="6857999" cy="0"/>
+          </a:xfrm>
+          <a:prstGeom prst="line">
+            <a:avLst/>
+          </a:prstGeom>
+          <a:ln w="38100">
+            <a:solidFill>
+              <a:schemeClr val="tx1"/>
+            </a:solidFill>
+          </a:ln>
+        </p:spPr>
+        <p:style>
+          <a:lnRef idx="1">
+            <a:schemeClr val="accent1"/>
+          </a:lnRef>
+          <a:fillRef idx="0">
+            <a:schemeClr val="accent1"/>
+          </a:fillRef>
+          <a:effectRef idx="0">
+            <a:schemeClr val="accent1"/>
+          </a:effectRef>
+          <a:fontRef idx="minor">
+            <a:schemeClr val="tx1"/>
+          </a:fontRef>
+        </p:style>
+      </p:cxnSp>
+      <p:sp>
+        <p:nvSpPr>
           <p:cNvPr id="2" name="Rectangle 1"/>
           <p:cNvSpPr/>
           <p:nvPr/>
@@ -8807,14 +9639,7 @@
                 <a:latin typeface="Calibri" panose="020F0502020204030204" pitchFamily="34" charset="0"/>
                 <a:cs typeface="Times New Roman" panose="02020603050405020304" pitchFamily="18" charset="0"/>
               </a:rPr>
-              <a:t>Ultrasonic </a:t>
-            </a:r>
-            <a:r>
-              <a:rPr lang="en-US" sz="2400" b="1" dirty="0" smtClean="0">
-                <a:latin typeface="Calibri" panose="020F0502020204030204" pitchFamily="34" charset="0"/>
-                <a:cs typeface="Times New Roman" panose="02020603050405020304" pitchFamily="18" charset="0"/>
-              </a:rPr>
-              <a:t>sensors </a:t>
+              <a:t>Ultrasonic sensors </a:t>
             </a:r>
           </a:p>
           <a:p>
@@ -8852,14 +9677,7 @@
                 <a:latin typeface="Calibri" panose="020F0502020204030204" pitchFamily="34" charset="0"/>
                 <a:cs typeface="Times New Roman" panose="02020603050405020304" pitchFamily="18" charset="0"/>
               </a:rPr>
-              <a:t>Send </a:t>
-            </a:r>
-            <a:r>
-              <a:rPr lang="en-US" sz="2400" dirty="0" smtClean="0">
-                <a:latin typeface="Calibri" panose="020F0502020204030204" pitchFamily="34" charset="0"/>
-                <a:cs typeface="Times New Roman" panose="02020603050405020304" pitchFamily="18" charset="0"/>
-              </a:rPr>
-              <a:t>and receive series of pulses when triggered</a:t>
+              <a:t>Send and receive series of pulses when triggered</a:t>
             </a:r>
           </a:p>
           <a:p>

</xml_diff>